<commit_message>
more notes added, introduction
</commit_message>
<xml_diff>
--- a/PowerPoint Final/Presentation_Joao_Mauro.pptx
+++ b/PowerPoint Final/Presentation_Joao_Mauro.pptx
@@ -851,49 +851,21 @@
           <a:p>
             <a:r>
               <a:rPr lang="en-US" dirty="0" smtClean="0"/>
-              <a:t>Need to be android 5.0 plus</a:t>
-            </a:r>
-          </a:p>
-          <a:p>
-            <a:r>
-              <a:rPr lang="en-US" dirty="0" smtClean="0"/>
-              <a:t>5 panels -&gt; navigation,</a:t>
+              <a:t>Good morning, thank you all for you presence,</a:t>
             </a:r>
             <a:r>
               <a:rPr lang="en-US" baseline="0" dirty="0" smtClean="0"/>
-              <a:t> phone log, home, media, car diagnosis</a:t>
-            </a:r>
-          </a:p>
-          <a:p>
+              <a:t> my name is João Ramos and this is Mauro </a:t>
+            </a:r>
+            <a:r>
+              <a:rPr lang="en-US" baseline="0" dirty="0" err="1" smtClean="0"/>
+              <a:t>Pires</a:t>
+            </a:r>
             <a:r>
               <a:rPr lang="en-US" baseline="0" dirty="0" smtClean="0"/>
-              <a:t>Important information, like a message received, from </a:t>
-            </a:r>
-            <a:r>
-              <a:rPr lang="en-US" baseline="0" dirty="0" err="1" smtClean="0"/>
-              <a:t>whatsupp</a:t>
-            </a:r>
-            <a:r>
-              <a:rPr lang="en-US" baseline="0" dirty="0" smtClean="0"/>
-              <a:t>, </a:t>
-            </a:r>
-            <a:r>
-              <a:rPr lang="en-US" baseline="0" dirty="0" err="1" smtClean="0"/>
-              <a:t>facebook</a:t>
-            </a:r>
-            <a:r>
-              <a:rPr lang="en-US" baseline="0" dirty="0" smtClean="0"/>
-              <a:t> </a:t>
-            </a:r>
-            <a:r>
-              <a:rPr lang="en-US" baseline="0" dirty="0" err="1" smtClean="0"/>
-              <a:t>messeger</a:t>
-            </a:r>
-            <a:r>
-              <a:rPr lang="en-US" baseline="0" dirty="0" smtClean="0"/>
-              <a:t> or hangouts</a:t>
-            </a:r>
-            <a:endParaRPr lang="en-US" dirty="0" smtClean="0"/>
+              <a:t>, and we are going to make a presentation about Android Auto</a:t>
+            </a:r>
+            <a:endParaRPr lang="en-US" dirty="0"/>
           </a:p>
         </p:txBody>
       </p:sp>
@@ -915,7 +887,7 @@
             <a:fld id="{1B06CD8F-B7ED-4A05-9FB1-A01CC0EF02CC}" type="slidenum">
               <a:rPr lang="fr-FR" smtClean="0"/>
               <a:pPr/>
-              <a:t>7</a:t>
+              <a:t>1</a:t>
             </a:fld>
             <a:endParaRPr lang="fr-FR" dirty="0"/>
           </a:p>
@@ -924,7 +896,264 @@
     </p:spTree>
     <p:extLst>
       <p:ext uri="{BB962C8B-B14F-4D97-AF65-F5344CB8AC3E}">
-        <p14:creationId xmlns:p14="http://schemas.microsoft.com/office/powerpoint/2010/main" val="1564263606"/>
+        <p14:creationId xmlns:p14="http://schemas.microsoft.com/office/powerpoint/2010/main" val="3813278572"/>
+      </p:ext>
+    </p:extLst>
+  </p:cSld>
+  <p:clrMapOvr>
+    <a:masterClrMapping/>
+  </p:clrMapOvr>
+</p:notes>
+</file>
+
+<file path=ppt/notesSlides/notesSlide10.xml><?xml version="1.0" encoding="utf-8"?>
+<p:notes xmlns:a="http://schemas.openxmlformats.org/drawingml/2006/main" xmlns:r="http://schemas.openxmlformats.org/officeDocument/2006/relationships" xmlns:p="http://schemas.openxmlformats.org/presentationml/2006/main">
+  <p:cSld>
+    <p:spTree>
+      <p:nvGrpSpPr>
+        <p:cNvPr id="1" name=""/>
+        <p:cNvGrpSpPr/>
+        <p:nvPr/>
+      </p:nvGrpSpPr>
+      <p:grpSpPr>
+        <a:xfrm>
+          <a:off x="0" y="0"/>
+          <a:ext cx="0" cy="0"/>
+          <a:chOff x="0" y="0"/>
+          <a:chExt cx="0" cy="0"/>
+        </a:xfrm>
+      </p:grpSpPr>
+      <p:sp>
+        <p:nvSpPr>
+          <p:cNvPr id="2" name="Slide Image Placeholder 1"/>
+          <p:cNvSpPr>
+            <a:spLocks noGrp="1" noRot="1" noChangeAspect="1"/>
+          </p:cNvSpPr>
+          <p:nvPr>
+            <p:ph type="sldImg"/>
+          </p:nvPr>
+        </p:nvSpPr>
+        <p:spPr/>
+      </p:sp>
+      <p:sp>
+        <p:nvSpPr>
+          <p:cNvPr id="3" name="Notes Placeholder 2"/>
+          <p:cNvSpPr>
+            <a:spLocks noGrp="1"/>
+          </p:cNvSpPr>
+          <p:nvPr>
+            <p:ph type="body" idx="1"/>
+          </p:nvPr>
+        </p:nvSpPr>
+        <p:spPr/>
+        <p:txBody>
+          <a:bodyPr/>
+          <a:lstStyle/>
+          <a:p>
+            <a:endParaRPr lang="en-GB" dirty="0"/>
+          </a:p>
+        </p:txBody>
+      </p:sp>
+      <p:sp>
+        <p:nvSpPr>
+          <p:cNvPr id="4" name="Slide Number Placeholder 3"/>
+          <p:cNvSpPr>
+            <a:spLocks noGrp="1"/>
+          </p:cNvSpPr>
+          <p:nvPr>
+            <p:ph type="sldNum" sz="quarter" idx="10"/>
+          </p:nvPr>
+        </p:nvSpPr>
+        <p:spPr/>
+        <p:txBody>
+          <a:bodyPr/>
+          <a:lstStyle/>
+          <a:p>
+            <a:fld id="{A5FE6474-0819-4CAC-A677-1ACC1221F957}" type="slidenum">
+              <a:rPr lang="en-GB" smtClean="0"/>
+              <a:t>16</a:t>
+            </a:fld>
+            <a:endParaRPr lang="en-GB"/>
+          </a:p>
+        </p:txBody>
+      </p:sp>
+    </p:spTree>
+    <p:extLst>
+      <p:ext uri="{BB962C8B-B14F-4D97-AF65-F5344CB8AC3E}">
+        <p14:creationId xmlns:p14="http://schemas.microsoft.com/office/powerpoint/2010/main" val="3694532524"/>
+      </p:ext>
+    </p:extLst>
+  </p:cSld>
+  <p:clrMapOvr>
+    <a:masterClrMapping/>
+  </p:clrMapOvr>
+</p:notes>
+</file>
+
+<file path=ppt/notesSlides/notesSlide11.xml><?xml version="1.0" encoding="utf-8"?>
+<p:notes xmlns:a="http://schemas.openxmlformats.org/drawingml/2006/main" xmlns:r="http://schemas.openxmlformats.org/officeDocument/2006/relationships" xmlns:p="http://schemas.openxmlformats.org/presentationml/2006/main">
+  <p:cSld>
+    <p:spTree>
+      <p:nvGrpSpPr>
+        <p:cNvPr id="1" name=""/>
+        <p:cNvGrpSpPr/>
+        <p:nvPr/>
+      </p:nvGrpSpPr>
+      <p:grpSpPr>
+        <a:xfrm>
+          <a:off x="0" y="0"/>
+          <a:ext cx="0" cy="0"/>
+          <a:chOff x="0" y="0"/>
+          <a:chExt cx="0" cy="0"/>
+        </a:xfrm>
+      </p:grpSpPr>
+      <p:sp>
+        <p:nvSpPr>
+          <p:cNvPr id="2" name="Slide Image Placeholder 1"/>
+          <p:cNvSpPr>
+            <a:spLocks noGrp="1" noRot="1" noChangeAspect="1"/>
+          </p:cNvSpPr>
+          <p:nvPr>
+            <p:ph type="sldImg"/>
+          </p:nvPr>
+        </p:nvSpPr>
+        <p:spPr/>
+      </p:sp>
+      <p:sp>
+        <p:nvSpPr>
+          <p:cNvPr id="3" name="Notes Placeholder 2"/>
+          <p:cNvSpPr>
+            <a:spLocks noGrp="1"/>
+          </p:cNvSpPr>
+          <p:nvPr>
+            <p:ph type="body" idx="1"/>
+          </p:nvPr>
+        </p:nvSpPr>
+        <p:spPr/>
+        <p:txBody>
+          <a:bodyPr/>
+          <a:lstStyle/>
+          <a:p>
+            <a:r>
+              <a:rPr lang="en-GB" dirty="0" smtClean="0"/>
+              <a:t>https://developer.android.com/distribute/best-practices/launch/distribute-auto.html#how_to_participate</a:t>
+            </a:r>
+            <a:endParaRPr lang="en-GB" dirty="0"/>
+          </a:p>
+        </p:txBody>
+      </p:sp>
+      <p:sp>
+        <p:nvSpPr>
+          <p:cNvPr id="4" name="Slide Number Placeholder 3"/>
+          <p:cNvSpPr>
+            <a:spLocks noGrp="1"/>
+          </p:cNvSpPr>
+          <p:nvPr>
+            <p:ph type="sldNum" sz="quarter" idx="10"/>
+          </p:nvPr>
+        </p:nvSpPr>
+        <p:spPr/>
+        <p:txBody>
+          <a:bodyPr/>
+          <a:lstStyle/>
+          <a:p>
+            <a:fld id="{A5FE6474-0819-4CAC-A677-1ACC1221F957}" type="slidenum">
+              <a:rPr lang="en-GB" smtClean="0"/>
+              <a:t>18</a:t>
+            </a:fld>
+            <a:endParaRPr lang="en-GB"/>
+          </a:p>
+        </p:txBody>
+      </p:sp>
+    </p:spTree>
+    <p:extLst>
+      <p:ext uri="{BB962C8B-B14F-4D97-AF65-F5344CB8AC3E}">
+        <p14:creationId xmlns:p14="http://schemas.microsoft.com/office/powerpoint/2010/main" val="3504536707"/>
+      </p:ext>
+    </p:extLst>
+  </p:cSld>
+  <p:clrMapOvr>
+    <a:masterClrMapping/>
+  </p:clrMapOvr>
+</p:notes>
+</file>
+
+<file path=ppt/notesSlides/notesSlide12.xml><?xml version="1.0" encoding="utf-8"?>
+<p:notes xmlns:a="http://schemas.openxmlformats.org/drawingml/2006/main" xmlns:r="http://schemas.openxmlformats.org/officeDocument/2006/relationships" xmlns:p="http://schemas.openxmlformats.org/presentationml/2006/main">
+  <p:cSld>
+    <p:spTree>
+      <p:nvGrpSpPr>
+        <p:cNvPr id="1" name=""/>
+        <p:cNvGrpSpPr/>
+        <p:nvPr/>
+      </p:nvGrpSpPr>
+      <p:grpSpPr>
+        <a:xfrm>
+          <a:off x="0" y="0"/>
+          <a:ext cx="0" cy="0"/>
+          <a:chOff x="0" y="0"/>
+          <a:chExt cx="0" cy="0"/>
+        </a:xfrm>
+      </p:grpSpPr>
+      <p:sp>
+        <p:nvSpPr>
+          <p:cNvPr id="2" name="Slide Image Placeholder 1"/>
+          <p:cNvSpPr>
+            <a:spLocks noGrp="1" noRot="1" noChangeAspect="1"/>
+          </p:cNvSpPr>
+          <p:nvPr>
+            <p:ph type="sldImg"/>
+          </p:nvPr>
+        </p:nvSpPr>
+        <p:spPr/>
+      </p:sp>
+      <p:sp>
+        <p:nvSpPr>
+          <p:cNvPr id="3" name="Notes Placeholder 2"/>
+          <p:cNvSpPr>
+            <a:spLocks noGrp="1"/>
+          </p:cNvSpPr>
+          <p:nvPr>
+            <p:ph type="body" idx="1"/>
+          </p:nvPr>
+        </p:nvSpPr>
+        <p:spPr/>
+        <p:txBody>
+          <a:bodyPr/>
+          <a:lstStyle/>
+          <a:p>
+            <a:endParaRPr lang="en-US" dirty="0"/>
+          </a:p>
+        </p:txBody>
+      </p:sp>
+      <p:sp>
+        <p:nvSpPr>
+          <p:cNvPr id="4" name="Slide Number Placeholder 3"/>
+          <p:cNvSpPr>
+            <a:spLocks noGrp="1"/>
+          </p:cNvSpPr>
+          <p:nvPr>
+            <p:ph type="sldNum" sz="quarter" idx="10"/>
+          </p:nvPr>
+        </p:nvSpPr>
+        <p:spPr/>
+        <p:txBody>
+          <a:bodyPr/>
+          <a:lstStyle/>
+          <a:p>
+            <a:fld id="{1B06CD8F-B7ED-4A05-9FB1-A01CC0EF02CC}" type="slidenum">
+              <a:rPr lang="fr-FR" smtClean="0"/>
+              <a:pPr/>
+              <a:t>22</a:t>
+            </a:fld>
+            <a:endParaRPr lang="fr-FR" dirty="0"/>
+          </a:p>
+        </p:txBody>
+      </p:sp>
+    </p:spTree>
+    <p:extLst>
+      <p:ext uri="{BB962C8B-B14F-4D97-AF65-F5344CB8AC3E}">
+        <p14:creationId xmlns:p14="http://schemas.microsoft.com/office/powerpoint/2010/main" val="991357884"/>
       </p:ext>
     </p:extLst>
   </p:cSld>
@@ -980,78 +1209,20 @@
           <a:p>
             <a:r>
               <a:rPr lang="en-US" dirty="0" smtClean="0"/>
-              <a:t>Like said before, the car sound system is connected</a:t>
+              <a:t>We</a:t>
             </a:r>
             <a:r>
               <a:rPr lang="en-US" baseline="0" dirty="0" smtClean="0"/>
-              <a:t> via </a:t>
+              <a:t> divide the presentation in 5 sections, in the first we will give you an overview about Android Auto, after that we are going to explain how it works. In the third section we are going to explain how to build an app for Auto and some </a:t>
             </a:r>
             <a:r>
               <a:rPr lang="en-US" baseline="0" dirty="0" err="1" smtClean="0"/>
-              <a:t>bluethoot</a:t>
+              <a:t>resterictions</a:t>
             </a:r>
             <a:r>
               <a:rPr lang="en-US" baseline="0" dirty="0" smtClean="0"/>
-              <a:t>.</a:t>
-            </a:r>
-          </a:p>
-          <a:p>
-            <a:r>
-              <a:rPr lang="en-US" baseline="0" dirty="0" smtClean="0"/>
-              <a:t>We have a lot of options to start a voice command, for example if we use the “OK Google”, we don’t need to touch the screen, and keep the eyes on the road at the same time we are doing something else.</a:t>
-            </a:r>
-          </a:p>
-          <a:p>
-            <a:r>
-              <a:rPr lang="en-US" baseline="0" dirty="0" smtClean="0"/>
-              <a:t>A example to set the destination we can say “OK Google, set directions to …” and we say the address.</a:t>
-            </a:r>
-          </a:p>
-          <a:p>
-            <a:r>
-              <a:rPr lang="en-US" baseline="0" dirty="0" smtClean="0"/>
-              <a:t>We can also ask for a </a:t>
-            </a:r>
-            <a:r>
-              <a:rPr lang="en-US" sz="1200" b="0" i="0" kern="1200" dirty="0" smtClean="0">
-                <a:solidFill>
-                  <a:schemeClr val="tx1"/>
-                </a:solidFill>
-                <a:effectLst/>
-                <a:latin typeface="Arial" pitchFamily="34" charset="0"/>
-                <a:ea typeface="+mn-ea"/>
-                <a:cs typeface="+mn-cs"/>
-              </a:rPr>
-              <a:t>specific</a:t>
-            </a:r>
-            <a:r>
-              <a:rPr lang="en-US" baseline="0" dirty="0" smtClean="0"/>
-              <a:t> song in a </a:t>
-            </a:r>
-            <a:r>
-              <a:rPr lang="en-US" sz="1200" b="0" i="0" kern="1200" dirty="0" smtClean="0">
-                <a:solidFill>
-                  <a:schemeClr val="tx1"/>
-                </a:solidFill>
-                <a:effectLst/>
-                <a:latin typeface="Arial" pitchFamily="34" charset="0"/>
-                <a:ea typeface="+mn-ea"/>
-                <a:cs typeface="+mn-cs"/>
-              </a:rPr>
-              <a:t>specific</a:t>
-            </a:r>
-            <a:r>
-              <a:rPr lang="en-US" baseline="0" dirty="0" smtClean="0"/>
-              <a:t> app</a:t>
-            </a:r>
-          </a:p>
-          <a:p>
-            <a:r>
-              <a:rPr lang="en-US" baseline="0" dirty="0" smtClean="0"/>
-              <a:t>Basically, We can use every OK Google command available for android system</a:t>
-            </a:r>
-          </a:p>
-          <a:p>
+              <a:t> associated in the building process. In the forth section we will present some car and aftermarket displays, that have already implemented Android Auto, and also some countries which the application is available. Finally we are going to talk about Embedded Android Auto, which was presented in google I/O 2017</a:t>
+            </a:r>
             <a:endParaRPr lang="en-US" dirty="0"/>
           </a:p>
         </p:txBody>
@@ -1074,7 +1245,7 @@
             <a:fld id="{1B06CD8F-B7ED-4A05-9FB1-A01CC0EF02CC}" type="slidenum">
               <a:rPr lang="fr-FR" smtClean="0"/>
               <a:pPr/>
-              <a:t>8</a:t>
+              <a:t>2</a:t>
             </a:fld>
             <a:endParaRPr lang="fr-FR" dirty="0"/>
           </a:p>
@@ -1083,7 +1254,7 @@
     </p:spTree>
     <p:extLst>
       <p:ext uri="{BB962C8B-B14F-4D97-AF65-F5344CB8AC3E}">
-        <p14:creationId xmlns:p14="http://schemas.microsoft.com/office/powerpoint/2010/main" val="4291574160"/>
+        <p14:creationId xmlns:p14="http://schemas.microsoft.com/office/powerpoint/2010/main" val="3043622959"/>
       </p:ext>
     </p:extLst>
   </p:cSld>
@@ -1139,19 +1310,59 @@
           <a:p>
             <a:r>
               <a:rPr lang="en-US" dirty="0" smtClean="0"/>
-              <a:t>Here is shown the phone screen and the car dash screen,</a:t>
+              <a:t>Need to be android 5.0 plus</a:t>
+            </a:r>
+          </a:p>
+          <a:p>
+            <a:r>
+              <a:rPr lang="en-US" dirty="0" smtClean="0"/>
+              <a:t>5 panels -&gt; navigation,</a:t>
             </a:r>
             <a:r>
               <a:rPr lang="en-US" baseline="0" dirty="0" smtClean="0"/>
-              <a:t> and the blue markers show the panel with 5 or 4 buttons</a:t>
+              <a:t> phone log, home, media, car diagnosis</a:t>
             </a:r>
           </a:p>
           <a:p>
             <a:r>
               <a:rPr lang="en-US" baseline="0" dirty="0" smtClean="0"/>
-              <a:t>For car diagnosis the app called Torque is the one that is used</a:t>
-            </a:r>
-            <a:endParaRPr lang="en-US" dirty="0"/>
+              <a:t>Important information, like a message received, from </a:t>
+            </a:r>
+            <a:r>
+              <a:rPr lang="en-US" baseline="0" dirty="0" err="1" smtClean="0"/>
+              <a:t>whatsupp</a:t>
+            </a:r>
+            <a:r>
+              <a:rPr lang="en-US" baseline="0" dirty="0" smtClean="0"/>
+              <a:t>, </a:t>
+            </a:r>
+            <a:r>
+              <a:rPr lang="en-US" baseline="0" dirty="0" err="1" smtClean="0"/>
+              <a:t>facebook</a:t>
+            </a:r>
+            <a:r>
+              <a:rPr lang="en-US" baseline="0" dirty="0" smtClean="0"/>
+              <a:t> </a:t>
+            </a:r>
+            <a:r>
+              <a:rPr lang="en-US" baseline="0" dirty="0" err="1" smtClean="0"/>
+              <a:t>messeger</a:t>
+            </a:r>
+            <a:r>
+              <a:rPr lang="en-US" baseline="0" dirty="0" smtClean="0"/>
+              <a:t> or </a:t>
+            </a:r>
+            <a:r>
+              <a:rPr lang="en-US" baseline="0" dirty="0" smtClean="0"/>
+              <a:t>hangouts</a:t>
+            </a:r>
+          </a:p>
+          <a:p>
+            <a:r>
+              <a:rPr lang="en-US" baseline="0" dirty="0" smtClean="0"/>
+              <a:t>A phone call incoming</a:t>
+            </a:r>
+            <a:endParaRPr lang="en-US" dirty="0" smtClean="0"/>
           </a:p>
         </p:txBody>
       </p:sp>
@@ -1173,7 +1384,7 @@
             <a:fld id="{1B06CD8F-B7ED-4A05-9FB1-A01CC0EF02CC}" type="slidenum">
               <a:rPr lang="fr-FR" smtClean="0"/>
               <a:pPr/>
-              <a:t>9</a:t>
+              <a:t>7</a:t>
             </a:fld>
             <a:endParaRPr lang="fr-FR" dirty="0"/>
           </a:p>
@@ -1182,7 +1393,7 @@
     </p:spTree>
     <p:extLst>
       <p:ext uri="{BB962C8B-B14F-4D97-AF65-F5344CB8AC3E}">
-        <p14:creationId xmlns:p14="http://schemas.microsoft.com/office/powerpoint/2010/main" val="3316341565"/>
+        <p14:creationId xmlns:p14="http://schemas.microsoft.com/office/powerpoint/2010/main" val="1564263606"/>
       </p:ext>
     </p:extLst>
   </p:cSld>
@@ -1238,16 +1449,78 @@
           <a:p>
             <a:r>
               <a:rPr lang="en-US" dirty="0" smtClean="0"/>
-              <a:t>Here</a:t>
+              <a:t>Like said before, the car sound system is connected</a:t>
             </a:r>
             <a:r>
               <a:rPr lang="en-US" baseline="0" dirty="0" smtClean="0"/>
-              <a:t> is shown some examples of the home menu, where we see the relevant information, in the case of the phone we see the current destination, the actual music and a received message, in the car dash is shown a received message, a coming appointment and the current </a:t>
+              <a:t> via </a:t>
             </a:r>
             <a:r>
               <a:rPr lang="en-US" baseline="0" dirty="0" err="1" smtClean="0"/>
-              <a:t>wheather</a:t>
-            </a:r>
+              <a:t>bluethoot</a:t>
+            </a:r>
+            <a:r>
+              <a:rPr lang="en-US" baseline="0" dirty="0" smtClean="0"/>
+              <a:t>.</a:t>
+            </a:r>
+          </a:p>
+          <a:p>
+            <a:r>
+              <a:rPr lang="en-US" baseline="0" dirty="0" smtClean="0"/>
+              <a:t>We have a lot of options to start a voice command, for example if we use the “OK Google”, we don’t need to touch the screen, and keep the eyes on the road at the same time we are doing something else.</a:t>
+            </a:r>
+          </a:p>
+          <a:p>
+            <a:r>
+              <a:rPr lang="en-US" baseline="0" dirty="0" smtClean="0"/>
+              <a:t>A example to set the destination we can say “OK Google, set directions to …” and we say the address.</a:t>
+            </a:r>
+          </a:p>
+          <a:p>
+            <a:r>
+              <a:rPr lang="en-US" baseline="0" dirty="0" smtClean="0"/>
+              <a:t>We can also ask for a </a:t>
+            </a:r>
+            <a:r>
+              <a:rPr lang="en-US" sz="1200" b="0" i="0" kern="1200" dirty="0" smtClean="0">
+                <a:solidFill>
+                  <a:schemeClr val="tx1"/>
+                </a:solidFill>
+                <a:effectLst/>
+                <a:latin typeface="Arial" pitchFamily="34" charset="0"/>
+                <a:ea typeface="+mn-ea"/>
+                <a:cs typeface="+mn-cs"/>
+              </a:rPr>
+              <a:t>specific</a:t>
+            </a:r>
+            <a:r>
+              <a:rPr lang="en-US" baseline="0" dirty="0" smtClean="0"/>
+              <a:t> song in a </a:t>
+            </a:r>
+            <a:r>
+              <a:rPr lang="en-US" sz="1200" b="0" i="0" kern="1200" dirty="0" smtClean="0">
+                <a:solidFill>
+                  <a:schemeClr val="tx1"/>
+                </a:solidFill>
+                <a:effectLst/>
+                <a:latin typeface="Arial" pitchFamily="34" charset="0"/>
+                <a:ea typeface="+mn-ea"/>
+                <a:cs typeface="+mn-cs"/>
+              </a:rPr>
+              <a:t>specific</a:t>
+            </a:r>
+            <a:r>
+              <a:rPr lang="en-US" baseline="0" dirty="0" smtClean="0"/>
+              <a:t> app</a:t>
+            </a:r>
+          </a:p>
+          <a:p>
+            <a:r>
+              <a:rPr lang="en-US" baseline="0" dirty="0" smtClean="0"/>
+              <a:t>Basically, We can use every OK Google command available for android system</a:t>
+            </a:r>
+          </a:p>
+          <a:p>
             <a:endParaRPr lang="en-US" dirty="0"/>
           </a:p>
         </p:txBody>
@@ -1270,7 +1543,7 @@
             <a:fld id="{1B06CD8F-B7ED-4A05-9FB1-A01CC0EF02CC}" type="slidenum">
               <a:rPr lang="fr-FR" smtClean="0"/>
               <a:pPr/>
-              <a:t>10</a:t>
+              <a:t>8</a:t>
             </a:fld>
             <a:endParaRPr lang="fr-FR" dirty="0"/>
           </a:p>
@@ -1279,7 +1552,7 @@
     </p:spTree>
     <p:extLst>
       <p:ext uri="{BB962C8B-B14F-4D97-AF65-F5344CB8AC3E}">
-        <p14:creationId xmlns:p14="http://schemas.microsoft.com/office/powerpoint/2010/main" val="1596670375"/>
+        <p14:creationId xmlns:p14="http://schemas.microsoft.com/office/powerpoint/2010/main" val="4291574160"/>
       </p:ext>
     </p:extLst>
   </p:cSld>
@@ -1334,12 +1607,20 @@
           <a:lstStyle/>
           <a:p>
             <a:r>
-              <a:rPr lang="en-GB" dirty="0" smtClean="0"/>
-              <a:t>https://developer.android.com/training/auto/start/index.html#dev-project</a:t>
-            </a:r>
-          </a:p>
-          <a:p>
-            <a:endParaRPr lang="en-GB" dirty="0"/>
+              <a:rPr lang="en-US" dirty="0" smtClean="0"/>
+              <a:t>Here is shown the phone screen and the car dash screen,</a:t>
+            </a:r>
+            <a:r>
+              <a:rPr lang="en-US" baseline="0" dirty="0" smtClean="0"/>
+              <a:t> and the blue markers show the panel with 5 or 4 buttons</a:t>
+            </a:r>
+          </a:p>
+          <a:p>
+            <a:r>
+              <a:rPr lang="en-US" baseline="0" dirty="0" smtClean="0"/>
+              <a:t>For car diagnosis the app called Torque is the one that is used</a:t>
+            </a:r>
+            <a:endParaRPr lang="en-US" dirty="0"/>
           </a:p>
         </p:txBody>
       </p:sp>
@@ -1358,18 +1639,19 @@
           <a:bodyPr/>
           <a:lstStyle/>
           <a:p>
-            <a:fld id="{A5FE6474-0819-4CAC-A677-1ACC1221F957}" type="slidenum">
-              <a:rPr lang="en-GB" smtClean="0"/>
-              <a:t>13</a:t>
+            <a:fld id="{1B06CD8F-B7ED-4A05-9FB1-A01CC0EF02CC}" type="slidenum">
+              <a:rPr lang="fr-FR" smtClean="0"/>
+              <a:pPr/>
+              <a:t>9</a:t>
             </a:fld>
-            <a:endParaRPr lang="en-GB"/>
+            <a:endParaRPr lang="fr-FR" dirty="0"/>
           </a:p>
         </p:txBody>
       </p:sp>
     </p:spTree>
     <p:extLst>
       <p:ext uri="{BB962C8B-B14F-4D97-AF65-F5344CB8AC3E}">
-        <p14:creationId xmlns:p14="http://schemas.microsoft.com/office/powerpoint/2010/main" val="4288258623"/>
+        <p14:creationId xmlns:p14="http://schemas.microsoft.com/office/powerpoint/2010/main" val="3316341565"/>
       </p:ext>
     </p:extLst>
   </p:cSld>
@@ -1423,27 +1705,19 @@
           <a:bodyPr/>
           <a:lstStyle/>
           <a:p>
-            <a:pPr marL="0" marR="0" lvl="0" indent="0" algn="l" defTabSz="914400" rtl="0" eaLnBrk="1" fontAlgn="auto" latinLnBrk="0" hangingPunct="1">
-              <a:lnSpc>
-                <a:spcPct val="100000"/>
-              </a:lnSpc>
-              <a:spcBef>
-                <a:spcPts val="0"/>
-              </a:spcBef>
-              <a:spcAft>
-                <a:spcPts val="0"/>
-              </a:spcAft>
-              <a:buClrTx/>
-              <a:buSzTx/>
-              <a:buFontTx/>
-              <a:buNone/>
-              <a:tabLst/>
-              <a:defRPr/>
-            </a:pPr>
             <a:r>
               <a:rPr lang="en-US" dirty="0" smtClean="0"/>
-              <a:t>Android Auto can contact your service to do the following:</a:t>
-            </a:r>
+              <a:t>Here</a:t>
+            </a:r>
+            <a:r>
+              <a:rPr lang="en-US" baseline="0" dirty="0" smtClean="0"/>
+              <a:t> is shown some examples of the home menu, where we see the relevant information, in the case of the phone we see the current destination, the actual music and a received message, in the car dash is shown a received message, a coming appointment and the current </a:t>
+            </a:r>
+            <a:r>
+              <a:rPr lang="en-US" baseline="0" dirty="0" err="1" smtClean="0"/>
+              <a:t>wheather</a:t>
+            </a:r>
+            <a:endParaRPr lang="en-US" dirty="0"/>
           </a:p>
         </p:txBody>
       </p:sp>
@@ -1462,18 +1736,19 @@
           <a:bodyPr/>
           <a:lstStyle/>
           <a:p>
-            <a:fld id="{A5FE6474-0819-4CAC-A677-1ACC1221F957}" type="slidenum">
-              <a:rPr lang="en-GB" smtClean="0"/>
-              <a:t>14</a:t>
+            <a:fld id="{1B06CD8F-B7ED-4A05-9FB1-A01CC0EF02CC}" type="slidenum">
+              <a:rPr lang="fr-FR" smtClean="0"/>
+              <a:pPr/>
+              <a:t>10</a:t>
             </a:fld>
-            <a:endParaRPr lang="en-GB"/>
+            <a:endParaRPr lang="fr-FR" dirty="0"/>
           </a:p>
         </p:txBody>
       </p:sp>
     </p:spTree>
     <p:extLst>
       <p:ext uri="{BB962C8B-B14F-4D97-AF65-F5344CB8AC3E}">
-        <p14:creationId xmlns:p14="http://schemas.microsoft.com/office/powerpoint/2010/main" val="1749210354"/>
+        <p14:creationId xmlns:p14="http://schemas.microsoft.com/office/powerpoint/2010/main" val="1596670375"/>
       </p:ext>
     </p:extLst>
   </p:cSld>
@@ -1527,7 +1802,7 @@
           <a:bodyPr/>
           <a:lstStyle/>
           <a:p>
-            <a:endParaRPr lang="en-GB" dirty="0"/>
+            <a:endParaRPr lang="en-US"/>
           </a:p>
         </p:txBody>
       </p:sp>
@@ -1546,18 +1821,19 @@
           <a:bodyPr/>
           <a:lstStyle/>
           <a:p>
-            <a:fld id="{A5FE6474-0819-4CAC-A677-1ACC1221F957}" type="slidenum">
-              <a:rPr lang="en-GB" smtClean="0"/>
-              <a:t>16</a:t>
+            <a:fld id="{1B06CD8F-B7ED-4A05-9FB1-A01CC0EF02CC}" type="slidenum">
+              <a:rPr lang="fr-FR" smtClean="0"/>
+              <a:pPr/>
+              <a:t>11</a:t>
             </a:fld>
-            <a:endParaRPr lang="en-GB"/>
+            <a:endParaRPr lang="fr-FR" dirty="0"/>
           </a:p>
         </p:txBody>
       </p:sp>
     </p:spTree>
     <p:extLst>
       <p:ext uri="{BB962C8B-B14F-4D97-AF65-F5344CB8AC3E}">
-        <p14:creationId xmlns:p14="http://schemas.microsoft.com/office/powerpoint/2010/main" val="3694532524"/>
+        <p14:creationId xmlns:p14="http://schemas.microsoft.com/office/powerpoint/2010/main" val="4260471285"/>
       </p:ext>
     </p:extLst>
   </p:cSld>
@@ -1613,8 +1889,10 @@
           <a:p>
             <a:r>
               <a:rPr lang="en-GB" dirty="0" smtClean="0"/>
-              <a:t>https://developer.android.com/distribute/best-practices/launch/distribute-auto.html#how_to_participate</a:t>
-            </a:r>
+              <a:t>https://developer.android.com/training/auto/start/index.html#dev-project</a:t>
+            </a:r>
+          </a:p>
+          <a:p>
             <a:endParaRPr lang="en-GB" dirty="0"/>
           </a:p>
         </p:txBody>
@@ -1636,7 +1914,7 @@
           <a:p>
             <a:fld id="{A5FE6474-0819-4CAC-A677-1ACC1221F957}" type="slidenum">
               <a:rPr lang="en-GB" smtClean="0"/>
-              <a:t>18</a:t>
+              <a:t>13</a:t>
             </a:fld>
             <a:endParaRPr lang="en-GB"/>
           </a:p>
@@ -1645,7 +1923,7 @@
     </p:spTree>
     <p:extLst>
       <p:ext uri="{BB962C8B-B14F-4D97-AF65-F5344CB8AC3E}">
-        <p14:creationId xmlns:p14="http://schemas.microsoft.com/office/powerpoint/2010/main" val="3504536707"/>
+        <p14:creationId xmlns:p14="http://schemas.microsoft.com/office/powerpoint/2010/main" val="4288258623"/>
       </p:ext>
     </p:extLst>
   </p:cSld>
@@ -1699,7 +1977,27 @@
           <a:bodyPr/>
           <a:lstStyle/>
           <a:p>
-            <a:endParaRPr lang="en-US" dirty="0"/>
+            <a:pPr marL="0" marR="0" lvl="0" indent="0" algn="l" defTabSz="914400" rtl="0" eaLnBrk="1" fontAlgn="auto" latinLnBrk="0" hangingPunct="1">
+              <a:lnSpc>
+                <a:spcPct val="100000"/>
+              </a:lnSpc>
+              <a:spcBef>
+                <a:spcPts val="0"/>
+              </a:spcBef>
+              <a:spcAft>
+                <a:spcPts val="0"/>
+              </a:spcAft>
+              <a:buClrTx/>
+              <a:buSzTx/>
+              <a:buFontTx/>
+              <a:buNone/>
+              <a:tabLst/>
+              <a:defRPr/>
+            </a:pPr>
+            <a:r>
+              <a:rPr lang="en-US" dirty="0" smtClean="0"/>
+              <a:t>Android Auto can contact your service to do the following:</a:t>
+            </a:r>
           </a:p>
         </p:txBody>
       </p:sp>
@@ -1718,19 +2016,18 @@
           <a:bodyPr/>
           <a:lstStyle/>
           <a:p>
-            <a:fld id="{1B06CD8F-B7ED-4A05-9FB1-A01CC0EF02CC}" type="slidenum">
-              <a:rPr lang="fr-FR" smtClean="0"/>
-              <a:pPr/>
-              <a:t>22</a:t>
+            <a:fld id="{A5FE6474-0819-4CAC-A677-1ACC1221F957}" type="slidenum">
+              <a:rPr lang="en-GB" smtClean="0"/>
+              <a:t>14</a:t>
             </a:fld>
-            <a:endParaRPr lang="fr-FR" dirty="0"/>
+            <a:endParaRPr lang="en-GB"/>
           </a:p>
         </p:txBody>
       </p:sp>
     </p:spTree>
     <p:extLst>
       <p:ext uri="{BB962C8B-B14F-4D97-AF65-F5344CB8AC3E}">
-        <p14:creationId xmlns:p14="http://schemas.microsoft.com/office/powerpoint/2010/main" val="991357884"/>
+        <p14:creationId xmlns:p14="http://schemas.microsoft.com/office/powerpoint/2010/main" val="1749210354"/>
       </p:ext>
     </p:extLst>
   </p:cSld>
@@ -12616,7 +12913,7 @@
           <p:nvPr/>
         </p:nvPicPr>
         <p:blipFill>
-          <a:blip r:embed="rId2">
+          <a:blip r:embed="rId3">
             <a:extLst>
               <a:ext uri="{28A0092B-C50C-407E-A947-70E740481C1C}">
                 <a14:useLocalDpi xmlns:a14="http://schemas.microsoft.com/office/drawing/2010/main" val="0"/>
@@ -12928,12 +13225,12 @@
       </p:grpSpPr>
       <p:sp>
         <p:nvSpPr>
-          <p:cNvPr id="4" name="Date Placeholder 3"/>
-          <p:cNvSpPr>
-            <a:spLocks noGrp="1"/>
-          </p:cNvSpPr>
-          <p:nvPr>
-            <p:ph type="dt" sz="half" idx="10"/>
+          <p:cNvPr id="5" name="Footer Placeholder 4"/>
+          <p:cNvSpPr>
+            <a:spLocks noGrp="1"/>
+          </p:cNvSpPr>
+          <p:nvPr>
+            <p:ph type="ftr" sz="quarter" idx="11"/>
           </p:nvPr>
         </p:nvSpPr>
         <p:spPr/>
@@ -12942,31 +13239,8 @@
           <a:lstStyle/>
           <a:p>
             <a:r>
-              <a:rPr lang="fr-FR" noProof="0" smtClean="0"/>
-              <a:t>Date</a:t>
-            </a:r>
-            <a:endParaRPr lang="en-US" noProof="0" dirty="0"/>
-          </a:p>
-        </p:txBody>
-      </p:sp>
-      <p:sp>
-        <p:nvSpPr>
-          <p:cNvPr id="5" name="Footer Placeholder 4"/>
-          <p:cNvSpPr>
-            <a:spLocks noGrp="1"/>
-          </p:cNvSpPr>
-          <p:nvPr>
-            <p:ph type="ftr" sz="quarter" idx="11"/>
-          </p:nvPr>
-        </p:nvSpPr>
-        <p:spPr/>
-        <p:txBody>
-          <a:bodyPr/>
-          <a:lstStyle/>
-          <a:p>
-            <a:r>
               <a:rPr lang="en-US" noProof="0" smtClean="0"/>
-              <a:t>Presentation title</a:t>
+              <a:t>Android Auto</a:t>
             </a:r>
             <a:endParaRPr lang="en-US" noProof="0" dirty="0"/>
           </a:p>
@@ -13052,7 +13326,7 @@
           <p:nvPr/>
         </p:nvPicPr>
         <p:blipFill>
-          <a:blip r:embed="rId2">
+          <a:blip r:embed="rId3">
             <a:extLst>
               <a:ext uri="{28A0092B-C50C-407E-A947-70E740481C1C}">
                 <a14:useLocalDpi xmlns:a14="http://schemas.microsoft.com/office/drawing/2010/main" val="0"/>
@@ -13565,7 +13839,6 @@
               <a:rPr lang="en-US" dirty="0" smtClean="0"/>
               <a:t>higher</a:t>
             </a:r>
-            <a:endParaRPr lang="en-US" dirty="0" smtClean="0"/>
           </a:p>
           <a:p>
             <a:pPr marL="214313" indent="-214313">
@@ -13675,7 +13948,6 @@
               <a:rPr lang="en-US" dirty="0" smtClean="0"/>
               <a:t>file</a:t>
             </a:r>
-            <a:endParaRPr lang="en-US" dirty="0" smtClean="0"/>
           </a:p>
           <a:p>
             <a:pPr marL="214313" indent="-214313">
@@ -13729,7 +14001,6 @@
               <a:rPr lang="en-US" dirty="0" smtClean="0"/>
               <a:t>created</a:t>
             </a:r>
-            <a:endParaRPr lang="en-US" dirty="0" smtClean="0"/>
           </a:p>
           <a:p>
             <a:pPr marL="214313" indent="-214313">
@@ -14012,13 +14283,8 @@
             </a:r>
             <a:r>
               <a:rPr lang="en-US" dirty="0" smtClean="0"/>
-              <a:t> </a:t>
-            </a:r>
-            <a:r>
-              <a:rPr lang="en-US" dirty="0" smtClean="0"/>
-              <a:t>class</a:t>
-            </a:r>
-            <a:endParaRPr lang="en-US" dirty="0" smtClean="0"/>
+              <a:t> class</a:t>
+            </a:r>
           </a:p>
           <a:p>
             <a:pPr marL="214313" indent="-214313">
@@ -14160,7 +14426,6 @@
               <a:rPr lang="en-US" dirty="0" smtClean="0"/>
               <a:t>requests</a:t>
             </a:r>
-            <a:endParaRPr lang="en-US" dirty="0" smtClean="0"/>
           </a:p>
           <a:p>
             <a:pPr marL="214313" indent="-214313">
@@ -15264,7 +15529,6 @@
               <a:rPr lang="en-US" dirty="0" smtClean="0"/>
               <a:t>apps</a:t>
             </a:r>
-            <a:endParaRPr lang="en-US" dirty="0" smtClean="0"/>
           </a:p>
           <a:p>
             <a:r>
@@ -15361,7 +15625,6 @@
               <a:rPr lang="en-US" dirty="0" smtClean="0"/>
               <a:t>hosts</a:t>
             </a:r>
-            <a:endParaRPr lang="en-US" dirty="0" smtClean="0"/>
           </a:p>
           <a:p>
             <a:pPr marL="214313" indent="-214313">
@@ -15991,20 +16254,16 @@
           <a:lstStyle/>
           <a:p>
             <a:r>
-              <a:rPr lang="pt-PT" dirty="0" err="1"/>
+              <a:rPr lang="en-US" dirty="0" smtClean="0"/>
               <a:t>Distribute</a:t>
             </a:r>
             <a:r>
+              <a:rPr lang="pt-PT" dirty="0" smtClean="0"/>
+              <a:t> </a:t>
+            </a:r>
+            <a:r>
               <a:rPr lang="pt-PT" dirty="0"/>
-              <a:t> to </a:t>
-            </a:r>
-            <a:r>
-              <a:rPr lang="pt-PT" dirty="0" err="1"/>
-              <a:t>Android</a:t>
-            </a:r>
-            <a:r>
-              <a:rPr lang="pt-PT" dirty="0"/>
-              <a:t> Auto</a:t>
+              <a:t>to Android Auto</a:t>
             </a:r>
             <a:r>
               <a:rPr lang="pt-PT" b="0" dirty="0"/>
@@ -16168,7 +16427,6 @@
               <a:rPr lang="en-US" dirty="0" smtClean="0"/>
               <a:t>apps</a:t>
             </a:r>
-            <a:endParaRPr lang="en-US" dirty="0" smtClean="0"/>
           </a:p>
           <a:p>
             <a:endParaRPr lang="en-US" dirty="0"/>
@@ -17110,13 +17368,8 @@
             </a:pPr>
             <a:r>
               <a:rPr lang="en-US" dirty="0" smtClean="0"/>
-              <a:t>There are 37 brands of cars that have already implemented Android auto in some models, such as: Audi, Chevrolet, Lamborghini and </a:t>
-            </a:r>
-            <a:r>
-              <a:rPr lang="en-US" dirty="0" smtClean="0"/>
-              <a:t>Volvo</a:t>
-            </a:r>
-            <a:endParaRPr lang="en-US" dirty="0" smtClean="0"/>
+              <a:t>There are 37 brands of cars that have already implemented Android auto in some models, such as: Audi, Chevrolet, Lamborghini and Volvo</a:t>
+            </a:r>
           </a:p>
           <a:p>
             <a:pPr marL="171450" indent="-171450">
@@ -17139,11 +17392,7 @@
             </a:pPr>
             <a:r>
               <a:rPr lang="en-US" dirty="0" smtClean="0"/>
-              <a:t>In the near future the Android Auto will be implemented in 16 more </a:t>
-            </a:r>
-            <a:r>
-              <a:rPr lang="en-US" dirty="0" smtClean="0"/>
-              <a:t>brands</a:t>
+              <a:t>In the near future the Android Auto will be implemented in 16 more brands</a:t>
             </a:r>
             <a:endParaRPr lang="en-US" dirty="0"/>
           </a:p>
@@ -17248,21 +17497,8 @@
             </a:pPr>
             <a:r>
               <a:rPr lang="en-US" dirty="0" smtClean="0"/>
-              <a:t>Android Auto is only </a:t>
-            </a:r>
-            <a:r>
-              <a:rPr lang="en-US" dirty="0" smtClean="0"/>
-              <a:t>available </a:t>
-            </a:r>
-            <a:r>
-              <a:rPr lang="en-US" dirty="0" smtClean="0"/>
-              <a:t>in 31 </a:t>
-            </a:r>
-            <a:r>
-              <a:rPr lang="en-US" dirty="0" smtClean="0"/>
-              <a:t>countries</a:t>
-            </a:r>
-            <a:endParaRPr lang="en-US" dirty="0" smtClean="0"/>
+              <a:t>Android Auto is only available in 31 countries</a:t>
+            </a:r>
           </a:p>
           <a:p>
             <a:pPr marL="171450" indent="-171450">
@@ -17299,19 +17535,7 @@
             </a:pPr>
             <a:r>
               <a:rPr lang="en-US" dirty="0" smtClean="0"/>
-              <a:t>For Portugal, there isn’t a official release date that, however the </a:t>
-            </a:r>
-            <a:r>
-              <a:rPr lang="en-US" dirty="0" smtClean="0"/>
-              <a:t>APK </a:t>
-            </a:r>
-            <a:r>
-              <a:rPr lang="en-US" dirty="0" smtClean="0"/>
-              <a:t>can be downloaded, and use some </a:t>
-            </a:r>
-            <a:r>
-              <a:rPr lang="en-US" dirty="0" smtClean="0"/>
-              <a:t>functionalities</a:t>
+              <a:t>For Portugal, there isn’t a official release date that, however the APK can be downloaded, and use some functionalities</a:t>
             </a:r>
             <a:endParaRPr lang="en-US" dirty="0"/>
           </a:p>
@@ -17592,13 +17816,8 @@
             <a:pPr marL="280988" lvl="1" indent="-171450" algn="l"/>
             <a:r>
               <a:rPr lang="en-US" dirty="0" smtClean="0"/>
-              <a:t>Can control various sensors and </a:t>
-            </a:r>
-            <a:r>
-              <a:rPr lang="en-US" dirty="0" smtClean="0"/>
-              <a:t>switches</a:t>
-            </a:r>
-            <a:endParaRPr lang="en-US" dirty="0" smtClean="0"/>
+              <a:t>Can control various sensors and switches</a:t>
+            </a:r>
           </a:p>
           <a:p>
             <a:pPr lvl="1" indent="0" algn="l">
@@ -17791,13 +18010,8 @@
             </a:pPr>
             <a:r>
               <a:rPr lang="en-US" dirty="0" smtClean="0"/>
-              <a:t>Similar to Android </a:t>
-            </a:r>
-            <a:r>
-              <a:rPr lang="en-US" dirty="0" smtClean="0"/>
-              <a:t>Auto</a:t>
-            </a:r>
-            <a:endParaRPr lang="en-US" dirty="0" smtClean="0"/>
+              <a:t>Similar to Android Auto</a:t>
+            </a:r>
           </a:p>
           <a:p>
             <a:pPr marL="171450" indent="-171450" algn="l">
@@ -17827,13 +18041,8 @@
             </a:pPr>
             <a:r>
               <a:rPr lang="en-US" dirty="0" smtClean="0"/>
-              <a:t>UI elements and built-in apps differ from OEM to </a:t>
-            </a:r>
-            <a:r>
-              <a:rPr lang="en-US" dirty="0" smtClean="0"/>
-              <a:t>OEM</a:t>
-            </a:r>
-            <a:endParaRPr lang="en-US" dirty="0" smtClean="0"/>
+              <a:t>UI elements and built-in apps differ from OEM to OEM</a:t>
+            </a:r>
           </a:p>
           <a:p>
             <a:pPr marL="171450" indent="-171450" algn="l">
@@ -17884,11 +18093,7 @@
             <a:pPr marL="280988" lvl="1" indent="-171450" algn="l"/>
             <a:r>
               <a:rPr lang="en-US" dirty="0" smtClean="0"/>
-              <a:t>Different display </a:t>
-            </a:r>
-            <a:r>
-              <a:rPr lang="en-US" dirty="0" smtClean="0"/>
-              <a:t>types</a:t>
+              <a:t>Different display types</a:t>
             </a:r>
             <a:endParaRPr lang="en-US" dirty="0"/>
           </a:p>
@@ -18571,7 +18776,6 @@
               <a:rPr lang="en-US" dirty="0" smtClean="0"/>
               <a:t>2015</a:t>
             </a:r>
-            <a:endParaRPr lang="en-US" dirty="0" smtClean="0"/>
           </a:p>
           <a:p>
             <a:pPr marL="171450" indent="-171450" algn="l">
@@ -18587,17 +18791,8 @@
             </a:pPr>
             <a:r>
               <a:rPr lang="en-US" dirty="0" smtClean="0"/>
-              <a:t>Android Application for smartphone that allows a connection with the car using a </a:t>
-            </a:r>
-            <a:r>
-              <a:rPr lang="en-US" dirty="0" smtClean="0"/>
-              <a:t>USB</a:t>
-            </a:r>
-            <a:r>
-              <a:rPr lang="en-US" dirty="0" smtClean="0"/>
-              <a:t> cable</a:t>
-            </a:r>
-            <a:endParaRPr lang="en-US" dirty="0" smtClean="0"/>
+              <a:t>Android Application for smartphone that allows a connection with the car using a USB cable</a:t>
+            </a:r>
           </a:p>
           <a:p>
             <a:pPr marL="171450" indent="-171450" algn="l">
@@ -18613,13 +18808,8 @@
             </a:pPr>
             <a:r>
               <a:rPr lang="en-US" dirty="0" smtClean="0"/>
-              <a:t>Android Auto connects via Bluetooth, in order to connect with the car sound </a:t>
-            </a:r>
-            <a:r>
-              <a:rPr lang="en-US" dirty="0" smtClean="0"/>
-              <a:t>system</a:t>
-            </a:r>
-            <a:endParaRPr lang="en-US" dirty="0" smtClean="0"/>
+              <a:t>Android Auto connects via Bluetooth, in order to connect with the car sound system</a:t>
+            </a:r>
           </a:p>
           <a:p>
             <a:pPr algn="l"/>
@@ -18675,11 +18865,7 @@
             <a:pPr marL="387450" lvl="4" indent="-171450"/>
             <a:r>
               <a:rPr lang="en-US" dirty="0" smtClean="0"/>
-              <a:t>Similar menu </a:t>
-            </a:r>
-            <a:r>
-              <a:rPr lang="en-US" dirty="0" smtClean="0"/>
-              <a:t>structures</a:t>
+              <a:t>Similar menu structures</a:t>
             </a:r>
             <a:endParaRPr lang="en-US" dirty="0"/>
           </a:p>
@@ -18850,13 +19036,8 @@
             <a:pPr marL="280988" lvl="1" indent="-171450" algn="l"/>
             <a:r>
               <a:rPr lang="en-US" dirty="0" smtClean="0"/>
-              <a:t>Google maps is the more precise and user friendly application for GPS </a:t>
-            </a:r>
-            <a:r>
-              <a:rPr lang="en-US" dirty="0" smtClean="0"/>
-              <a:t>Navigation</a:t>
-            </a:r>
-            <a:endParaRPr lang="en-US" dirty="0" smtClean="0"/>
+              <a:t>Google maps is the more precise and user friendly application for GPS Navigation</a:t>
+            </a:r>
           </a:p>
           <a:p>
             <a:pPr marL="171450" indent="-171450" algn="l">
@@ -18886,11 +19067,7 @@
             <a:pPr marL="280988" lvl="1" indent="-171450" algn="l"/>
             <a:r>
               <a:rPr lang="en-US" dirty="0" smtClean="0"/>
-              <a:t>Speech recognition from Google is more refined, and his able to interpret more </a:t>
-            </a:r>
-            <a:r>
-              <a:rPr lang="en-US" dirty="0" smtClean="0"/>
-              <a:t>commands</a:t>
+              <a:t>Speech recognition from Google is more refined, and his able to interpret more commands</a:t>
             </a:r>
             <a:endParaRPr lang="en-US" dirty="0"/>
           </a:p>
@@ -18919,13 +19096,8 @@
             <a:pPr marL="280988" lvl="1" indent="-171450" algn="l"/>
             <a:r>
               <a:rPr lang="en-US" dirty="0" smtClean="0"/>
-              <a:t>Android Auto has the ability to work in the </a:t>
-            </a:r>
-            <a:r>
-              <a:rPr lang="en-US" dirty="0" smtClean="0"/>
-              <a:t>phone</a:t>
-            </a:r>
-            <a:endParaRPr lang="en-US" dirty="0" smtClean="0"/>
+              <a:t>Android Auto has the ability to work in the phone</a:t>
+            </a:r>
           </a:p>
           <a:p>
             <a:pPr marL="171450" indent="-171450" algn="l">
@@ -19263,13 +19435,8 @@
             </a:pPr>
             <a:r>
               <a:rPr lang="en-US" dirty="0" smtClean="0"/>
-              <a:t>If connected to the car the phone stays </a:t>
-            </a:r>
-            <a:r>
-              <a:rPr lang="en-US" dirty="0" smtClean="0"/>
-              <a:t>unusable</a:t>
-            </a:r>
-            <a:endParaRPr lang="en-US" dirty="0" smtClean="0"/>
+              <a:t>If connected to the car the phone stays unusable</a:t>
+            </a:r>
           </a:p>
           <a:p>
             <a:pPr marL="171450" indent="-171450" algn="l">
@@ -19285,13 +19452,8 @@
             </a:pPr>
             <a:r>
               <a:rPr lang="en-US" dirty="0" smtClean="0"/>
-              <a:t>There are 5 panels available, if connected with the car dash </a:t>
-            </a:r>
-            <a:r>
-              <a:rPr lang="en-US" dirty="0" smtClean="0"/>
-              <a:t>screen</a:t>
-            </a:r>
-            <a:endParaRPr lang="en-US" dirty="0" smtClean="0"/>
+              <a:t>There are 5 panels available, if connected with the car dash screen</a:t>
+            </a:r>
           </a:p>
           <a:p>
             <a:pPr marL="280988" lvl="1" indent="-171450" algn="l"/>
@@ -19311,13 +19473,8 @@
             </a:pPr>
             <a:r>
               <a:rPr lang="en-US" dirty="0" smtClean="0"/>
-              <a:t>Home menu has information such as the weather, current song, current destination and upcoming </a:t>
-            </a:r>
-            <a:r>
-              <a:rPr lang="en-US" dirty="0" smtClean="0"/>
-              <a:t>appointments</a:t>
-            </a:r>
-            <a:endParaRPr lang="en-US" dirty="0" smtClean="0"/>
+              <a:t>Home menu has information such as the weather, current song, current destination and upcoming appointments</a:t>
+            </a:r>
           </a:p>
           <a:p>
             <a:pPr marL="171450" lvl="2" indent="-171450">
@@ -19340,11 +19497,7 @@
             <a:pPr marL="279450" lvl="3" indent="-171450"/>
             <a:r>
               <a:rPr lang="en-US" dirty="0" smtClean="0"/>
-              <a:t>Notifications such as alerts from Email, Facebook or Twitter, will not show in the notifications </a:t>
-            </a:r>
-            <a:r>
-              <a:rPr lang="en-US" dirty="0" smtClean="0"/>
-              <a:t>log</a:t>
+              <a:t>Notifications such as alerts from Email, Facebook or Twitter, will not show in the notifications log</a:t>
             </a:r>
             <a:endParaRPr lang="en-US" dirty="0"/>
           </a:p>
@@ -19598,13 +19751,8 @@
             <a:pPr marL="280988" lvl="1" indent="-171450" algn="l"/>
             <a:r>
               <a:rPr lang="en-US" dirty="0" smtClean="0"/>
-              <a:t>Access to any </a:t>
-            </a:r>
-            <a:r>
-              <a:rPr lang="en-US" dirty="0" smtClean="0"/>
-              <a:t>menu</a:t>
-            </a:r>
-            <a:endParaRPr lang="en-US" dirty="0" smtClean="0"/>
+              <a:t>Access to any menu</a:t>
+            </a:r>
           </a:p>
           <a:p>
             <a:pPr marL="280988" lvl="1" indent="-171450" algn="l"/>
@@ -19651,8 +19799,8 @@
           <a:lstStyle/>
           <a:p>
             <a:r>
-              <a:rPr lang="en-US" noProof="0" smtClean="0"/>
-              <a:t>Presentation title</a:t>
+              <a:rPr lang="en-US" noProof="0" dirty="0" smtClean="0"/>
+              <a:t>Android Auto</a:t>
             </a:r>
             <a:endParaRPr lang="en-US" noProof="0" dirty="0"/>
           </a:p>
@@ -20748,15 +20896,6 @@
 </file>
 
 <file path=customXml/item1.xml><?xml version="1.0" encoding="utf-8"?>
-<?mso-contentType ?>
-<FormTemplates xmlns="http://schemas.microsoft.com/sharepoint/v3/contenttype/forms">
-  <Display>DocumentLibraryForm</Display>
-  <Edit>DocumentLibraryForm</Edit>
-  <New>DocumentLibraryForm</New>
-</FormTemplates>
-</file>
-
-<file path=customXml/item2.xml><?xml version="1.0" encoding="utf-8"?>
 <ct:contentTypeSchema xmlns:ct="http://schemas.microsoft.com/office/2006/metadata/contentType" xmlns:ma="http://schemas.microsoft.com/office/2006/metadata/properties/metaAttributes" ct:_="" ma:_="" ma:contentTypeName="Document" ma:contentTypeID="0x0101001F419E1A6EA81A4789CC2A27D54FE063" ma:contentTypeVersion="2" ma:contentTypeDescription="Create a new document." ma:contentTypeScope="" ma:versionID="6e5cb36ff88c0f99687fc20d43474a84">
   <xsd:schema xmlns:xsd="http://www.w3.org/2001/XMLSchema" xmlns:xs="http://www.w3.org/2001/XMLSchema" xmlns:p="http://schemas.microsoft.com/office/2006/metadata/properties" targetNamespace="http://schemas.microsoft.com/office/2006/metadata/properties" ma:root="true" ma:fieldsID="0d665e38e66d01d06a7f476fcfe73af8">
     <xsd:element name="properties">
@@ -20870,6 +21009,15 @@
 </ct:contentTypeSchema>
 </file>
 
+<file path=customXml/item2.xml><?xml version="1.0" encoding="utf-8"?>
+<?mso-contentType ?>
+<FormTemplates xmlns="http://schemas.microsoft.com/sharepoint/v3/contenttype/forms">
+  <Display>DocumentLibraryForm</Display>
+  <Edit>DocumentLibraryForm</Edit>
+  <New>DocumentLibraryForm</New>
+</FormTemplates>
+</file>
+
 <file path=customXml/item3.xml><?xml version="1.0" encoding="utf-8"?>
 <p:properties xmlns:p="http://schemas.microsoft.com/office/2006/metadata/properties" xmlns:xsi="http://www.w3.org/2001/XMLSchema-instance" xmlns:pc="http://schemas.microsoft.com/office/infopath/2007/PartnerControls">
   <documentManagement/>
@@ -20877,14 +21025,6 @@
 </file>
 
 <file path=customXml/itemProps1.xml><?xml version="1.0" encoding="utf-8"?>
-<ds:datastoreItem xmlns:ds="http://schemas.openxmlformats.org/officeDocument/2006/customXml" ds:itemID="{74695D99-3EAE-4F55-A2B4-F38051B8FE0A}">
-  <ds:schemaRefs>
-    <ds:schemaRef ds:uri="http://schemas.microsoft.com/sharepoint/v3/contenttype/forms"/>
-  </ds:schemaRefs>
-</ds:datastoreItem>
-</file>
-
-<file path=customXml/itemProps2.xml><?xml version="1.0" encoding="utf-8"?>
 <ds:datastoreItem xmlns:ds="http://schemas.openxmlformats.org/officeDocument/2006/customXml" ds:itemID="{71BEF1E5-09DF-46B0-9968-4DC05085673B}">
   <ds:schemaRefs>
     <ds:schemaRef ds:uri="http://schemas.microsoft.com/office/2006/metadata/contentType"/>
@@ -20900,17 +21040,25 @@
 </ds:datastoreItem>
 </file>
 
+<file path=customXml/itemProps2.xml><?xml version="1.0" encoding="utf-8"?>
+<ds:datastoreItem xmlns:ds="http://schemas.openxmlformats.org/officeDocument/2006/customXml" ds:itemID="{74695D99-3EAE-4F55-A2B4-F38051B8FE0A}">
+  <ds:schemaRefs>
+    <ds:schemaRef ds:uri="http://schemas.microsoft.com/sharepoint/v3/contenttype/forms"/>
+  </ds:schemaRefs>
+</ds:datastoreItem>
+</file>
+
 <file path=customXml/itemProps3.xml><?xml version="1.0" encoding="utf-8"?>
 <ds:datastoreItem xmlns:ds="http://schemas.openxmlformats.org/officeDocument/2006/customXml" ds:itemID="{65F64EBE-3065-4A3D-B86E-F21B0406FD66}">
   <ds:schemaRefs>
+    <ds:schemaRef ds:uri="http://purl.org/dc/dcmitype/"/>
     <ds:schemaRef ds:uri="http://www.w3.org/XML/1998/namespace"/>
-    <ds:schemaRef ds:uri="http://schemas.openxmlformats.org/package/2006/metadata/core-properties"/>
-    <ds:schemaRef ds:uri="http://schemas.microsoft.com/office/2006/documentManagement/types"/>
     <ds:schemaRef ds:uri="http://purl.org/dc/elements/1.1/"/>
     <ds:schemaRef ds:uri="http://schemas.microsoft.com/office/infopath/2007/PartnerControls"/>
+    <ds:schemaRef ds:uri="http://purl.org/dc/terms/"/>
+    <ds:schemaRef ds:uri="http://schemas.microsoft.com/office/2006/documentManagement/types"/>
+    <ds:schemaRef ds:uri="http://schemas.openxmlformats.org/package/2006/metadata/core-properties"/>
     <ds:schemaRef ds:uri="http://schemas.microsoft.com/office/2006/metadata/properties"/>
-    <ds:schemaRef ds:uri="http://purl.org/dc/dcmitype/"/>
-    <ds:schemaRef ds:uri="http://purl.org/dc/terms/"/>
   </ds:schemaRefs>
 </ds:datastoreItem>
 </file>
</xml_diff>

<commit_message>
notes in chapter 1 added
</commit_message>
<xml_diff>
--- a/PowerPoint Final/Presentation_Joao_Mauro.pptx
+++ b/PowerPoint Final/Presentation_Joao_Mauro.pptx
@@ -950,7 +950,27 @@
           <a:bodyPr/>
           <a:lstStyle/>
           <a:p>
-            <a:endParaRPr lang="en-GB" dirty="0"/>
+            <a:pPr marL="0" marR="0" lvl="0" indent="0" algn="l" defTabSz="914400" rtl="0" eaLnBrk="1" fontAlgn="auto" latinLnBrk="0" hangingPunct="1">
+              <a:lnSpc>
+                <a:spcPct val="100000"/>
+              </a:lnSpc>
+              <a:spcBef>
+                <a:spcPts val="0"/>
+              </a:spcBef>
+              <a:spcAft>
+                <a:spcPts val="0"/>
+              </a:spcAft>
+              <a:buClrTx/>
+              <a:buSzTx/>
+              <a:buFontTx/>
+              <a:buNone/>
+              <a:tabLst/>
+              <a:defRPr/>
+            </a:pPr>
+            <a:r>
+              <a:rPr lang="en-US" dirty="0" smtClean="0"/>
+              <a:t>Android Auto can contact your service to do the following:</a:t>
+            </a:r>
           </a:p>
         </p:txBody>
       </p:sp>
@@ -971,7 +991,7 @@
           <a:p>
             <a:fld id="{A5FE6474-0819-4CAC-A677-1ACC1221F957}" type="slidenum">
               <a:rPr lang="en-GB" smtClean="0"/>
-              <a:t>16</a:t>
+              <a:t>14</a:t>
             </a:fld>
             <a:endParaRPr lang="en-GB"/>
           </a:p>
@@ -980,7 +1000,7 @@
     </p:spTree>
     <p:extLst>
       <p:ext uri="{BB962C8B-B14F-4D97-AF65-F5344CB8AC3E}">
-        <p14:creationId xmlns:p14="http://schemas.microsoft.com/office/powerpoint/2010/main" val="3694532524"/>
+        <p14:creationId xmlns:p14="http://schemas.microsoft.com/office/powerpoint/2010/main" val="1749210354"/>
       </p:ext>
     </p:extLst>
   </p:cSld>
@@ -1034,6 +1054,90 @@
           <a:bodyPr/>
           <a:lstStyle/>
           <a:p>
+            <a:endParaRPr lang="en-GB" dirty="0"/>
+          </a:p>
+        </p:txBody>
+      </p:sp>
+      <p:sp>
+        <p:nvSpPr>
+          <p:cNvPr id="4" name="Slide Number Placeholder 3"/>
+          <p:cNvSpPr>
+            <a:spLocks noGrp="1"/>
+          </p:cNvSpPr>
+          <p:nvPr>
+            <p:ph type="sldNum" sz="quarter" idx="10"/>
+          </p:nvPr>
+        </p:nvSpPr>
+        <p:spPr/>
+        <p:txBody>
+          <a:bodyPr/>
+          <a:lstStyle/>
+          <a:p>
+            <a:fld id="{A5FE6474-0819-4CAC-A677-1ACC1221F957}" type="slidenum">
+              <a:rPr lang="en-GB" smtClean="0"/>
+              <a:t>16</a:t>
+            </a:fld>
+            <a:endParaRPr lang="en-GB"/>
+          </a:p>
+        </p:txBody>
+      </p:sp>
+    </p:spTree>
+    <p:extLst>
+      <p:ext uri="{BB962C8B-B14F-4D97-AF65-F5344CB8AC3E}">
+        <p14:creationId xmlns:p14="http://schemas.microsoft.com/office/powerpoint/2010/main" val="3694532524"/>
+      </p:ext>
+    </p:extLst>
+  </p:cSld>
+  <p:clrMapOvr>
+    <a:masterClrMapping/>
+  </p:clrMapOvr>
+</p:notes>
+</file>
+
+<file path=ppt/notesSlides/notesSlide12.xml><?xml version="1.0" encoding="utf-8"?>
+<p:notes xmlns:a="http://schemas.openxmlformats.org/drawingml/2006/main" xmlns:r="http://schemas.openxmlformats.org/officeDocument/2006/relationships" xmlns:p="http://schemas.openxmlformats.org/presentationml/2006/main">
+  <p:cSld>
+    <p:spTree>
+      <p:nvGrpSpPr>
+        <p:cNvPr id="1" name=""/>
+        <p:cNvGrpSpPr/>
+        <p:nvPr/>
+      </p:nvGrpSpPr>
+      <p:grpSpPr>
+        <a:xfrm>
+          <a:off x="0" y="0"/>
+          <a:ext cx="0" cy="0"/>
+          <a:chOff x="0" y="0"/>
+          <a:chExt cx="0" cy="0"/>
+        </a:xfrm>
+      </p:grpSpPr>
+      <p:sp>
+        <p:nvSpPr>
+          <p:cNvPr id="2" name="Slide Image Placeholder 1"/>
+          <p:cNvSpPr>
+            <a:spLocks noGrp="1" noRot="1" noChangeAspect="1"/>
+          </p:cNvSpPr>
+          <p:nvPr>
+            <p:ph type="sldImg"/>
+          </p:nvPr>
+        </p:nvSpPr>
+        <p:spPr/>
+      </p:sp>
+      <p:sp>
+        <p:nvSpPr>
+          <p:cNvPr id="3" name="Notes Placeholder 2"/>
+          <p:cNvSpPr>
+            <a:spLocks noGrp="1"/>
+          </p:cNvSpPr>
+          <p:nvPr>
+            <p:ph type="body" idx="1"/>
+          </p:nvPr>
+        </p:nvSpPr>
+        <p:spPr/>
+        <p:txBody>
+          <a:bodyPr/>
+          <a:lstStyle/>
+          <a:p>
             <a:r>
               <a:rPr lang="en-GB" dirty="0" smtClean="0"/>
               <a:t>https://developer.android.com/distribute/best-practices/launch/distribute-auto.html#how_to_participate</a:t>
@@ -1078,7 +1182,7 @@
 </p:notes>
 </file>
 
-<file path=ppt/notesSlides/notesSlide12.xml><?xml version="1.0" encoding="utf-8"?>
+<file path=ppt/notesSlides/notesSlide13.xml><?xml version="1.0" encoding="utf-8"?>
 <p:notes xmlns:a="http://schemas.openxmlformats.org/drawingml/2006/main" xmlns:r="http://schemas.openxmlformats.org/officeDocument/2006/relationships" xmlns:p="http://schemas.openxmlformats.org/presentationml/2006/main">
   <p:cSld>
     <p:spTree>
@@ -1310,59 +1414,31 @@
           <a:p>
             <a:r>
               <a:rPr lang="en-US" dirty="0" smtClean="0"/>
-              <a:t>Need to be android 5.0 plus</a:t>
-            </a:r>
-          </a:p>
-          <a:p>
-            <a:r>
-              <a:rPr lang="en-US" dirty="0" smtClean="0"/>
-              <a:t>5 panels -&gt; navigation,</a:t>
+              <a:t>The biggest advantage to use Android</a:t>
             </a:r>
             <a:r>
               <a:rPr lang="en-US" baseline="0" dirty="0" smtClean="0"/>
-              <a:t> phone log, home, media, car diagnosis</a:t>
+              <a:t> Auto instead of the implemented IVI (in vehicle infotainment) of a brand, is that using android Auto we get updates from google, however in a implemented IVI, once is done is done, there are no updates.</a:t>
             </a:r>
           </a:p>
           <a:p>
             <a:r>
               <a:rPr lang="en-US" baseline="0" dirty="0" smtClean="0"/>
-              <a:t>Important information, like a message received, from </a:t>
-            </a:r>
-            <a:r>
-              <a:rPr lang="en-US" baseline="0" dirty="0" err="1" smtClean="0"/>
-              <a:t>whatsupp</a:t>
-            </a:r>
+              <a:t>We know there are people who prefer using other apps for GPS Navigation, but in most of the videos and reviews we saw, they say that Google Maps is the best for being more precise and user friendly, than the others</a:t>
+            </a:r>
+          </a:p>
+          <a:p>
             <a:r>
               <a:rPr lang="en-US" baseline="0" dirty="0" smtClean="0"/>
-              <a:t>, </a:t>
-            </a:r>
-            <a:r>
-              <a:rPr lang="en-US" baseline="0" dirty="0" err="1" smtClean="0"/>
-              <a:t>facebook</a:t>
-            </a:r>
+              <a:t>We saw the comparison between voice control system between google and Apple, and the google voice control performs better, in the interpretation of what a person wants to say.</a:t>
+            </a:r>
+          </a:p>
+          <a:p>
             <a:r>
               <a:rPr lang="en-US" baseline="0" dirty="0" smtClean="0"/>
-              <a:t> </a:t>
-            </a:r>
-            <a:r>
-              <a:rPr lang="en-US" baseline="0" dirty="0" err="1" smtClean="0"/>
-              <a:t>messeger</a:t>
-            </a:r>
-            <a:r>
-              <a:rPr lang="en-US" baseline="0" dirty="0" smtClean="0"/>
-              <a:t> or </a:t>
-            </a:r>
-            <a:r>
-              <a:rPr lang="en-US" baseline="0" dirty="0" smtClean="0"/>
-              <a:t>hangouts</a:t>
-            </a:r>
-          </a:p>
-          <a:p>
-            <a:r>
-              <a:rPr lang="en-US" baseline="0" dirty="0" smtClean="0"/>
-              <a:t>A phone call incoming</a:t>
-            </a:r>
-            <a:endParaRPr lang="en-US" dirty="0" smtClean="0"/>
+              <a:t>We also don’t need to buy a new car or spend 700€ in a aftermarket display, we can simply use our phone to do the work.</a:t>
+            </a:r>
+            <a:endParaRPr lang="en-US" dirty="0"/>
           </a:p>
         </p:txBody>
       </p:sp>
@@ -1384,7 +1460,7 @@
             <a:fld id="{1B06CD8F-B7ED-4A05-9FB1-A01CC0EF02CC}" type="slidenum">
               <a:rPr lang="fr-FR" smtClean="0"/>
               <a:pPr/>
-              <a:t>7</a:t>
+              <a:t>5</a:t>
             </a:fld>
             <a:endParaRPr lang="fr-FR" dirty="0"/>
           </a:p>
@@ -1393,7 +1469,7 @@
     </p:spTree>
     <p:extLst>
       <p:ext uri="{BB962C8B-B14F-4D97-AF65-F5344CB8AC3E}">
-        <p14:creationId xmlns:p14="http://schemas.microsoft.com/office/powerpoint/2010/main" val="1564263606"/>
+        <p14:creationId xmlns:p14="http://schemas.microsoft.com/office/powerpoint/2010/main" val="3973816794"/>
       </p:ext>
     </p:extLst>
   </p:cSld>
@@ -1449,79 +1525,55 @@
           <a:p>
             <a:r>
               <a:rPr lang="en-US" dirty="0" smtClean="0"/>
-              <a:t>Like said before, the car sound system is connected</a:t>
+              <a:t>Need to be android 5.0 plus</a:t>
+            </a:r>
+          </a:p>
+          <a:p>
+            <a:r>
+              <a:rPr lang="en-US" dirty="0" smtClean="0"/>
+              <a:t>5 panels -&gt; navigation,</a:t>
             </a:r>
             <a:r>
               <a:rPr lang="en-US" baseline="0" dirty="0" smtClean="0"/>
-              <a:t> via </a:t>
+              <a:t> phone log, home, media, car diagnosis</a:t>
+            </a:r>
+          </a:p>
+          <a:p>
+            <a:r>
+              <a:rPr lang="en-US" baseline="0" dirty="0" smtClean="0"/>
+              <a:t>Important information, like a message received, from </a:t>
             </a:r>
             <a:r>
               <a:rPr lang="en-US" baseline="0" dirty="0" err="1" smtClean="0"/>
-              <a:t>bluethoot</a:t>
+              <a:t>whatsupp</a:t>
             </a:r>
             <a:r>
               <a:rPr lang="en-US" baseline="0" dirty="0" smtClean="0"/>
-              <a:t>.</a:t>
-            </a:r>
-          </a:p>
-          <a:p>
+              <a:t>, </a:t>
+            </a:r>
+            <a:r>
+              <a:rPr lang="en-US" baseline="0" dirty="0" err="1" smtClean="0"/>
+              <a:t>facebook</a:t>
+            </a:r>
             <a:r>
               <a:rPr lang="en-US" baseline="0" dirty="0" smtClean="0"/>
-              <a:t>We have a lot of options to start a voice command, for example if we use the “OK Google”, we don’t need to touch the screen, and keep the eyes on the road at the same time we are doing something else.</a:t>
-            </a:r>
-          </a:p>
-          <a:p>
+              <a:t> </a:t>
+            </a:r>
+            <a:r>
+              <a:rPr lang="en-US" baseline="0" dirty="0" err="1" smtClean="0"/>
+              <a:t>messeger</a:t>
+            </a:r>
             <a:r>
               <a:rPr lang="en-US" baseline="0" dirty="0" smtClean="0"/>
-              <a:t>A example to set the destination we can say “OK Google, set directions to …” and we say the address.</a:t>
+              <a:t> or hangouts</a:t>
             </a:r>
           </a:p>
           <a:p>
             <a:r>
               <a:rPr lang="en-US" baseline="0" dirty="0" smtClean="0"/>
-              <a:t>We can also ask for a </a:t>
-            </a:r>
-            <a:r>
-              <a:rPr lang="en-US" sz="1200" b="0" i="0" kern="1200" dirty="0" smtClean="0">
-                <a:solidFill>
-                  <a:schemeClr val="tx1"/>
-                </a:solidFill>
-                <a:effectLst/>
-                <a:latin typeface="Arial" pitchFamily="34" charset="0"/>
-                <a:ea typeface="+mn-ea"/>
-                <a:cs typeface="+mn-cs"/>
-              </a:rPr>
-              <a:t>specific</a:t>
-            </a:r>
-            <a:r>
-              <a:rPr lang="en-US" baseline="0" dirty="0" smtClean="0"/>
-              <a:t> song in a </a:t>
-            </a:r>
-            <a:r>
-              <a:rPr lang="en-US" sz="1200" b="0" i="0" kern="1200" dirty="0" smtClean="0">
-                <a:solidFill>
-                  <a:schemeClr val="tx1"/>
-                </a:solidFill>
-                <a:effectLst/>
-                <a:latin typeface="Arial" pitchFamily="34" charset="0"/>
-                <a:ea typeface="+mn-ea"/>
-                <a:cs typeface="+mn-cs"/>
-              </a:rPr>
-              <a:t>specific</a:t>
-            </a:r>
-            <a:r>
-              <a:rPr lang="en-US" baseline="0" dirty="0" smtClean="0"/>
-              <a:t> app</a:t>
-            </a:r>
-          </a:p>
-          <a:p>
-            <a:r>
-              <a:rPr lang="en-US" baseline="0" dirty="0" smtClean="0"/>
-              <a:t>Basically, We can use every OK Google command available for android system</a:t>
-            </a:r>
-          </a:p>
-          <a:p>
-            <a:endParaRPr lang="en-US" dirty="0"/>
+              <a:t>A phone call incoming</a:t>
+            </a:r>
+            <a:endParaRPr lang="en-US" dirty="0" smtClean="0"/>
           </a:p>
         </p:txBody>
       </p:sp>
@@ -1543,7 +1595,7 @@
             <a:fld id="{1B06CD8F-B7ED-4A05-9FB1-A01CC0EF02CC}" type="slidenum">
               <a:rPr lang="fr-FR" smtClean="0"/>
               <a:pPr/>
-              <a:t>8</a:t>
+              <a:t>7</a:t>
             </a:fld>
             <a:endParaRPr lang="fr-FR" dirty="0"/>
           </a:p>
@@ -1552,7 +1604,7 @@
     </p:spTree>
     <p:extLst>
       <p:ext uri="{BB962C8B-B14F-4D97-AF65-F5344CB8AC3E}">
-        <p14:creationId xmlns:p14="http://schemas.microsoft.com/office/powerpoint/2010/main" val="4291574160"/>
+        <p14:creationId xmlns:p14="http://schemas.microsoft.com/office/powerpoint/2010/main" val="1564263606"/>
       </p:ext>
     </p:extLst>
   </p:cSld>
@@ -1608,18 +1660,78 @@
           <a:p>
             <a:r>
               <a:rPr lang="en-US" dirty="0" smtClean="0"/>
-              <a:t>Here is shown the phone screen and the car dash screen,</a:t>
+              <a:t>Like said before, the car sound system is connected</a:t>
             </a:r>
             <a:r>
               <a:rPr lang="en-US" baseline="0" dirty="0" smtClean="0"/>
-              <a:t> and the blue markers show the panel with 5 or 4 buttons</a:t>
-            </a:r>
-          </a:p>
-          <a:p>
+              <a:t> via </a:t>
+            </a:r>
+            <a:r>
+              <a:rPr lang="en-US" baseline="0" dirty="0" err="1" smtClean="0"/>
+              <a:t>bluethoot</a:t>
+            </a:r>
             <a:r>
               <a:rPr lang="en-US" baseline="0" dirty="0" smtClean="0"/>
-              <a:t>For car diagnosis the app called Torque is the one that is used</a:t>
-            </a:r>
+              <a:t>.</a:t>
+            </a:r>
+          </a:p>
+          <a:p>
+            <a:r>
+              <a:rPr lang="en-US" baseline="0" dirty="0" smtClean="0"/>
+              <a:t>We have a lot of options to start a voice command, for example if we use the “OK Google”, we don’t need to touch the screen, and keep the eyes on the road at the same time we are doing something else.</a:t>
+            </a:r>
+          </a:p>
+          <a:p>
+            <a:r>
+              <a:rPr lang="en-US" baseline="0" dirty="0" smtClean="0"/>
+              <a:t>A example to set the destination we can say “OK Google, set directions to …” and we say the address.</a:t>
+            </a:r>
+          </a:p>
+          <a:p>
+            <a:r>
+              <a:rPr lang="en-US" baseline="0" dirty="0" smtClean="0"/>
+              <a:t>We can also ask for a </a:t>
+            </a:r>
+            <a:r>
+              <a:rPr lang="en-US" sz="1200" b="0" i="0" kern="1200" dirty="0" smtClean="0">
+                <a:solidFill>
+                  <a:schemeClr val="tx1"/>
+                </a:solidFill>
+                <a:effectLst/>
+                <a:latin typeface="Arial" pitchFamily="34" charset="0"/>
+                <a:ea typeface="+mn-ea"/>
+                <a:cs typeface="+mn-cs"/>
+              </a:rPr>
+              <a:t>specific</a:t>
+            </a:r>
+            <a:r>
+              <a:rPr lang="en-US" baseline="0" dirty="0" smtClean="0"/>
+              <a:t> song in a </a:t>
+            </a:r>
+            <a:r>
+              <a:rPr lang="en-US" sz="1200" b="0" i="0" kern="1200" dirty="0" smtClean="0">
+                <a:solidFill>
+                  <a:schemeClr val="tx1"/>
+                </a:solidFill>
+                <a:effectLst/>
+                <a:latin typeface="Arial" pitchFamily="34" charset="0"/>
+                <a:ea typeface="+mn-ea"/>
+                <a:cs typeface="+mn-cs"/>
+              </a:rPr>
+              <a:t>specific</a:t>
+            </a:r>
+            <a:r>
+              <a:rPr lang="en-US" baseline="0" dirty="0" smtClean="0"/>
+              <a:t> app</a:t>
+            </a:r>
+          </a:p>
+          <a:p>
+            <a:r>
+              <a:rPr lang="en-US" baseline="0" dirty="0" smtClean="0"/>
+              <a:t>Basically, We can use every OK Google command available for android system</a:t>
+            </a:r>
+          </a:p>
+          <a:p>
             <a:endParaRPr lang="en-US" dirty="0"/>
           </a:p>
         </p:txBody>
@@ -1642,7 +1754,7 @@
             <a:fld id="{1B06CD8F-B7ED-4A05-9FB1-A01CC0EF02CC}" type="slidenum">
               <a:rPr lang="fr-FR" smtClean="0"/>
               <a:pPr/>
-              <a:t>9</a:t>
+              <a:t>8</a:t>
             </a:fld>
             <a:endParaRPr lang="fr-FR" dirty="0"/>
           </a:p>
@@ -1651,7 +1763,7 @@
     </p:spTree>
     <p:extLst>
       <p:ext uri="{BB962C8B-B14F-4D97-AF65-F5344CB8AC3E}">
-        <p14:creationId xmlns:p14="http://schemas.microsoft.com/office/powerpoint/2010/main" val="3316341565"/>
+        <p14:creationId xmlns:p14="http://schemas.microsoft.com/office/powerpoint/2010/main" val="4291574160"/>
       </p:ext>
     </p:extLst>
   </p:cSld>
@@ -1707,15 +1819,17 @@
           <a:p>
             <a:r>
               <a:rPr lang="en-US" dirty="0" smtClean="0"/>
-              <a:t>Here</a:t>
+              <a:t>Here is shown the phone screen and the car dash screen,</a:t>
             </a:r>
             <a:r>
               <a:rPr lang="en-US" baseline="0" dirty="0" smtClean="0"/>
-              <a:t> is shown some examples of the home menu, where we see the relevant information, in the case of the phone we see the current destination, the actual music and a received message, in the car dash is shown a received message, a coming appointment and the current </a:t>
-            </a:r>
-            <a:r>
-              <a:rPr lang="en-US" baseline="0" dirty="0" err="1" smtClean="0"/>
-              <a:t>wheather</a:t>
+              <a:t> and the blue markers show the panel with 5 or 4 buttons</a:t>
+            </a:r>
+          </a:p>
+          <a:p>
+            <a:r>
+              <a:rPr lang="en-US" baseline="0" dirty="0" smtClean="0"/>
+              <a:t>For car diagnosis the app called Torque is the one that is used</a:t>
             </a:r>
             <a:endParaRPr lang="en-US" dirty="0"/>
           </a:p>
@@ -1739,7 +1853,7 @@
             <a:fld id="{1B06CD8F-B7ED-4A05-9FB1-A01CC0EF02CC}" type="slidenum">
               <a:rPr lang="fr-FR" smtClean="0"/>
               <a:pPr/>
-              <a:t>10</a:t>
+              <a:t>9</a:t>
             </a:fld>
             <a:endParaRPr lang="fr-FR" dirty="0"/>
           </a:p>
@@ -1748,7 +1862,7 @@
     </p:spTree>
     <p:extLst>
       <p:ext uri="{BB962C8B-B14F-4D97-AF65-F5344CB8AC3E}">
-        <p14:creationId xmlns:p14="http://schemas.microsoft.com/office/powerpoint/2010/main" val="1596670375"/>
+        <p14:creationId xmlns:p14="http://schemas.microsoft.com/office/powerpoint/2010/main" val="3316341565"/>
       </p:ext>
     </p:extLst>
   </p:cSld>
@@ -1802,7 +1916,19 @@
           <a:bodyPr/>
           <a:lstStyle/>
           <a:p>
-            <a:endParaRPr lang="en-US"/>
+            <a:r>
+              <a:rPr lang="en-US" dirty="0" smtClean="0"/>
+              <a:t>Here</a:t>
+            </a:r>
+            <a:r>
+              <a:rPr lang="en-US" baseline="0" dirty="0" smtClean="0"/>
+              <a:t> is shown some examples of the home menu, where we see the relevant information, in the case of the phone we see the current destination, the actual music and a received message, in the car dash is shown a received message, a coming appointment and the current </a:t>
+            </a:r>
+            <a:r>
+              <a:rPr lang="en-US" baseline="0" dirty="0" err="1" smtClean="0"/>
+              <a:t>wheather</a:t>
+            </a:r>
+            <a:endParaRPr lang="en-US" dirty="0"/>
           </a:p>
         </p:txBody>
       </p:sp>
@@ -1824,7 +1950,7 @@
             <a:fld id="{1B06CD8F-B7ED-4A05-9FB1-A01CC0EF02CC}" type="slidenum">
               <a:rPr lang="fr-FR" smtClean="0"/>
               <a:pPr/>
-              <a:t>11</a:t>
+              <a:t>10</a:t>
             </a:fld>
             <a:endParaRPr lang="fr-FR" dirty="0"/>
           </a:p>
@@ -1833,7 +1959,7 @@
     </p:spTree>
     <p:extLst>
       <p:ext uri="{BB962C8B-B14F-4D97-AF65-F5344CB8AC3E}">
-        <p14:creationId xmlns:p14="http://schemas.microsoft.com/office/powerpoint/2010/main" val="4260471285"/>
+        <p14:creationId xmlns:p14="http://schemas.microsoft.com/office/powerpoint/2010/main" val="1596670375"/>
       </p:ext>
     </p:extLst>
   </p:cSld>
@@ -1887,13 +2013,7 @@
           <a:bodyPr/>
           <a:lstStyle/>
           <a:p>
-            <a:r>
-              <a:rPr lang="en-GB" dirty="0" smtClean="0"/>
-              <a:t>https://developer.android.com/training/auto/start/index.html#dev-project</a:t>
-            </a:r>
-          </a:p>
-          <a:p>
-            <a:endParaRPr lang="en-GB" dirty="0"/>
+            <a:endParaRPr lang="en-US"/>
           </a:p>
         </p:txBody>
       </p:sp>
@@ -1912,18 +2032,19 @@
           <a:bodyPr/>
           <a:lstStyle/>
           <a:p>
-            <a:fld id="{A5FE6474-0819-4CAC-A677-1ACC1221F957}" type="slidenum">
-              <a:rPr lang="en-GB" smtClean="0"/>
-              <a:t>13</a:t>
+            <a:fld id="{1B06CD8F-B7ED-4A05-9FB1-A01CC0EF02CC}" type="slidenum">
+              <a:rPr lang="fr-FR" smtClean="0"/>
+              <a:pPr/>
+              <a:t>11</a:t>
             </a:fld>
-            <a:endParaRPr lang="en-GB"/>
+            <a:endParaRPr lang="fr-FR" dirty="0"/>
           </a:p>
         </p:txBody>
       </p:sp>
     </p:spTree>
     <p:extLst>
       <p:ext uri="{BB962C8B-B14F-4D97-AF65-F5344CB8AC3E}">
-        <p14:creationId xmlns:p14="http://schemas.microsoft.com/office/powerpoint/2010/main" val="4288258623"/>
+        <p14:creationId xmlns:p14="http://schemas.microsoft.com/office/powerpoint/2010/main" val="4260471285"/>
       </p:ext>
     </p:extLst>
   </p:cSld>
@@ -1977,27 +2098,13 @@
           <a:bodyPr/>
           <a:lstStyle/>
           <a:p>
-            <a:pPr marL="0" marR="0" lvl="0" indent="0" algn="l" defTabSz="914400" rtl="0" eaLnBrk="1" fontAlgn="auto" latinLnBrk="0" hangingPunct="1">
-              <a:lnSpc>
-                <a:spcPct val="100000"/>
-              </a:lnSpc>
-              <a:spcBef>
-                <a:spcPts val="0"/>
-              </a:spcBef>
-              <a:spcAft>
-                <a:spcPts val="0"/>
-              </a:spcAft>
-              <a:buClrTx/>
-              <a:buSzTx/>
-              <a:buFontTx/>
-              <a:buNone/>
-              <a:tabLst/>
-              <a:defRPr/>
-            </a:pPr>
-            <a:r>
-              <a:rPr lang="en-US" dirty="0" smtClean="0"/>
-              <a:t>Android Auto can contact your service to do the following:</a:t>
-            </a:r>
+            <a:r>
+              <a:rPr lang="en-GB" dirty="0" smtClean="0"/>
+              <a:t>https://developer.android.com/training/auto/start/index.html#dev-project</a:t>
+            </a:r>
+          </a:p>
+          <a:p>
+            <a:endParaRPr lang="en-GB" dirty="0"/>
           </a:p>
         </p:txBody>
       </p:sp>
@@ -2018,7 +2125,7 @@
           <a:p>
             <a:fld id="{A5FE6474-0819-4CAC-A677-1ACC1221F957}" type="slidenum">
               <a:rPr lang="en-GB" smtClean="0"/>
-              <a:t>14</a:t>
+              <a:t>13</a:t>
             </a:fld>
             <a:endParaRPr lang="en-GB"/>
           </a:p>
@@ -2027,7 +2134,7 @@
     </p:spTree>
     <p:extLst>
       <p:ext uri="{BB962C8B-B14F-4D97-AF65-F5344CB8AC3E}">
-        <p14:creationId xmlns:p14="http://schemas.microsoft.com/office/powerpoint/2010/main" val="1749210354"/>
+        <p14:creationId xmlns:p14="http://schemas.microsoft.com/office/powerpoint/2010/main" val="4288258623"/>
       </p:ext>
     </p:extLst>
   </p:cSld>
@@ -20896,6 +21003,15 @@
 </file>
 
 <file path=customXml/item1.xml><?xml version="1.0" encoding="utf-8"?>
+<?mso-contentType ?>
+<FormTemplates xmlns="http://schemas.microsoft.com/sharepoint/v3/contenttype/forms">
+  <Display>DocumentLibraryForm</Display>
+  <Edit>DocumentLibraryForm</Edit>
+  <New>DocumentLibraryForm</New>
+</FormTemplates>
+</file>
+
+<file path=customXml/item2.xml><?xml version="1.0" encoding="utf-8"?>
 <ct:contentTypeSchema xmlns:ct="http://schemas.microsoft.com/office/2006/metadata/contentType" xmlns:ma="http://schemas.microsoft.com/office/2006/metadata/properties/metaAttributes" ct:_="" ma:_="" ma:contentTypeName="Document" ma:contentTypeID="0x0101001F419E1A6EA81A4789CC2A27D54FE063" ma:contentTypeVersion="2" ma:contentTypeDescription="Create a new document." ma:contentTypeScope="" ma:versionID="6e5cb36ff88c0f99687fc20d43474a84">
   <xsd:schema xmlns:xsd="http://www.w3.org/2001/XMLSchema" xmlns:xs="http://www.w3.org/2001/XMLSchema" xmlns:p="http://schemas.microsoft.com/office/2006/metadata/properties" targetNamespace="http://schemas.microsoft.com/office/2006/metadata/properties" ma:root="true" ma:fieldsID="0d665e38e66d01d06a7f476fcfe73af8">
     <xsd:element name="properties">
@@ -21009,15 +21125,6 @@
 </ct:contentTypeSchema>
 </file>
 
-<file path=customXml/item2.xml><?xml version="1.0" encoding="utf-8"?>
-<?mso-contentType ?>
-<FormTemplates xmlns="http://schemas.microsoft.com/sharepoint/v3/contenttype/forms">
-  <Display>DocumentLibraryForm</Display>
-  <Edit>DocumentLibraryForm</Edit>
-  <New>DocumentLibraryForm</New>
-</FormTemplates>
-</file>
-
 <file path=customXml/item3.xml><?xml version="1.0" encoding="utf-8"?>
 <p:properties xmlns:p="http://schemas.microsoft.com/office/2006/metadata/properties" xmlns:xsi="http://www.w3.org/2001/XMLSchema-instance" xmlns:pc="http://schemas.microsoft.com/office/infopath/2007/PartnerControls">
   <documentManagement/>
@@ -21025,6 +21132,14 @@
 </file>
 
 <file path=customXml/itemProps1.xml><?xml version="1.0" encoding="utf-8"?>
+<ds:datastoreItem xmlns:ds="http://schemas.openxmlformats.org/officeDocument/2006/customXml" ds:itemID="{74695D99-3EAE-4F55-A2B4-F38051B8FE0A}">
+  <ds:schemaRefs>
+    <ds:schemaRef ds:uri="http://schemas.microsoft.com/sharepoint/v3/contenttype/forms"/>
+  </ds:schemaRefs>
+</ds:datastoreItem>
+</file>
+
+<file path=customXml/itemProps2.xml><?xml version="1.0" encoding="utf-8"?>
 <ds:datastoreItem xmlns:ds="http://schemas.openxmlformats.org/officeDocument/2006/customXml" ds:itemID="{71BEF1E5-09DF-46B0-9968-4DC05085673B}">
   <ds:schemaRefs>
     <ds:schemaRef ds:uri="http://schemas.microsoft.com/office/2006/metadata/contentType"/>
@@ -21036,14 +21151,6 @@
     <ds:schemaRef ds:uri="http://purl.org/dc/terms/"/>
     <ds:schemaRef ds:uri="http://schemas.microsoft.com/internal/obd"/>
     <ds:schemaRef ds:uri="http://schemas.microsoft.com/office/infopath/2007/PartnerControls"/>
-  </ds:schemaRefs>
-</ds:datastoreItem>
-</file>
-
-<file path=customXml/itemProps2.xml><?xml version="1.0" encoding="utf-8"?>
-<ds:datastoreItem xmlns:ds="http://schemas.openxmlformats.org/officeDocument/2006/customXml" ds:itemID="{74695D99-3EAE-4F55-A2B4-F38051B8FE0A}">
-  <ds:schemaRefs>
-    <ds:schemaRef ds:uri="http://schemas.microsoft.com/sharepoint/v3/contenttype/forms"/>
   </ds:schemaRefs>
 </ds:datastoreItem>
 </file>

</xml_diff>

<commit_message>
Notes added chapter 1
</commit_message>
<xml_diff>
--- a/PowerPoint Final/Presentation_Joao_Mauro.pptx
+++ b/PowerPoint Final/Presentation_Joao_Mauro.pptx
@@ -950,27 +950,13 @@
           <a:bodyPr/>
           <a:lstStyle/>
           <a:p>
-            <a:pPr marL="0" marR="0" lvl="0" indent="0" algn="l" defTabSz="914400" rtl="0" eaLnBrk="1" fontAlgn="auto" latinLnBrk="0" hangingPunct="1">
-              <a:lnSpc>
-                <a:spcPct val="100000"/>
-              </a:lnSpc>
-              <a:spcBef>
-                <a:spcPts val="0"/>
-              </a:spcBef>
-              <a:spcAft>
-                <a:spcPts val="0"/>
-              </a:spcAft>
-              <a:buClrTx/>
-              <a:buSzTx/>
-              <a:buFontTx/>
-              <a:buNone/>
-              <a:tabLst/>
-              <a:defRPr/>
-            </a:pPr>
-            <a:r>
-              <a:rPr lang="en-US" dirty="0" smtClean="0"/>
-              <a:t>Android Auto can contact your service to do the following:</a:t>
-            </a:r>
+            <a:r>
+              <a:rPr lang="en-GB" dirty="0" smtClean="0"/>
+              <a:t>https://developer.android.com/training/auto/start/index.html#dev-project</a:t>
+            </a:r>
+          </a:p>
+          <a:p>
+            <a:endParaRPr lang="en-GB" dirty="0"/>
           </a:p>
         </p:txBody>
       </p:sp>
@@ -991,7 +977,7 @@
           <a:p>
             <a:fld id="{A5FE6474-0819-4CAC-A677-1ACC1221F957}" type="slidenum">
               <a:rPr lang="en-GB" smtClean="0"/>
-              <a:t>14</a:t>
+              <a:t>13</a:t>
             </a:fld>
             <a:endParaRPr lang="en-GB"/>
           </a:p>
@@ -1000,7 +986,7 @@
     </p:spTree>
     <p:extLst>
       <p:ext uri="{BB962C8B-B14F-4D97-AF65-F5344CB8AC3E}">
-        <p14:creationId xmlns:p14="http://schemas.microsoft.com/office/powerpoint/2010/main" val="1749210354"/>
+        <p14:creationId xmlns:p14="http://schemas.microsoft.com/office/powerpoint/2010/main" val="4288258623"/>
       </p:ext>
     </p:extLst>
   </p:cSld>
@@ -1054,7 +1040,27 @@
           <a:bodyPr/>
           <a:lstStyle/>
           <a:p>
-            <a:endParaRPr lang="en-GB" dirty="0"/>
+            <a:pPr marL="0" marR="0" lvl="0" indent="0" algn="l" defTabSz="914400" rtl="0" eaLnBrk="1" fontAlgn="auto" latinLnBrk="0" hangingPunct="1">
+              <a:lnSpc>
+                <a:spcPct val="100000"/>
+              </a:lnSpc>
+              <a:spcBef>
+                <a:spcPts val="0"/>
+              </a:spcBef>
+              <a:spcAft>
+                <a:spcPts val="0"/>
+              </a:spcAft>
+              <a:buClrTx/>
+              <a:buSzTx/>
+              <a:buFontTx/>
+              <a:buNone/>
+              <a:tabLst/>
+              <a:defRPr/>
+            </a:pPr>
+            <a:r>
+              <a:rPr lang="en-US" dirty="0" smtClean="0"/>
+              <a:t>Android Auto can contact your service to do the following:</a:t>
+            </a:r>
           </a:p>
         </p:txBody>
       </p:sp>
@@ -1075,7 +1081,7 @@
           <a:p>
             <a:fld id="{A5FE6474-0819-4CAC-A677-1ACC1221F957}" type="slidenum">
               <a:rPr lang="en-GB" smtClean="0"/>
-              <a:t>16</a:t>
+              <a:t>14</a:t>
             </a:fld>
             <a:endParaRPr lang="en-GB"/>
           </a:p>
@@ -1084,7 +1090,7 @@
     </p:spTree>
     <p:extLst>
       <p:ext uri="{BB962C8B-B14F-4D97-AF65-F5344CB8AC3E}">
-        <p14:creationId xmlns:p14="http://schemas.microsoft.com/office/powerpoint/2010/main" val="3694532524"/>
+        <p14:creationId xmlns:p14="http://schemas.microsoft.com/office/powerpoint/2010/main" val="1749210354"/>
       </p:ext>
     </p:extLst>
   </p:cSld>
@@ -1138,6 +1144,90 @@
           <a:bodyPr/>
           <a:lstStyle/>
           <a:p>
+            <a:endParaRPr lang="en-GB" dirty="0"/>
+          </a:p>
+        </p:txBody>
+      </p:sp>
+      <p:sp>
+        <p:nvSpPr>
+          <p:cNvPr id="4" name="Slide Number Placeholder 3"/>
+          <p:cNvSpPr>
+            <a:spLocks noGrp="1"/>
+          </p:cNvSpPr>
+          <p:nvPr>
+            <p:ph type="sldNum" sz="quarter" idx="10"/>
+          </p:nvPr>
+        </p:nvSpPr>
+        <p:spPr/>
+        <p:txBody>
+          <a:bodyPr/>
+          <a:lstStyle/>
+          <a:p>
+            <a:fld id="{A5FE6474-0819-4CAC-A677-1ACC1221F957}" type="slidenum">
+              <a:rPr lang="en-GB" smtClean="0"/>
+              <a:t>16</a:t>
+            </a:fld>
+            <a:endParaRPr lang="en-GB"/>
+          </a:p>
+        </p:txBody>
+      </p:sp>
+    </p:spTree>
+    <p:extLst>
+      <p:ext uri="{BB962C8B-B14F-4D97-AF65-F5344CB8AC3E}">
+        <p14:creationId xmlns:p14="http://schemas.microsoft.com/office/powerpoint/2010/main" val="3694532524"/>
+      </p:ext>
+    </p:extLst>
+  </p:cSld>
+  <p:clrMapOvr>
+    <a:masterClrMapping/>
+  </p:clrMapOvr>
+</p:notes>
+</file>
+
+<file path=ppt/notesSlides/notesSlide13.xml><?xml version="1.0" encoding="utf-8"?>
+<p:notes xmlns:a="http://schemas.openxmlformats.org/drawingml/2006/main" xmlns:r="http://schemas.openxmlformats.org/officeDocument/2006/relationships" xmlns:p="http://schemas.openxmlformats.org/presentationml/2006/main">
+  <p:cSld>
+    <p:spTree>
+      <p:nvGrpSpPr>
+        <p:cNvPr id="1" name=""/>
+        <p:cNvGrpSpPr/>
+        <p:nvPr/>
+      </p:nvGrpSpPr>
+      <p:grpSpPr>
+        <a:xfrm>
+          <a:off x="0" y="0"/>
+          <a:ext cx="0" cy="0"/>
+          <a:chOff x="0" y="0"/>
+          <a:chExt cx="0" cy="0"/>
+        </a:xfrm>
+      </p:grpSpPr>
+      <p:sp>
+        <p:nvSpPr>
+          <p:cNvPr id="2" name="Slide Image Placeholder 1"/>
+          <p:cNvSpPr>
+            <a:spLocks noGrp="1" noRot="1" noChangeAspect="1"/>
+          </p:cNvSpPr>
+          <p:nvPr>
+            <p:ph type="sldImg"/>
+          </p:nvPr>
+        </p:nvSpPr>
+        <p:spPr/>
+      </p:sp>
+      <p:sp>
+        <p:nvSpPr>
+          <p:cNvPr id="3" name="Notes Placeholder 2"/>
+          <p:cNvSpPr>
+            <a:spLocks noGrp="1"/>
+          </p:cNvSpPr>
+          <p:nvPr>
+            <p:ph type="body" idx="1"/>
+          </p:nvPr>
+        </p:nvSpPr>
+        <p:spPr/>
+        <p:txBody>
+          <a:bodyPr/>
+          <a:lstStyle/>
+          <a:p>
             <a:r>
               <a:rPr lang="en-GB" dirty="0" smtClean="0"/>
               <a:t>https://developer.android.com/distribute/best-practices/launch/distribute-auto.html#how_to_participate</a:t>
@@ -1182,7 +1272,7 @@
 </p:notes>
 </file>
 
-<file path=ppt/notesSlides/notesSlide13.xml><?xml version="1.0" encoding="utf-8"?>
+<file path=ppt/notesSlides/notesSlide14.xml><?xml version="1.0" encoding="utf-8"?>
 <p:notes xmlns:a="http://schemas.openxmlformats.org/drawingml/2006/main" xmlns:r="http://schemas.openxmlformats.org/officeDocument/2006/relationships" xmlns:p="http://schemas.openxmlformats.org/presentationml/2006/main">
   <p:cSld>
     <p:spTree>
@@ -1413,30 +1503,165 @@
           <a:lstStyle/>
           <a:p>
             <a:r>
-              <a:rPr lang="en-US" dirty="0" smtClean="0"/>
-              <a:t>The biggest advantage to use Android</a:t>
-            </a:r>
-            <a:r>
-              <a:rPr lang="en-US" baseline="0" dirty="0" smtClean="0"/>
-              <a:t> Auto instead of the implemented IVI (in vehicle infotainment) of a brand, is that using android Auto we get updates from google, however in a implemented IVI, once is done is done, there are no updates.</a:t>
-            </a:r>
-          </a:p>
-          <a:p>
-            <a:r>
-              <a:rPr lang="en-US" baseline="0" dirty="0" smtClean="0"/>
-              <a:t>We know there are people who prefer using other apps for GPS Navigation, but in most of the videos and reviews we saw, they say that Google Maps is the best for being more precise and user friendly, than the others</a:t>
-            </a:r>
-          </a:p>
-          <a:p>
-            <a:r>
-              <a:rPr lang="en-US" baseline="0" dirty="0" smtClean="0"/>
-              <a:t>We saw the comparison between voice control system between google and Apple, and the google voice control performs better, in the interpretation of what a person wants to say.</a:t>
-            </a:r>
-          </a:p>
-          <a:p>
-            <a:r>
-              <a:rPr lang="en-US" baseline="0" dirty="0" smtClean="0"/>
-              <a:t>We also don’t need to buy a new car or spend 700€ in a aftermarket display, we can simply use our phone to do the work.</a:t>
+              <a:rPr lang="en-US" sz="1200" b="0" i="0" kern="1200" dirty="0" smtClean="0">
+                <a:solidFill>
+                  <a:schemeClr val="tx1"/>
+                </a:solidFill>
+                <a:effectLst/>
+                <a:latin typeface="Arial" pitchFamily="34" charset="0"/>
+                <a:ea typeface="+mn-ea"/>
+                <a:cs typeface="+mn-cs"/>
+              </a:rPr>
+              <a:t>Android Auto works by projecting Android apps onto </a:t>
+            </a:r>
+            <a:r>
+              <a:rPr lang="en-US" sz="1200" b="0" i="0" kern="1200" dirty="0" err="1" smtClean="0">
+                <a:solidFill>
+                  <a:schemeClr val="tx1"/>
+                </a:solidFill>
+                <a:effectLst/>
+                <a:latin typeface="Arial" pitchFamily="34" charset="0"/>
+                <a:ea typeface="+mn-ea"/>
+                <a:cs typeface="+mn-cs"/>
+              </a:rPr>
+              <a:t>onto</a:t>
+            </a:r>
+            <a:r>
+              <a:rPr lang="en-US" sz="1200" b="0" i="0" kern="1200" dirty="0" smtClean="0">
+                <a:solidFill>
+                  <a:schemeClr val="tx1"/>
+                </a:solidFill>
+                <a:effectLst/>
+                <a:latin typeface="Arial" pitchFamily="34" charset="0"/>
+                <a:ea typeface="+mn-ea"/>
+                <a:cs typeface="+mn-cs"/>
+              </a:rPr>
+              <a:t> the in-car display after the phone has been plugged in to the car via USB</a:t>
+            </a:r>
+          </a:p>
+          <a:p>
+            <a:r>
+              <a:rPr lang="en-US" sz="1200" b="0" i="0" kern="1200" dirty="0" smtClean="0">
+                <a:solidFill>
+                  <a:schemeClr val="tx1"/>
+                </a:solidFill>
+                <a:effectLst/>
+                <a:latin typeface="Arial" pitchFamily="34" charset="0"/>
+                <a:ea typeface="+mn-ea"/>
+                <a:cs typeface="+mn-cs"/>
+              </a:rPr>
+              <a:t>Phone calls </a:t>
+            </a:r>
+            <a:r>
+              <a:rPr lang="en-US" sz="1200" b="0" i="0" kern="1200" smtClean="0">
+                <a:solidFill>
+                  <a:schemeClr val="tx1"/>
+                </a:solidFill>
+                <a:effectLst/>
+                <a:latin typeface="Arial" pitchFamily="34" charset="0"/>
+                <a:ea typeface="+mn-ea"/>
+                <a:cs typeface="+mn-cs"/>
+              </a:rPr>
+              <a:t>are going to be </a:t>
+            </a:r>
+            <a:r>
+              <a:rPr lang="en-US" sz="1200" b="0" i="0" kern="1200" dirty="0" smtClean="0">
+                <a:solidFill>
+                  <a:schemeClr val="tx1"/>
+                </a:solidFill>
+                <a:effectLst/>
+                <a:latin typeface="Arial" pitchFamily="34" charset="0"/>
+                <a:ea typeface="+mn-ea"/>
+                <a:cs typeface="+mn-cs"/>
+              </a:rPr>
+              <a:t>handled over Bluetooth</a:t>
+            </a:r>
+          </a:p>
+          <a:p>
+            <a:r>
+              <a:rPr lang="en-US" sz="1200" b="0" i="0" kern="1200" dirty="0" smtClean="0">
+                <a:solidFill>
+                  <a:schemeClr val="tx1"/>
+                </a:solidFill>
+                <a:effectLst/>
+                <a:latin typeface="Arial" pitchFamily="34" charset="0"/>
+                <a:ea typeface="+mn-ea"/>
+                <a:cs typeface="+mn-cs"/>
+              </a:rPr>
+              <a:t>Useful information</a:t>
+            </a:r>
+            <a:r>
+              <a:rPr lang="en-US" sz="1200" b="0" i="0" kern="1200" baseline="0" dirty="0" smtClean="0">
+                <a:solidFill>
+                  <a:schemeClr val="tx1"/>
+                </a:solidFill>
+                <a:effectLst/>
+                <a:latin typeface="Arial" pitchFamily="34" charset="0"/>
+                <a:ea typeface="+mn-ea"/>
+                <a:cs typeface="+mn-cs"/>
+              </a:rPr>
+              <a:t> such as text messages, a coming call.</a:t>
+            </a:r>
+          </a:p>
+          <a:p>
+            <a:r>
+              <a:rPr lang="en-US" sz="1200" b="0" i="0" kern="1200" baseline="0" dirty="0" smtClean="0">
+                <a:solidFill>
+                  <a:schemeClr val="tx1"/>
+                </a:solidFill>
+                <a:effectLst/>
+                <a:latin typeface="Arial" pitchFamily="34" charset="0"/>
+                <a:ea typeface="+mn-ea"/>
+                <a:cs typeface="+mn-cs"/>
+              </a:rPr>
+              <a:t>Simple cards which presents all the relevant information, in a </a:t>
+            </a:r>
+            <a:r>
+              <a:rPr lang="en-US" sz="1200" b="0" i="0" kern="1200" baseline="0" dirty="0" err="1" smtClean="0">
+                <a:solidFill>
+                  <a:schemeClr val="tx1"/>
+                </a:solidFill>
+                <a:effectLst/>
+                <a:latin typeface="Arial" pitchFamily="34" charset="0"/>
+                <a:ea typeface="+mn-ea"/>
+                <a:cs typeface="+mn-cs"/>
+              </a:rPr>
+              <a:t>intuive</a:t>
+            </a:r>
+            <a:r>
+              <a:rPr lang="en-US" sz="1200" b="0" i="0" kern="1200" baseline="0" dirty="0" smtClean="0">
+                <a:solidFill>
+                  <a:schemeClr val="tx1"/>
+                </a:solidFill>
+                <a:effectLst/>
+                <a:latin typeface="Arial" pitchFamily="34" charset="0"/>
+                <a:ea typeface="+mn-ea"/>
+                <a:cs typeface="+mn-cs"/>
+              </a:rPr>
+              <a:t> way.</a:t>
+            </a:r>
+            <a:endParaRPr lang="en-US" sz="1200" b="0" i="0" kern="1200" dirty="0" smtClean="0">
+              <a:solidFill>
+                <a:schemeClr val="tx1"/>
+              </a:solidFill>
+              <a:effectLst/>
+              <a:latin typeface="Arial" pitchFamily="34" charset="0"/>
+              <a:ea typeface="+mn-ea"/>
+              <a:cs typeface="+mn-cs"/>
+            </a:endParaRPr>
+          </a:p>
+          <a:p>
+            <a:r>
+              <a:rPr lang="en-US" sz="1200" b="0" i="0" kern="1200" dirty="0" smtClean="0">
+                <a:solidFill>
+                  <a:schemeClr val="tx1"/>
+                </a:solidFill>
+                <a:effectLst/>
+                <a:latin typeface="Arial" pitchFamily="34" charset="0"/>
+                <a:ea typeface="+mn-ea"/>
+                <a:cs typeface="+mn-cs"/>
+              </a:rPr>
+              <a:t>Android Auto apps have a consistent design, with large, round buttons for easy touch points, and similar menu structures. The idea is that apps won't be any more distracting than they need to be (which is why user interface elements look the same from one app to another), and generally don't need more than a quick glance to be put to work.</a:t>
             </a:r>
             <a:endParaRPr lang="en-US" dirty="0"/>
           </a:p>
@@ -1460,7 +1685,7 @@
             <a:fld id="{1B06CD8F-B7ED-4A05-9FB1-A01CC0EF02CC}" type="slidenum">
               <a:rPr lang="fr-FR" smtClean="0"/>
               <a:pPr/>
-              <a:t>5</a:t>
+              <a:t>4</a:t>
             </a:fld>
             <a:endParaRPr lang="fr-FR" dirty="0"/>
           </a:p>
@@ -1469,7 +1694,7 @@
     </p:spTree>
     <p:extLst>
       <p:ext uri="{BB962C8B-B14F-4D97-AF65-F5344CB8AC3E}">
-        <p14:creationId xmlns:p14="http://schemas.microsoft.com/office/powerpoint/2010/main" val="3973816794"/>
+        <p14:creationId xmlns:p14="http://schemas.microsoft.com/office/powerpoint/2010/main" val="1830031258"/>
       </p:ext>
     </p:extLst>
   </p:cSld>
@@ -1525,55 +1750,31 @@
           <a:p>
             <a:r>
               <a:rPr lang="en-US" dirty="0" smtClean="0"/>
-              <a:t>Need to be android 5.0 plus</a:t>
-            </a:r>
-          </a:p>
-          <a:p>
-            <a:r>
-              <a:rPr lang="en-US" dirty="0" smtClean="0"/>
-              <a:t>5 panels -&gt; navigation,</a:t>
+              <a:t>The biggest advantage to use Android</a:t>
             </a:r>
             <a:r>
               <a:rPr lang="en-US" baseline="0" dirty="0" smtClean="0"/>
-              <a:t> phone log, home, media, car diagnosis</a:t>
+              <a:t> Auto instead of the implemented IVI (in vehicle infotainment) of a brand, is that using android Auto we get updates from google, however in a implemented IVI, once is done is done, there are no updates.</a:t>
             </a:r>
           </a:p>
           <a:p>
             <a:r>
               <a:rPr lang="en-US" baseline="0" dirty="0" smtClean="0"/>
-              <a:t>Important information, like a message received, from </a:t>
-            </a:r>
-            <a:r>
-              <a:rPr lang="en-US" baseline="0" dirty="0" err="1" smtClean="0"/>
-              <a:t>whatsupp</a:t>
-            </a:r>
+              <a:t>We know there are people who prefer using other apps for GPS Navigation, but in most of the videos and reviews we saw, they say that Google Maps is the best for being more precise and user friendly, than the others</a:t>
+            </a:r>
+          </a:p>
+          <a:p>
             <a:r>
               <a:rPr lang="en-US" baseline="0" dirty="0" smtClean="0"/>
-              <a:t>, </a:t>
-            </a:r>
-            <a:r>
-              <a:rPr lang="en-US" baseline="0" dirty="0" err="1" smtClean="0"/>
-              <a:t>facebook</a:t>
-            </a:r>
+              <a:t>We saw the comparison between voice control system between google and Apple, and the google voice control performs better, in the interpretation of what a person wants to say.</a:t>
+            </a:r>
+          </a:p>
+          <a:p>
             <a:r>
               <a:rPr lang="en-US" baseline="0" dirty="0" smtClean="0"/>
-              <a:t> </a:t>
-            </a:r>
-            <a:r>
-              <a:rPr lang="en-US" baseline="0" dirty="0" err="1" smtClean="0"/>
-              <a:t>messeger</a:t>
-            </a:r>
-            <a:r>
-              <a:rPr lang="en-US" baseline="0" dirty="0" smtClean="0"/>
-              <a:t> or hangouts</a:t>
-            </a:r>
-          </a:p>
-          <a:p>
-            <a:r>
-              <a:rPr lang="en-US" baseline="0" dirty="0" smtClean="0"/>
-              <a:t>A phone call incoming</a:t>
-            </a:r>
-            <a:endParaRPr lang="en-US" dirty="0" smtClean="0"/>
+              <a:t>We also don’t need to buy a new car or spend 700€ in a aftermarket display, we can simply use our phone to do the work.</a:t>
+            </a:r>
+            <a:endParaRPr lang="en-US" dirty="0"/>
           </a:p>
         </p:txBody>
       </p:sp>
@@ -1595,7 +1796,7 @@
             <a:fld id="{1B06CD8F-B7ED-4A05-9FB1-A01CC0EF02CC}" type="slidenum">
               <a:rPr lang="fr-FR" smtClean="0"/>
               <a:pPr/>
-              <a:t>7</a:t>
+              <a:t>5</a:t>
             </a:fld>
             <a:endParaRPr lang="fr-FR" dirty="0"/>
           </a:p>
@@ -1604,7 +1805,7 @@
     </p:spTree>
     <p:extLst>
       <p:ext uri="{BB962C8B-B14F-4D97-AF65-F5344CB8AC3E}">
-        <p14:creationId xmlns:p14="http://schemas.microsoft.com/office/powerpoint/2010/main" val="1564263606"/>
+        <p14:creationId xmlns:p14="http://schemas.microsoft.com/office/powerpoint/2010/main" val="3973816794"/>
       </p:ext>
     </p:extLst>
   </p:cSld>
@@ -1660,79 +1861,70 @@
           <a:p>
             <a:r>
               <a:rPr lang="en-US" dirty="0" smtClean="0"/>
-              <a:t>Like said before, the car sound system is connected</a:t>
+              <a:t>Need to be android 5.0 plus</a:t>
+            </a:r>
+          </a:p>
+          <a:p>
+            <a:r>
+              <a:rPr lang="en-US" dirty="0" smtClean="0"/>
+              <a:t>5 panels -&gt; navigation,</a:t>
             </a:r>
             <a:r>
               <a:rPr lang="en-US" baseline="0" dirty="0" smtClean="0"/>
-              <a:t> via </a:t>
+              <a:t> phone log, home, media, car </a:t>
+            </a:r>
+            <a:r>
+              <a:rPr lang="en-US" baseline="0" dirty="0" smtClean="0"/>
+              <a:t>diagnosis</a:t>
+            </a:r>
+          </a:p>
+          <a:p>
+            <a:r>
+              <a:rPr lang="en-US" baseline="0" dirty="0" smtClean="0"/>
+              <a:t>Home menu is organized in order to show some info like the weather current song, current destination and upcoming </a:t>
             </a:r>
             <a:r>
               <a:rPr lang="en-US" baseline="0" dirty="0" err="1" smtClean="0"/>
-              <a:t>bluethoot</a:t>
-            </a:r>
+              <a:t>appoitments</a:t>
+            </a:r>
+            <a:endParaRPr lang="en-US" baseline="0" dirty="0" smtClean="0"/>
+          </a:p>
+          <a:p>
             <a:r>
               <a:rPr lang="en-US" baseline="0" dirty="0" smtClean="0"/>
-              <a:t>.</a:t>
-            </a:r>
-          </a:p>
-          <a:p>
+              <a:t>Important information, like a message received, from </a:t>
+            </a:r>
+            <a:r>
+              <a:rPr lang="en-US" baseline="0" dirty="0" err="1" smtClean="0"/>
+              <a:t>whatsupp</a:t>
+            </a:r>
             <a:r>
               <a:rPr lang="en-US" baseline="0" dirty="0" smtClean="0"/>
-              <a:t>We have a lot of options to start a voice command, for example if we use the “OK Google”, we don’t need to touch the screen, and keep the eyes on the road at the same time we are doing something else.</a:t>
-            </a:r>
-          </a:p>
-          <a:p>
+              <a:t>, </a:t>
+            </a:r>
+            <a:r>
+              <a:rPr lang="en-US" baseline="0" dirty="0" err="1" smtClean="0"/>
+              <a:t>facebook</a:t>
+            </a:r>
             <a:r>
               <a:rPr lang="en-US" baseline="0" dirty="0" smtClean="0"/>
-              <a:t>A example to set the destination we can say “OK Google, set directions to …” and we say the address.</a:t>
-            </a:r>
-          </a:p>
-          <a:p>
+              <a:t> </a:t>
+            </a:r>
+            <a:r>
+              <a:rPr lang="en-US" baseline="0" dirty="0" err="1" smtClean="0"/>
+              <a:t>messeger</a:t>
+            </a:r>
             <a:r>
               <a:rPr lang="en-US" baseline="0" dirty="0" smtClean="0"/>
-              <a:t>We can also ask for a </a:t>
-            </a:r>
-            <a:r>
-              <a:rPr lang="en-US" sz="1200" b="0" i="0" kern="1200" dirty="0" smtClean="0">
-                <a:solidFill>
-                  <a:schemeClr val="tx1"/>
-                </a:solidFill>
-                <a:effectLst/>
-                <a:latin typeface="Arial" pitchFamily="34" charset="0"/>
-                <a:ea typeface="+mn-ea"/>
-                <a:cs typeface="+mn-cs"/>
-              </a:rPr>
-              <a:t>specific</a:t>
-            </a:r>
+              <a:t> or hangouts</a:t>
+            </a:r>
+          </a:p>
+          <a:p>
             <a:r>
               <a:rPr lang="en-US" baseline="0" dirty="0" smtClean="0"/>
-              <a:t> song in a </a:t>
-            </a:r>
-            <a:r>
-              <a:rPr lang="en-US" sz="1200" b="0" i="0" kern="1200" dirty="0" smtClean="0">
-                <a:solidFill>
-                  <a:schemeClr val="tx1"/>
-                </a:solidFill>
-                <a:effectLst/>
-                <a:latin typeface="Arial" pitchFamily="34" charset="0"/>
-                <a:ea typeface="+mn-ea"/>
-                <a:cs typeface="+mn-cs"/>
-              </a:rPr>
-              <a:t>specific</a:t>
-            </a:r>
-            <a:r>
-              <a:rPr lang="en-US" baseline="0" dirty="0" smtClean="0"/>
-              <a:t> app</a:t>
-            </a:r>
-          </a:p>
-          <a:p>
-            <a:r>
-              <a:rPr lang="en-US" baseline="0" dirty="0" smtClean="0"/>
-              <a:t>Basically, We can use every OK Google command available for android system</a:t>
-            </a:r>
-          </a:p>
-          <a:p>
-            <a:endParaRPr lang="en-US" dirty="0"/>
+              <a:t>A phone call incoming</a:t>
+            </a:r>
+            <a:endParaRPr lang="en-US" dirty="0" smtClean="0"/>
           </a:p>
         </p:txBody>
       </p:sp>
@@ -1754,7 +1946,7 @@
             <a:fld id="{1B06CD8F-B7ED-4A05-9FB1-A01CC0EF02CC}" type="slidenum">
               <a:rPr lang="fr-FR" smtClean="0"/>
               <a:pPr/>
-              <a:t>8</a:t>
+              <a:t>7</a:t>
             </a:fld>
             <a:endParaRPr lang="fr-FR" dirty="0"/>
           </a:p>
@@ -1763,7 +1955,7 @@
     </p:spTree>
     <p:extLst>
       <p:ext uri="{BB962C8B-B14F-4D97-AF65-F5344CB8AC3E}">
-        <p14:creationId xmlns:p14="http://schemas.microsoft.com/office/powerpoint/2010/main" val="4291574160"/>
+        <p14:creationId xmlns:p14="http://schemas.microsoft.com/office/powerpoint/2010/main" val="1564263606"/>
       </p:ext>
     </p:extLst>
   </p:cSld>
@@ -1819,18 +2011,78 @@
           <a:p>
             <a:r>
               <a:rPr lang="en-US" dirty="0" smtClean="0"/>
-              <a:t>Here is shown the phone screen and the car dash screen,</a:t>
+              <a:t>Like said before, the car sound system is connected</a:t>
             </a:r>
             <a:r>
               <a:rPr lang="en-US" baseline="0" dirty="0" smtClean="0"/>
-              <a:t> and the blue markers show the panel with 5 or 4 buttons</a:t>
-            </a:r>
-          </a:p>
-          <a:p>
+              <a:t> via </a:t>
+            </a:r>
+            <a:r>
+              <a:rPr lang="en-US" baseline="0" dirty="0" err="1" smtClean="0"/>
+              <a:t>bluethoot</a:t>
+            </a:r>
             <a:r>
               <a:rPr lang="en-US" baseline="0" dirty="0" smtClean="0"/>
-              <a:t>For car diagnosis the app called Torque is the one that is used</a:t>
-            </a:r>
+              <a:t>.</a:t>
+            </a:r>
+          </a:p>
+          <a:p>
+            <a:r>
+              <a:rPr lang="en-US" baseline="0" dirty="0" smtClean="0"/>
+              <a:t>We have a lot of options to start a voice command, for example if we use the “OK Google”, we don’t need to touch the screen, and keep the eyes on the road at the same time we are doing something else.</a:t>
+            </a:r>
+          </a:p>
+          <a:p>
+            <a:r>
+              <a:rPr lang="en-US" baseline="0" dirty="0" smtClean="0"/>
+              <a:t>A example to set the destination we can say “OK Google, set directions to …” and we say the address.</a:t>
+            </a:r>
+          </a:p>
+          <a:p>
+            <a:r>
+              <a:rPr lang="en-US" baseline="0" dirty="0" smtClean="0"/>
+              <a:t>We can also ask for a </a:t>
+            </a:r>
+            <a:r>
+              <a:rPr lang="en-US" sz="1200" b="0" i="0" kern="1200" dirty="0" smtClean="0">
+                <a:solidFill>
+                  <a:schemeClr val="tx1"/>
+                </a:solidFill>
+                <a:effectLst/>
+                <a:latin typeface="Arial" pitchFamily="34" charset="0"/>
+                <a:ea typeface="+mn-ea"/>
+                <a:cs typeface="+mn-cs"/>
+              </a:rPr>
+              <a:t>specific</a:t>
+            </a:r>
+            <a:r>
+              <a:rPr lang="en-US" baseline="0" dirty="0" smtClean="0"/>
+              <a:t> song in a </a:t>
+            </a:r>
+            <a:r>
+              <a:rPr lang="en-US" sz="1200" b="0" i="0" kern="1200" dirty="0" smtClean="0">
+                <a:solidFill>
+                  <a:schemeClr val="tx1"/>
+                </a:solidFill>
+                <a:effectLst/>
+                <a:latin typeface="Arial" pitchFamily="34" charset="0"/>
+                <a:ea typeface="+mn-ea"/>
+                <a:cs typeface="+mn-cs"/>
+              </a:rPr>
+              <a:t>specific</a:t>
+            </a:r>
+            <a:r>
+              <a:rPr lang="en-US" baseline="0" dirty="0" smtClean="0"/>
+              <a:t> app</a:t>
+            </a:r>
+          </a:p>
+          <a:p>
+            <a:r>
+              <a:rPr lang="en-US" baseline="0" dirty="0" smtClean="0"/>
+              <a:t>Basically, We can use every OK Google command available for android system</a:t>
+            </a:r>
+          </a:p>
+          <a:p>
             <a:endParaRPr lang="en-US" dirty="0"/>
           </a:p>
         </p:txBody>
@@ -1853,7 +2105,7 @@
             <a:fld id="{1B06CD8F-B7ED-4A05-9FB1-A01CC0EF02CC}" type="slidenum">
               <a:rPr lang="fr-FR" smtClean="0"/>
               <a:pPr/>
-              <a:t>9</a:t>
+              <a:t>8</a:t>
             </a:fld>
             <a:endParaRPr lang="fr-FR" dirty="0"/>
           </a:p>
@@ -1862,7 +2114,7 @@
     </p:spTree>
     <p:extLst>
       <p:ext uri="{BB962C8B-B14F-4D97-AF65-F5344CB8AC3E}">
-        <p14:creationId xmlns:p14="http://schemas.microsoft.com/office/powerpoint/2010/main" val="3316341565"/>
+        <p14:creationId xmlns:p14="http://schemas.microsoft.com/office/powerpoint/2010/main" val="4291574160"/>
       </p:ext>
     </p:extLst>
   </p:cSld>
@@ -1918,15 +2170,17 @@
           <a:p>
             <a:r>
               <a:rPr lang="en-US" dirty="0" smtClean="0"/>
-              <a:t>Here</a:t>
+              <a:t>Here is shown the phone screen and the car dash screen,</a:t>
             </a:r>
             <a:r>
               <a:rPr lang="en-US" baseline="0" dirty="0" smtClean="0"/>
-              <a:t> is shown some examples of the home menu, where we see the relevant information, in the case of the phone we see the current destination, the actual music and a received message, in the car dash is shown a received message, a coming appointment and the current </a:t>
-            </a:r>
-            <a:r>
-              <a:rPr lang="en-US" baseline="0" dirty="0" err="1" smtClean="0"/>
-              <a:t>wheather</a:t>
+              <a:t> and the blue markers show the panel with 5 or 4 buttons</a:t>
+            </a:r>
+          </a:p>
+          <a:p>
+            <a:r>
+              <a:rPr lang="en-US" baseline="0" dirty="0" smtClean="0"/>
+              <a:t>For car diagnosis the app called Torque is the one that is used</a:t>
             </a:r>
             <a:endParaRPr lang="en-US" dirty="0"/>
           </a:p>
@@ -1950,7 +2204,7 @@
             <a:fld id="{1B06CD8F-B7ED-4A05-9FB1-A01CC0EF02CC}" type="slidenum">
               <a:rPr lang="fr-FR" smtClean="0"/>
               <a:pPr/>
-              <a:t>10</a:t>
+              <a:t>9</a:t>
             </a:fld>
             <a:endParaRPr lang="fr-FR" dirty="0"/>
           </a:p>
@@ -1959,7 +2213,7 @@
     </p:spTree>
     <p:extLst>
       <p:ext uri="{BB962C8B-B14F-4D97-AF65-F5344CB8AC3E}">
-        <p14:creationId xmlns:p14="http://schemas.microsoft.com/office/powerpoint/2010/main" val="1596670375"/>
+        <p14:creationId xmlns:p14="http://schemas.microsoft.com/office/powerpoint/2010/main" val="3316341565"/>
       </p:ext>
     </p:extLst>
   </p:cSld>
@@ -2013,7 +2267,19 @@
           <a:bodyPr/>
           <a:lstStyle/>
           <a:p>
-            <a:endParaRPr lang="en-US"/>
+            <a:r>
+              <a:rPr lang="en-US" dirty="0" smtClean="0"/>
+              <a:t>Here</a:t>
+            </a:r>
+            <a:r>
+              <a:rPr lang="en-US" baseline="0" dirty="0" smtClean="0"/>
+              <a:t> is shown some examples of the home menu, where we see the relevant information, in the case of the phone we see the current destination, the actual music and a received message, in the car dash is shown a received message, a coming appointment and the current </a:t>
+            </a:r>
+            <a:r>
+              <a:rPr lang="en-US" baseline="0" dirty="0" err="1" smtClean="0"/>
+              <a:t>wheather</a:t>
+            </a:r>
+            <a:endParaRPr lang="en-US" dirty="0"/>
           </a:p>
         </p:txBody>
       </p:sp>
@@ -2035,7 +2301,7 @@
             <a:fld id="{1B06CD8F-B7ED-4A05-9FB1-A01CC0EF02CC}" type="slidenum">
               <a:rPr lang="fr-FR" smtClean="0"/>
               <a:pPr/>
-              <a:t>11</a:t>
+              <a:t>10</a:t>
             </a:fld>
             <a:endParaRPr lang="fr-FR" dirty="0"/>
           </a:p>
@@ -2044,7 +2310,7 @@
     </p:spTree>
     <p:extLst>
       <p:ext uri="{BB962C8B-B14F-4D97-AF65-F5344CB8AC3E}">
-        <p14:creationId xmlns:p14="http://schemas.microsoft.com/office/powerpoint/2010/main" val="4260471285"/>
+        <p14:creationId xmlns:p14="http://schemas.microsoft.com/office/powerpoint/2010/main" val="1596670375"/>
       </p:ext>
     </p:extLst>
   </p:cSld>
@@ -2098,13 +2364,7 @@
           <a:bodyPr/>
           <a:lstStyle/>
           <a:p>
-            <a:r>
-              <a:rPr lang="en-GB" dirty="0" smtClean="0"/>
-              <a:t>https://developer.android.com/training/auto/start/index.html#dev-project</a:t>
-            </a:r>
-          </a:p>
-          <a:p>
-            <a:endParaRPr lang="en-GB" dirty="0"/>
+            <a:endParaRPr lang="en-US"/>
           </a:p>
         </p:txBody>
       </p:sp>
@@ -2123,18 +2383,19 @@
           <a:bodyPr/>
           <a:lstStyle/>
           <a:p>
-            <a:fld id="{A5FE6474-0819-4CAC-A677-1ACC1221F957}" type="slidenum">
-              <a:rPr lang="en-GB" smtClean="0"/>
-              <a:t>13</a:t>
+            <a:fld id="{1B06CD8F-B7ED-4A05-9FB1-A01CC0EF02CC}" type="slidenum">
+              <a:rPr lang="fr-FR" smtClean="0"/>
+              <a:pPr/>
+              <a:t>11</a:t>
             </a:fld>
-            <a:endParaRPr lang="en-GB"/>
+            <a:endParaRPr lang="fr-FR" dirty="0"/>
           </a:p>
         </p:txBody>
       </p:sp>
     </p:spTree>
     <p:extLst>
       <p:ext uri="{BB962C8B-B14F-4D97-AF65-F5344CB8AC3E}">
-        <p14:creationId xmlns:p14="http://schemas.microsoft.com/office/powerpoint/2010/main" val="4288258623"/>
+        <p14:creationId xmlns:p14="http://schemas.microsoft.com/office/powerpoint/2010/main" val="4260471285"/>
       </p:ext>
     </p:extLst>
   </p:cSld>
@@ -17475,7 +17736,15 @@
             </a:pPr>
             <a:r>
               <a:rPr lang="en-US" dirty="0" smtClean="0"/>
-              <a:t>There are 37 brands of cars that have already implemented Android auto in some models, such as: Audi, Chevrolet, Lamborghini and Volvo</a:t>
+              <a:t>There are 37 brands of cars that have </a:t>
+            </a:r>
+            <a:r>
+              <a:rPr lang="en-US" dirty="0" smtClean="0"/>
+              <a:t>already </a:t>
+            </a:r>
+            <a:r>
+              <a:rPr lang="en-US" dirty="0" smtClean="0"/>
+              <a:t>implemented Android auto in some models, such as: Audi, Chevrolet, Lamborghini and Volvo</a:t>
             </a:r>
           </a:p>
           <a:p>
@@ -18898,7 +19167,15 @@
             </a:pPr>
             <a:r>
               <a:rPr lang="en-US" dirty="0" smtClean="0"/>
-              <a:t>Android Application for smartphone that allows a connection with the car using a USB cable</a:t>
+              <a:t>Android Application for smartphone that allows a connection with the </a:t>
+            </a:r>
+            <a:r>
+              <a:rPr lang="en-US" dirty="0" smtClean="0"/>
+              <a:t>car dash display </a:t>
+            </a:r>
+            <a:r>
+              <a:rPr lang="en-US" dirty="0" smtClean="0"/>
+              <a:t>using a USB cable</a:t>
             </a:r>
           </a:p>
           <a:p>
@@ -19160,8 +19437,9 @@
             </a:pPr>
             <a:r>
               <a:rPr lang="en-US" dirty="0" smtClean="0"/>
-              <a:t>Voice Control </a:t>
-            </a:r>
+              <a:t>Voice Command </a:t>
+            </a:r>
+            <a:endParaRPr lang="en-US" dirty="0" smtClean="0"/>
           </a:p>
           <a:p>
             <a:pPr marL="171450" indent="-171450" algn="l">
@@ -19174,7 +19452,15 @@
             <a:pPr marL="280988" lvl="1" indent="-171450" algn="l"/>
             <a:r>
               <a:rPr lang="en-US" dirty="0" smtClean="0"/>
-              <a:t>Speech recognition from Google is more refined, and his able to interpret more commands</a:t>
+              <a:t>Speech recognition from </a:t>
+            </a:r>
+            <a:r>
+              <a:rPr lang="en-US" dirty="0" smtClean="0"/>
+              <a:t>Google </a:t>
+            </a:r>
+            <a:r>
+              <a:rPr lang="en-US" dirty="0" smtClean="0"/>
+              <a:t>is more refined, and his able to interpret more commands</a:t>
             </a:r>
             <a:endParaRPr lang="en-US" dirty="0"/>
           </a:p>
@@ -19734,7 +20020,7 @@
           <a:p>
             <a:r>
               <a:rPr lang="en-US" dirty="0" smtClean="0"/>
-              <a:t>Voice Command</a:t>
+              <a:t>Google Assistant</a:t>
             </a:r>
             <a:endParaRPr lang="en-US" dirty="0"/>
           </a:p>
@@ -19761,7 +20047,15 @@
             </a:pPr>
             <a:r>
               <a:rPr lang="en-US" dirty="0" smtClean="0"/>
-              <a:t>To start Voice Command we can use:</a:t>
+              <a:t>To start </a:t>
+            </a:r>
+            <a:r>
+              <a:rPr lang="en-US" dirty="0" smtClean="0"/>
+              <a:t>Google Assistant we </a:t>
+            </a:r>
+            <a:r>
+              <a:rPr lang="en-US" dirty="0" smtClean="0"/>
+              <a:t>can use:</a:t>
             </a:r>
           </a:p>
           <a:p>
@@ -19823,7 +20117,15 @@
             </a:pPr>
             <a:r>
               <a:rPr lang="en-US" dirty="0" smtClean="0"/>
-              <a:t>Using Voice Command we can:</a:t>
+              <a:t>Using </a:t>
+            </a:r>
+            <a:r>
+              <a:rPr lang="en-US" dirty="0" smtClean="0"/>
+              <a:t>Google Assistant we </a:t>
+            </a:r>
+            <a:r>
+              <a:rPr lang="en-US" dirty="0" smtClean="0"/>
+              <a:t>can:</a:t>
             </a:r>
           </a:p>
           <a:p>
@@ -21003,15 +21305,6 @@
 </file>
 
 <file path=customXml/item1.xml><?xml version="1.0" encoding="utf-8"?>
-<?mso-contentType ?>
-<FormTemplates xmlns="http://schemas.microsoft.com/sharepoint/v3/contenttype/forms">
-  <Display>DocumentLibraryForm</Display>
-  <Edit>DocumentLibraryForm</Edit>
-  <New>DocumentLibraryForm</New>
-</FormTemplates>
-</file>
-
-<file path=customXml/item2.xml><?xml version="1.0" encoding="utf-8"?>
 <ct:contentTypeSchema xmlns:ct="http://schemas.microsoft.com/office/2006/metadata/contentType" xmlns:ma="http://schemas.microsoft.com/office/2006/metadata/properties/metaAttributes" ct:_="" ma:_="" ma:contentTypeName="Document" ma:contentTypeID="0x0101001F419E1A6EA81A4789CC2A27D54FE063" ma:contentTypeVersion="2" ma:contentTypeDescription="Create a new document." ma:contentTypeScope="" ma:versionID="6e5cb36ff88c0f99687fc20d43474a84">
   <xsd:schema xmlns:xsd="http://www.w3.org/2001/XMLSchema" xmlns:xs="http://www.w3.org/2001/XMLSchema" xmlns:p="http://schemas.microsoft.com/office/2006/metadata/properties" targetNamespace="http://schemas.microsoft.com/office/2006/metadata/properties" ma:root="true" ma:fieldsID="0d665e38e66d01d06a7f476fcfe73af8">
     <xsd:element name="properties">
@@ -21125,6 +21418,15 @@
 </ct:contentTypeSchema>
 </file>
 
+<file path=customXml/item2.xml><?xml version="1.0" encoding="utf-8"?>
+<?mso-contentType ?>
+<FormTemplates xmlns="http://schemas.microsoft.com/sharepoint/v3/contenttype/forms">
+  <Display>DocumentLibraryForm</Display>
+  <Edit>DocumentLibraryForm</Edit>
+  <New>DocumentLibraryForm</New>
+</FormTemplates>
+</file>
+
 <file path=customXml/item3.xml><?xml version="1.0" encoding="utf-8"?>
 <p:properties xmlns:p="http://schemas.microsoft.com/office/2006/metadata/properties" xmlns:xsi="http://www.w3.org/2001/XMLSchema-instance" xmlns:pc="http://schemas.microsoft.com/office/infopath/2007/PartnerControls">
   <documentManagement/>
@@ -21132,14 +21434,6 @@
 </file>
 
 <file path=customXml/itemProps1.xml><?xml version="1.0" encoding="utf-8"?>
-<ds:datastoreItem xmlns:ds="http://schemas.openxmlformats.org/officeDocument/2006/customXml" ds:itemID="{74695D99-3EAE-4F55-A2B4-F38051B8FE0A}">
-  <ds:schemaRefs>
-    <ds:schemaRef ds:uri="http://schemas.microsoft.com/sharepoint/v3/contenttype/forms"/>
-  </ds:schemaRefs>
-</ds:datastoreItem>
-</file>
-
-<file path=customXml/itemProps2.xml><?xml version="1.0" encoding="utf-8"?>
 <ds:datastoreItem xmlns:ds="http://schemas.openxmlformats.org/officeDocument/2006/customXml" ds:itemID="{71BEF1E5-09DF-46B0-9968-4DC05085673B}">
   <ds:schemaRefs>
     <ds:schemaRef ds:uri="http://schemas.microsoft.com/office/2006/metadata/contentType"/>
@@ -21155,17 +21449,25 @@
 </ds:datastoreItem>
 </file>
 
+<file path=customXml/itemProps2.xml><?xml version="1.0" encoding="utf-8"?>
+<ds:datastoreItem xmlns:ds="http://schemas.openxmlformats.org/officeDocument/2006/customXml" ds:itemID="{74695D99-3EAE-4F55-A2B4-F38051B8FE0A}">
+  <ds:schemaRefs>
+    <ds:schemaRef ds:uri="http://schemas.microsoft.com/sharepoint/v3/contenttype/forms"/>
+  </ds:schemaRefs>
+</ds:datastoreItem>
+</file>
+
 <file path=customXml/itemProps3.xml><?xml version="1.0" encoding="utf-8"?>
 <ds:datastoreItem xmlns:ds="http://schemas.openxmlformats.org/officeDocument/2006/customXml" ds:itemID="{65F64EBE-3065-4A3D-B86E-F21B0406FD66}">
   <ds:schemaRefs>
-    <ds:schemaRef ds:uri="http://purl.org/dc/dcmitype/"/>
+    <ds:schemaRef ds:uri="http://schemas.microsoft.com/office/2006/metadata/properties"/>
+    <ds:schemaRef ds:uri="http://schemas.microsoft.com/office/2006/documentManagement/types"/>
     <ds:schemaRef ds:uri="http://www.w3.org/XML/1998/namespace"/>
     <ds:schemaRef ds:uri="http://purl.org/dc/elements/1.1/"/>
+    <ds:schemaRef ds:uri="http://schemas.openxmlformats.org/package/2006/metadata/core-properties"/>
     <ds:schemaRef ds:uri="http://schemas.microsoft.com/office/infopath/2007/PartnerControls"/>
+    <ds:schemaRef ds:uri="http://purl.org/dc/dcmitype/"/>
     <ds:schemaRef ds:uri="http://purl.org/dc/terms/"/>
-    <ds:schemaRef ds:uri="http://schemas.microsoft.com/office/2006/documentManagement/types"/>
-    <ds:schemaRef ds:uri="http://schemas.openxmlformats.org/package/2006/metadata/core-properties"/>
-    <ds:schemaRef ds:uri="http://schemas.microsoft.com/office/2006/metadata/properties"/>
   </ds:schemaRefs>
 </ds:datastoreItem>
 </file>
</xml_diff>

<commit_message>
my notes Added- Joao
</commit_message>
<xml_diff>
--- a/PowerPoint Final/Presentation_Joao_Mauro.pptx
+++ b/PowerPoint Final/Presentation_Joao_Mauro.pptx
@@ -950,27 +950,13 @@
           <a:bodyPr/>
           <a:lstStyle/>
           <a:p>
-            <a:pPr marL="0" marR="0" lvl="0" indent="0" algn="l" defTabSz="914400" rtl="0" eaLnBrk="1" fontAlgn="auto" latinLnBrk="0" hangingPunct="1">
-              <a:lnSpc>
-                <a:spcPct val="100000"/>
-              </a:lnSpc>
-              <a:spcBef>
-                <a:spcPts val="0"/>
-              </a:spcBef>
-              <a:spcAft>
-                <a:spcPts val="0"/>
-              </a:spcAft>
-              <a:buClrTx/>
-              <a:buSzTx/>
-              <a:buFontTx/>
-              <a:buNone/>
-              <a:tabLst/>
-              <a:defRPr/>
-            </a:pPr>
-            <a:r>
-              <a:rPr lang="en-US" dirty="0" smtClean="0"/>
-              <a:t>Android Auto can contact your service to do the following:</a:t>
-            </a:r>
+            <a:r>
+              <a:rPr lang="en-GB" dirty="0" smtClean="0"/>
+              <a:t>https://developer.android.com/training/auto/start/index.html#dev-project</a:t>
+            </a:r>
+          </a:p>
+          <a:p>
+            <a:endParaRPr lang="en-GB" dirty="0"/>
           </a:p>
         </p:txBody>
       </p:sp>
@@ -991,7 +977,7 @@
           <a:p>
             <a:fld id="{A5FE6474-0819-4CAC-A677-1ACC1221F957}" type="slidenum">
               <a:rPr lang="en-GB" smtClean="0"/>
-              <a:t>14</a:t>
+              <a:t>13</a:t>
             </a:fld>
             <a:endParaRPr lang="en-GB"/>
           </a:p>
@@ -1000,7 +986,7 @@
     </p:spTree>
     <p:extLst>
       <p:ext uri="{BB962C8B-B14F-4D97-AF65-F5344CB8AC3E}">
-        <p14:creationId xmlns:p14="http://schemas.microsoft.com/office/powerpoint/2010/main" val="1749210354"/>
+        <p14:creationId xmlns:p14="http://schemas.microsoft.com/office/powerpoint/2010/main" val="4288258623"/>
       </p:ext>
     </p:extLst>
   </p:cSld>
@@ -1054,7 +1040,27 @@
           <a:bodyPr/>
           <a:lstStyle/>
           <a:p>
-            <a:endParaRPr lang="en-GB" dirty="0"/>
+            <a:pPr marL="0" marR="0" lvl="0" indent="0" algn="l" defTabSz="914400" rtl="0" eaLnBrk="1" fontAlgn="auto" latinLnBrk="0" hangingPunct="1">
+              <a:lnSpc>
+                <a:spcPct val="100000"/>
+              </a:lnSpc>
+              <a:spcBef>
+                <a:spcPts val="0"/>
+              </a:spcBef>
+              <a:spcAft>
+                <a:spcPts val="0"/>
+              </a:spcAft>
+              <a:buClrTx/>
+              <a:buSzTx/>
+              <a:buFontTx/>
+              <a:buNone/>
+              <a:tabLst/>
+              <a:defRPr/>
+            </a:pPr>
+            <a:r>
+              <a:rPr lang="en-US" dirty="0" smtClean="0"/>
+              <a:t>Android Auto can contact your service to do the following:</a:t>
+            </a:r>
           </a:p>
         </p:txBody>
       </p:sp>
@@ -1075,7 +1081,7 @@
           <a:p>
             <a:fld id="{A5FE6474-0819-4CAC-A677-1ACC1221F957}" type="slidenum">
               <a:rPr lang="en-GB" smtClean="0"/>
-              <a:t>16</a:t>
+              <a:t>14</a:t>
             </a:fld>
             <a:endParaRPr lang="en-GB"/>
           </a:p>
@@ -1084,7 +1090,7 @@
     </p:spTree>
     <p:extLst>
       <p:ext uri="{BB962C8B-B14F-4D97-AF65-F5344CB8AC3E}">
-        <p14:creationId xmlns:p14="http://schemas.microsoft.com/office/powerpoint/2010/main" val="3694532524"/>
+        <p14:creationId xmlns:p14="http://schemas.microsoft.com/office/powerpoint/2010/main" val="1749210354"/>
       </p:ext>
     </p:extLst>
   </p:cSld>
@@ -1138,10 +1144,6 @@
           <a:bodyPr/>
           <a:lstStyle/>
           <a:p>
-            <a:r>
-              <a:rPr lang="en-GB" dirty="0" smtClean="0"/>
-              <a:t>https://developer.android.com/distribute/best-practices/launch/distribute-auto.html#how_to_participate</a:t>
-            </a:r>
             <a:endParaRPr lang="en-GB" dirty="0"/>
           </a:p>
         </p:txBody>
@@ -1163,7 +1165,7 @@
           <a:p>
             <a:fld id="{A5FE6474-0819-4CAC-A677-1ACC1221F957}" type="slidenum">
               <a:rPr lang="en-GB" smtClean="0"/>
-              <a:t>18</a:t>
+              <a:t>16</a:t>
             </a:fld>
             <a:endParaRPr lang="en-GB"/>
           </a:p>
@@ -1172,7 +1174,7 @@
     </p:spTree>
     <p:extLst>
       <p:ext uri="{BB962C8B-B14F-4D97-AF65-F5344CB8AC3E}">
-        <p14:creationId xmlns:p14="http://schemas.microsoft.com/office/powerpoint/2010/main" val="3504536707"/>
+        <p14:creationId xmlns:p14="http://schemas.microsoft.com/office/powerpoint/2010/main" val="3694532524"/>
       </p:ext>
     </p:extLst>
   </p:cSld>
@@ -1227,29 +1229,9 @@
           <a:lstStyle/>
           <a:p>
             <a:r>
-              <a:rPr lang="en-US" dirty="0" smtClean="0"/>
-              <a:t>They implemented the Android source code by reconfiguring it into a car OS, without involving Google</a:t>
-            </a:r>
-          </a:p>
-          <a:p>
-            <a:endParaRPr lang="en-US" dirty="0" smtClean="0"/>
-          </a:p>
-          <a:p>
-            <a:r>
-              <a:rPr lang="en-US" dirty="0" smtClean="0"/>
-              <a:t>This attempt, unfortunately, has failed because by the time the product reached the market (after a long development process), the version of Android launched was older and it cannot be updated</a:t>
-            </a:r>
-          </a:p>
-          <a:p>
-            <a:endParaRPr lang="en-US" dirty="0" smtClean="0"/>
-          </a:p>
-          <a:p>
-            <a:r>
-              <a:rPr lang="en-US" dirty="0" smtClean="0"/>
-              <a:t>Though the anticipation that Google will produce a Play Store for the car OS is still not been confirmed. But the latest OS promises the control for Heating, ventilation and air conditioning (HVAC) unit and radio as well.</a:t>
-            </a:r>
-          </a:p>
-          <a:p>
+              <a:rPr lang="en-GB" dirty="0" smtClean="0"/>
+              <a:t>https://developer.android.com/distribute/best-practices/launch/distribute-auto.html#how_to_participate</a:t>
+            </a:r>
             <a:endParaRPr lang="en-GB" dirty="0"/>
           </a:p>
         </p:txBody>
@@ -1269,19 +1251,18 @@
           <a:bodyPr/>
           <a:lstStyle/>
           <a:p>
-            <a:fld id="{1B06CD8F-B7ED-4A05-9FB1-A01CC0EF02CC}" type="slidenum">
-              <a:rPr lang="fr-FR" smtClean="0"/>
-              <a:pPr/>
-              <a:t>21</a:t>
+            <a:fld id="{A5FE6474-0819-4CAC-A677-1ACC1221F957}" type="slidenum">
+              <a:rPr lang="en-GB" smtClean="0"/>
+              <a:t>18</a:t>
             </a:fld>
-            <a:endParaRPr lang="fr-FR" dirty="0"/>
+            <a:endParaRPr lang="en-GB"/>
           </a:p>
         </p:txBody>
       </p:sp>
     </p:spTree>
     <p:extLst>
       <p:ext uri="{BB962C8B-B14F-4D97-AF65-F5344CB8AC3E}">
-        <p14:creationId xmlns:p14="http://schemas.microsoft.com/office/powerpoint/2010/main" val="1471383405"/>
+        <p14:creationId xmlns:p14="http://schemas.microsoft.com/office/powerpoint/2010/main" val="3504536707"/>
       </p:ext>
     </p:extLst>
   </p:cSld>
@@ -1335,6 +1316,115 @@
           <a:bodyPr/>
           <a:lstStyle/>
           <a:p>
+            <a:r>
+              <a:rPr lang="en-US" dirty="0" smtClean="0"/>
+              <a:t>They implemented the Android source code by reconfiguring it into a car OS, without involving Google</a:t>
+            </a:r>
+          </a:p>
+          <a:p>
+            <a:endParaRPr lang="en-US" dirty="0" smtClean="0"/>
+          </a:p>
+          <a:p>
+            <a:r>
+              <a:rPr lang="en-US" dirty="0" smtClean="0"/>
+              <a:t>This attempt, unfortunately, has failed because by the time the product reached the market (after a long development process), the version of Android launched was older and it cannot be updated</a:t>
+            </a:r>
+          </a:p>
+          <a:p>
+            <a:endParaRPr lang="en-US" dirty="0" smtClean="0"/>
+          </a:p>
+          <a:p>
+            <a:r>
+              <a:rPr lang="en-US" dirty="0" smtClean="0"/>
+              <a:t>Though the anticipation that Google will produce a Play Store for the car OS is still not been confirmed. But the latest OS promises the control for Heating, ventilation and air conditioning (HVAC) unit and radio as well.</a:t>
+            </a:r>
+          </a:p>
+          <a:p>
+            <a:endParaRPr lang="en-GB" dirty="0"/>
+          </a:p>
+        </p:txBody>
+      </p:sp>
+      <p:sp>
+        <p:nvSpPr>
+          <p:cNvPr id="4" name="Slide Number Placeholder 3"/>
+          <p:cNvSpPr>
+            <a:spLocks noGrp="1"/>
+          </p:cNvSpPr>
+          <p:nvPr>
+            <p:ph type="sldNum" sz="quarter" idx="10"/>
+          </p:nvPr>
+        </p:nvSpPr>
+        <p:spPr/>
+        <p:txBody>
+          <a:bodyPr/>
+          <a:lstStyle/>
+          <a:p>
+            <a:fld id="{1B06CD8F-B7ED-4A05-9FB1-A01CC0EF02CC}" type="slidenum">
+              <a:rPr lang="fr-FR" smtClean="0"/>
+              <a:pPr/>
+              <a:t>21</a:t>
+            </a:fld>
+            <a:endParaRPr lang="fr-FR" dirty="0"/>
+          </a:p>
+        </p:txBody>
+      </p:sp>
+    </p:spTree>
+    <p:extLst>
+      <p:ext uri="{BB962C8B-B14F-4D97-AF65-F5344CB8AC3E}">
+        <p14:creationId xmlns:p14="http://schemas.microsoft.com/office/powerpoint/2010/main" val="1471383405"/>
+      </p:ext>
+    </p:extLst>
+  </p:cSld>
+  <p:clrMapOvr>
+    <a:masterClrMapping/>
+  </p:clrMapOvr>
+</p:notes>
+</file>
+
+<file path=ppt/notesSlides/notesSlide15.xml><?xml version="1.0" encoding="utf-8"?>
+<p:notes xmlns:a="http://schemas.openxmlformats.org/drawingml/2006/main" xmlns:r="http://schemas.openxmlformats.org/officeDocument/2006/relationships" xmlns:p="http://schemas.openxmlformats.org/presentationml/2006/main">
+  <p:cSld>
+    <p:spTree>
+      <p:nvGrpSpPr>
+        <p:cNvPr id="1" name=""/>
+        <p:cNvGrpSpPr/>
+        <p:nvPr/>
+      </p:nvGrpSpPr>
+      <p:grpSpPr>
+        <a:xfrm>
+          <a:off x="0" y="0"/>
+          <a:ext cx="0" cy="0"/>
+          <a:chOff x="0" y="0"/>
+          <a:chExt cx="0" cy="0"/>
+        </a:xfrm>
+      </p:grpSpPr>
+      <p:sp>
+        <p:nvSpPr>
+          <p:cNvPr id="2" name="Slide Image Placeholder 1"/>
+          <p:cNvSpPr>
+            <a:spLocks noGrp="1" noRot="1" noChangeAspect="1"/>
+          </p:cNvSpPr>
+          <p:nvPr>
+            <p:ph type="sldImg"/>
+          </p:nvPr>
+        </p:nvSpPr>
+        <p:spPr/>
+      </p:sp>
+      <p:sp>
+        <p:nvSpPr>
+          <p:cNvPr id="3" name="Notes Placeholder 2"/>
+          <p:cNvSpPr>
+            <a:spLocks noGrp="1"/>
+          </p:cNvSpPr>
+          <p:nvPr>
+            <p:ph type="body" idx="1"/>
+          </p:nvPr>
+        </p:nvSpPr>
+        <p:spPr/>
+        <p:txBody>
+          <a:bodyPr/>
+          <a:lstStyle/>
+          <a:p>
             <a:pPr marL="0" marR="0" lvl="0" indent="0" algn="l" defTabSz="914400" rtl="0" eaLnBrk="1" fontAlgn="auto" latinLnBrk="0" hangingPunct="1">
               <a:lnSpc>
                 <a:spcPct val="100000"/>
@@ -1472,7 +1562,7 @@
 </p:notes>
 </file>
 
-<file path=ppt/notesSlides/notesSlide15.xml><?xml version="1.0" encoding="utf-8"?>
+<file path=ppt/notesSlides/notesSlide16.xml><?xml version="1.0" encoding="utf-8"?>
 <p:notes xmlns:a="http://schemas.openxmlformats.org/drawingml/2006/main" xmlns:r="http://schemas.openxmlformats.org/officeDocument/2006/relationships" xmlns:p="http://schemas.openxmlformats.org/presentationml/2006/main">
   <p:cSld>
     <p:spTree>
@@ -1718,31 +1808,145 @@
           <a:lstStyle/>
           <a:p>
             <a:r>
-              <a:rPr lang="en-US" dirty="0" smtClean="0"/>
-              <a:t>The biggest advantage to use Android</a:t>
-            </a:r>
-            <a:r>
-              <a:rPr lang="en-US" baseline="0" dirty="0" smtClean="0"/>
-              <a:t> Auto instead of the implemented IVI (in vehicle infotainment) of a brand, is that using android Auto we get updates from google, however in a implemented IVI, once is done is done, there are no updates.</a:t>
-            </a:r>
-          </a:p>
-          <a:p>
-            <a:r>
-              <a:rPr lang="en-US" baseline="0" dirty="0" smtClean="0"/>
-              <a:t>We know there are people who prefer using other apps for GPS Navigation, but in most of the videos and reviews we saw, they say that Google Maps is the best for being more precise and user friendly, than the others</a:t>
-            </a:r>
-          </a:p>
-          <a:p>
-            <a:r>
-              <a:rPr lang="en-US" baseline="0" dirty="0" smtClean="0"/>
-              <a:t>We saw the comparison between voice control system between google and Apple, and the google voice control performs better, in the interpretation of what a person wants to say.</a:t>
-            </a:r>
-          </a:p>
-          <a:p>
-            <a:r>
-              <a:rPr lang="en-US" baseline="0" dirty="0" smtClean="0"/>
-              <a:t>We also don’t need to buy a new car or spend 700€ in a aftermarket display, we can simply use our phone to do the work.</a:t>
-            </a:r>
+              <a:rPr lang="en-US" sz="1200" b="0" i="0" kern="1200" dirty="0" smtClean="0">
+                <a:solidFill>
+                  <a:schemeClr val="tx1"/>
+                </a:solidFill>
+                <a:effectLst/>
+                <a:latin typeface="Arial" pitchFamily="34" charset="0"/>
+                <a:ea typeface="+mn-ea"/>
+                <a:cs typeface="+mn-cs"/>
+              </a:rPr>
+              <a:t>Android Auto works by projecting Android apps onto </a:t>
+            </a:r>
+            <a:r>
+              <a:rPr lang="en-US" sz="1200" b="0" i="0" kern="1200" dirty="0" err="1" smtClean="0">
+                <a:solidFill>
+                  <a:schemeClr val="tx1"/>
+                </a:solidFill>
+                <a:effectLst/>
+                <a:latin typeface="Arial" pitchFamily="34" charset="0"/>
+                <a:ea typeface="+mn-ea"/>
+                <a:cs typeface="+mn-cs"/>
+              </a:rPr>
+              <a:t>onto</a:t>
+            </a:r>
+            <a:r>
+              <a:rPr lang="en-US" sz="1200" b="0" i="0" kern="1200" dirty="0" smtClean="0">
+                <a:solidFill>
+                  <a:schemeClr val="tx1"/>
+                </a:solidFill>
+                <a:effectLst/>
+                <a:latin typeface="Arial" pitchFamily="34" charset="0"/>
+                <a:ea typeface="+mn-ea"/>
+                <a:cs typeface="+mn-cs"/>
+              </a:rPr>
+              <a:t> the in-car display after the phone has been plugged in to the car via USB</a:t>
+            </a:r>
+          </a:p>
+          <a:p>
+            <a:r>
+              <a:rPr lang="en-US" sz="1200" b="0" i="0" kern="1200" dirty="0" smtClean="0">
+                <a:solidFill>
+                  <a:schemeClr val="tx1"/>
+                </a:solidFill>
+                <a:effectLst/>
+                <a:latin typeface="Arial" pitchFamily="34" charset="0"/>
+                <a:ea typeface="+mn-ea"/>
+                <a:cs typeface="+mn-cs"/>
+              </a:rPr>
+              <a:t>Phone calls are going to be handled over Bluetooth</a:t>
+            </a:r>
+          </a:p>
+          <a:p>
+            <a:r>
+              <a:rPr lang="en-US" sz="1200" b="0" i="0" kern="1200" dirty="0" smtClean="0">
+                <a:solidFill>
+                  <a:schemeClr val="tx1"/>
+                </a:solidFill>
+                <a:effectLst/>
+                <a:latin typeface="Arial" pitchFamily="34" charset="0"/>
+                <a:ea typeface="+mn-ea"/>
+                <a:cs typeface="+mn-cs"/>
+              </a:rPr>
+              <a:t>Useful information</a:t>
+            </a:r>
+            <a:r>
+              <a:rPr lang="en-US" sz="1200" b="0" i="0" kern="1200" baseline="0" dirty="0" smtClean="0">
+                <a:solidFill>
+                  <a:schemeClr val="tx1"/>
+                </a:solidFill>
+                <a:effectLst/>
+                <a:latin typeface="Arial" pitchFamily="34" charset="0"/>
+                <a:ea typeface="+mn-ea"/>
+                <a:cs typeface="+mn-cs"/>
+              </a:rPr>
+              <a:t> such as text messages, a coming call.</a:t>
+            </a:r>
+          </a:p>
+          <a:p>
+            <a:r>
+              <a:rPr lang="en-US" sz="1200" b="0" i="0" kern="1200" baseline="0" dirty="0" smtClean="0">
+                <a:solidFill>
+                  <a:schemeClr val="tx1"/>
+                </a:solidFill>
+                <a:effectLst/>
+                <a:latin typeface="Arial" pitchFamily="34" charset="0"/>
+                <a:ea typeface="+mn-ea"/>
+                <a:cs typeface="+mn-cs"/>
+              </a:rPr>
+              <a:t>Simple cards which presents all the relevant information, in a </a:t>
+            </a:r>
+            <a:r>
+              <a:rPr lang="en-US" sz="1200" b="0" i="0" kern="1200" baseline="0" dirty="0" err="1" smtClean="0">
+                <a:solidFill>
+                  <a:schemeClr val="tx1"/>
+                </a:solidFill>
+                <a:effectLst/>
+                <a:latin typeface="Arial" pitchFamily="34" charset="0"/>
+                <a:ea typeface="+mn-ea"/>
+                <a:cs typeface="+mn-cs"/>
+              </a:rPr>
+              <a:t>intuive</a:t>
+            </a:r>
+            <a:r>
+              <a:rPr lang="en-US" sz="1200" b="0" i="0" kern="1200" baseline="0" dirty="0" smtClean="0">
+                <a:solidFill>
+                  <a:schemeClr val="tx1"/>
+                </a:solidFill>
+                <a:effectLst/>
+                <a:latin typeface="Arial" pitchFamily="34" charset="0"/>
+                <a:ea typeface="+mn-ea"/>
+                <a:cs typeface="+mn-cs"/>
+              </a:rPr>
+              <a:t> way.</a:t>
+            </a:r>
+            <a:endParaRPr lang="en-US" sz="1200" b="0" i="0" kern="1200" dirty="0" smtClean="0">
+              <a:solidFill>
+                <a:schemeClr val="tx1"/>
+              </a:solidFill>
+              <a:effectLst/>
+              <a:latin typeface="Arial" pitchFamily="34" charset="0"/>
+              <a:ea typeface="+mn-ea"/>
+              <a:cs typeface="+mn-cs"/>
+            </a:endParaRPr>
+          </a:p>
+          <a:p>
+            <a:r>
+              <a:rPr lang="en-US" sz="1200" b="0" i="0" kern="1200" dirty="0" smtClean="0">
+                <a:solidFill>
+                  <a:schemeClr val="tx1"/>
+                </a:solidFill>
+                <a:effectLst/>
+                <a:latin typeface="Arial" pitchFamily="34" charset="0"/>
+                <a:ea typeface="+mn-ea"/>
+                <a:cs typeface="+mn-cs"/>
+              </a:rPr>
+              <a:t>Android Auto apps have a consistent design, with large, round buttons for easy touch points, and similar menu structures. The idea is that apps won't be any more distracting than they need to be (which is why user interface elements look the same from one app to another), and generally don't need more than a quick glance to be put to work.</a:t>
+            </a:r>
+            <a:endParaRPr lang="en-US" dirty="0" smtClean="0"/>
+          </a:p>
+          <a:p>
             <a:endParaRPr lang="en-US" dirty="0"/>
           </a:p>
         </p:txBody>
@@ -1765,7 +1969,7 @@
             <a:fld id="{1B06CD8F-B7ED-4A05-9FB1-A01CC0EF02CC}" type="slidenum">
               <a:rPr lang="fr-FR" smtClean="0"/>
               <a:pPr/>
-              <a:t>5</a:t>
+              <a:t>4</a:t>
             </a:fld>
             <a:endParaRPr lang="fr-FR" dirty="0"/>
           </a:p>
@@ -1774,7 +1978,7 @@
     </p:spTree>
     <p:extLst>
       <p:ext uri="{BB962C8B-B14F-4D97-AF65-F5344CB8AC3E}">
-        <p14:creationId xmlns:p14="http://schemas.microsoft.com/office/powerpoint/2010/main" val="3973816794"/>
+        <p14:creationId xmlns:p14="http://schemas.microsoft.com/office/powerpoint/2010/main" val="1021029615"/>
       </p:ext>
     </p:extLst>
   </p:cSld>
@@ -1830,55 +2034,31 @@
           <a:p>
             <a:r>
               <a:rPr lang="en-US" dirty="0" smtClean="0"/>
-              <a:t>Need to be android 5.0 plus</a:t>
-            </a:r>
-          </a:p>
-          <a:p>
-            <a:r>
-              <a:rPr lang="en-US" dirty="0" smtClean="0"/>
-              <a:t>5 panels -&gt; navigation,</a:t>
+              <a:t>The biggest advantage to use Android</a:t>
             </a:r>
             <a:r>
               <a:rPr lang="en-US" baseline="0" dirty="0" smtClean="0"/>
-              <a:t> phone log, home, media, car diagnosis</a:t>
+              <a:t> Auto instead of the implemented IVI (in vehicle infotainment) of a brand, is that using android Auto we get updates from google, however in a implemented IVI, once is done is done, there are no updates.</a:t>
             </a:r>
           </a:p>
           <a:p>
             <a:r>
               <a:rPr lang="en-US" baseline="0" dirty="0" smtClean="0"/>
-              <a:t>Important information, like a message received, from </a:t>
-            </a:r>
-            <a:r>
-              <a:rPr lang="en-US" baseline="0" dirty="0" err="1" smtClean="0"/>
-              <a:t>whatsupp</a:t>
-            </a:r>
+              <a:t>We know there are people who prefer using other apps for GPS Navigation, but in most of the videos and reviews we saw, they say that Google Maps is the best for being more precise and user friendly, than the others</a:t>
+            </a:r>
+          </a:p>
+          <a:p>
             <a:r>
               <a:rPr lang="en-US" baseline="0" dirty="0" smtClean="0"/>
-              <a:t>, </a:t>
-            </a:r>
-            <a:r>
-              <a:rPr lang="en-US" baseline="0" dirty="0" err="1" smtClean="0"/>
-              <a:t>facebook</a:t>
-            </a:r>
+              <a:t>We saw the comparison between voice control system between google and Apple, and the google voice control performs better, in the interpretation of what a person wants to say.</a:t>
+            </a:r>
+          </a:p>
+          <a:p>
             <a:r>
               <a:rPr lang="en-US" baseline="0" dirty="0" smtClean="0"/>
-              <a:t> </a:t>
-            </a:r>
-            <a:r>
-              <a:rPr lang="en-US" baseline="0" dirty="0" err="1" smtClean="0"/>
-              <a:t>messeger</a:t>
-            </a:r>
-            <a:r>
-              <a:rPr lang="en-US" baseline="0" dirty="0" smtClean="0"/>
-              <a:t> or hangouts</a:t>
-            </a:r>
-          </a:p>
-          <a:p>
-            <a:r>
-              <a:rPr lang="en-US" baseline="0" dirty="0" smtClean="0"/>
-              <a:t>A phone call incoming</a:t>
-            </a:r>
-            <a:endParaRPr lang="en-US" dirty="0" smtClean="0"/>
+              <a:t>We also don’t need to buy a new car or spend 700€ in a aftermarket display, we can simply use our phone to do the work.</a:t>
+            </a:r>
+            <a:endParaRPr lang="en-US" dirty="0"/>
           </a:p>
         </p:txBody>
       </p:sp>
@@ -1900,7 +2080,7 @@
             <a:fld id="{1B06CD8F-B7ED-4A05-9FB1-A01CC0EF02CC}" type="slidenum">
               <a:rPr lang="fr-FR" smtClean="0"/>
               <a:pPr/>
-              <a:t>7</a:t>
+              <a:t>5</a:t>
             </a:fld>
             <a:endParaRPr lang="fr-FR" dirty="0"/>
           </a:p>
@@ -1909,7 +2089,7 @@
     </p:spTree>
     <p:extLst>
       <p:ext uri="{BB962C8B-B14F-4D97-AF65-F5344CB8AC3E}">
-        <p14:creationId xmlns:p14="http://schemas.microsoft.com/office/powerpoint/2010/main" val="1564263606"/>
+        <p14:creationId xmlns:p14="http://schemas.microsoft.com/office/powerpoint/2010/main" val="3973816794"/>
       </p:ext>
     </p:extLst>
   </p:cSld>
@@ -1965,79 +2145,66 @@
           <a:p>
             <a:r>
               <a:rPr lang="en-US" dirty="0" smtClean="0"/>
-              <a:t>Like said before, the car sound system is connected</a:t>
+              <a:t>Need to be android 5.0 plus</a:t>
+            </a:r>
+          </a:p>
+          <a:p>
+            <a:r>
+              <a:rPr lang="en-US" dirty="0" smtClean="0"/>
+              <a:t>5 panels -&gt; navigation,</a:t>
             </a:r>
             <a:r>
               <a:rPr lang="en-US" baseline="0" dirty="0" smtClean="0"/>
-              <a:t> via </a:t>
+              <a:t> phone log, home, media, car diagnosis</a:t>
+            </a:r>
+          </a:p>
+          <a:p>
+            <a:r>
+              <a:rPr lang="en-US" baseline="0" dirty="0" smtClean="0"/>
+              <a:t>Home menu is organized in order to show some info like the weather current song, current destination and upcoming </a:t>
             </a:r>
             <a:r>
               <a:rPr lang="en-US" baseline="0" dirty="0" err="1" smtClean="0"/>
-              <a:t>bluethoot</a:t>
-            </a:r>
+              <a:t>appoitments</a:t>
+            </a:r>
+            <a:endParaRPr lang="en-US" baseline="0" dirty="0" smtClean="0"/>
+          </a:p>
+          <a:p>
             <a:r>
               <a:rPr lang="en-US" baseline="0" dirty="0" smtClean="0"/>
-              <a:t>.</a:t>
-            </a:r>
-          </a:p>
-          <a:p>
+              <a:t>Important information, like a message received, from </a:t>
+            </a:r>
+            <a:r>
+              <a:rPr lang="en-US" baseline="0" dirty="0" err="1" smtClean="0"/>
+              <a:t>whatsupp</a:t>
+            </a:r>
             <a:r>
               <a:rPr lang="en-US" baseline="0" dirty="0" smtClean="0"/>
-              <a:t>We have a lot of options to start a voice command, for example if we use the “OK Google”, we don’t need to touch the screen, and keep the eyes on the road at the same time we are doing something else.</a:t>
-            </a:r>
-          </a:p>
-          <a:p>
+              <a:t>, </a:t>
+            </a:r>
+            <a:r>
+              <a:rPr lang="en-US" baseline="0" dirty="0" err="1" smtClean="0"/>
+              <a:t>facebook</a:t>
+            </a:r>
             <a:r>
               <a:rPr lang="en-US" baseline="0" dirty="0" smtClean="0"/>
-              <a:t>A example to set the destination we can say “OK Google, set directions to …” and we say the address.</a:t>
-            </a:r>
-          </a:p>
-          <a:p>
+              <a:t> </a:t>
+            </a:r>
+            <a:r>
+              <a:rPr lang="en-US" baseline="0" dirty="0" err="1" smtClean="0"/>
+              <a:t>messeger</a:t>
+            </a:r>
             <a:r>
               <a:rPr lang="en-US" baseline="0" dirty="0" smtClean="0"/>
-              <a:t>We can also ask for a </a:t>
-            </a:r>
-            <a:r>
-              <a:rPr lang="en-US" sz="1200" b="0" i="0" kern="1200" dirty="0" smtClean="0">
-                <a:solidFill>
-                  <a:schemeClr val="tx1"/>
-                </a:solidFill>
-                <a:effectLst/>
-                <a:latin typeface="Arial" pitchFamily="34" charset="0"/>
-                <a:ea typeface="+mn-ea"/>
-                <a:cs typeface="+mn-cs"/>
-              </a:rPr>
-              <a:t>specific</a:t>
-            </a:r>
+              <a:t> or hangouts</a:t>
+            </a:r>
+          </a:p>
+          <a:p>
             <a:r>
               <a:rPr lang="en-US" baseline="0" dirty="0" smtClean="0"/>
-              <a:t> song in a </a:t>
-            </a:r>
-            <a:r>
-              <a:rPr lang="en-US" sz="1200" b="0" i="0" kern="1200" dirty="0" smtClean="0">
-                <a:solidFill>
-                  <a:schemeClr val="tx1"/>
-                </a:solidFill>
-                <a:effectLst/>
-                <a:latin typeface="Arial" pitchFamily="34" charset="0"/>
-                <a:ea typeface="+mn-ea"/>
-                <a:cs typeface="+mn-cs"/>
-              </a:rPr>
-              <a:t>specific</a:t>
-            </a:r>
-            <a:r>
-              <a:rPr lang="en-US" baseline="0" dirty="0" smtClean="0"/>
-              <a:t> app</a:t>
-            </a:r>
-          </a:p>
-          <a:p>
-            <a:r>
-              <a:rPr lang="en-US" baseline="0" dirty="0" smtClean="0"/>
-              <a:t>Basically, We can use every OK Google command available for android system</a:t>
-            </a:r>
-          </a:p>
-          <a:p>
-            <a:endParaRPr lang="en-US" dirty="0"/>
+              <a:t>A phone call incoming</a:t>
+            </a:r>
+            <a:endParaRPr lang="en-US" dirty="0" smtClean="0"/>
           </a:p>
         </p:txBody>
       </p:sp>
@@ -2059,7 +2226,7 @@
             <a:fld id="{1B06CD8F-B7ED-4A05-9FB1-A01CC0EF02CC}" type="slidenum">
               <a:rPr lang="fr-FR" smtClean="0"/>
               <a:pPr/>
-              <a:t>8</a:t>
+              <a:t>7</a:t>
             </a:fld>
             <a:endParaRPr lang="fr-FR" dirty="0"/>
           </a:p>
@@ -2068,7 +2235,7 @@
     </p:spTree>
     <p:extLst>
       <p:ext uri="{BB962C8B-B14F-4D97-AF65-F5344CB8AC3E}">
-        <p14:creationId xmlns:p14="http://schemas.microsoft.com/office/powerpoint/2010/main" val="4291574160"/>
+        <p14:creationId xmlns:p14="http://schemas.microsoft.com/office/powerpoint/2010/main" val="1564263606"/>
       </p:ext>
     </p:extLst>
   </p:cSld>
@@ -2124,18 +2291,78 @@
           <a:p>
             <a:r>
               <a:rPr lang="en-US" dirty="0" smtClean="0"/>
-              <a:t>Here is shown the phone screen and the car dash screen,</a:t>
+              <a:t>Like said before, the car sound system is connected</a:t>
             </a:r>
             <a:r>
               <a:rPr lang="en-US" baseline="0" dirty="0" smtClean="0"/>
-              <a:t> and the blue markers show the panel with 5 or 4 buttons</a:t>
-            </a:r>
-          </a:p>
-          <a:p>
+              <a:t> via </a:t>
+            </a:r>
+            <a:r>
+              <a:rPr lang="en-US" baseline="0" dirty="0" err="1" smtClean="0"/>
+              <a:t>bluethoot</a:t>
+            </a:r>
             <a:r>
               <a:rPr lang="en-US" baseline="0" dirty="0" smtClean="0"/>
-              <a:t>For car diagnosis the app called Torque is the one that is used</a:t>
-            </a:r>
+              <a:t>.</a:t>
+            </a:r>
+          </a:p>
+          <a:p>
+            <a:r>
+              <a:rPr lang="en-US" baseline="0" dirty="0" smtClean="0"/>
+              <a:t>We have a lot of options to start a voice command, for example if we use the “OK Google”, we don’t need to touch the screen, and keep the eyes on the road at the same time we are doing something else.</a:t>
+            </a:r>
+          </a:p>
+          <a:p>
+            <a:r>
+              <a:rPr lang="en-US" baseline="0" dirty="0" smtClean="0"/>
+              <a:t>A example to set the destination we can say “OK Google, set directions to …” and we say the address.</a:t>
+            </a:r>
+          </a:p>
+          <a:p>
+            <a:r>
+              <a:rPr lang="en-US" baseline="0" dirty="0" smtClean="0"/>
+              <a:t>We can also ask for a </a:t>
+            </a:r>
+            <a:r>
+              <a:rPr lang="en-US" sz="1200" b="0" i="0" kern="1200" dirty="0" smtClean="0">
+                <a:solidFill>
+                  <a:schemeClr val="tx1"/>
+                </a:solidFill>
+                <a:effectLst/>
+                <a:latin typeface="Arial" pitchFamily="34" charset="0"/>
+                <a:ea typeface="+mn-ea"/>
+                <a:cs typeface="+mn-cs"/>
+              </a:rPr>
+              <a:t>specific</a:t>
+            </a:r>
+            <a:r>
+              <a:rPr lang="en-US" baseline="0" dirty="0" smtClean="0"/>
+              <a:t> song in a </a:t>
+            </a:r>
+            <a:r>
+              <a:rPr lang="en-US" sz="1200" b="0" i="0" kern="1200" dirty="0" smtClean="0">
+                <a:solidFill>
+                  <a:schemeClr val="tx1"/>
+                </a:solidFill>
+                <a:effectLst/>
+                <a:latin typeface="Arial" pitchFamily="34" charset="0"/>
+                <a:ea typeface="+mn-ea"/>
+                <a:cs typeface="+mn-cs"/>
+              </a:rPr>
+              <a:t>specific</a:t>
+            </a:r>
+            <a:r>
+              <a:rPr lang="en-US" baseline="0" dirty="0" smtClean="0"/>
+              <a:t> app</a:t>
+            </a:r>
+          </a:p>
+          <a:p>
+            <a:r>
+              <a:rPr lang="en-US" baseline="0" dirty="0" smtClean="0"/>
+              <a:t>Basically, We can use every OK Google command available for android system</a:t>
+            </a:r>
+          </a:p>
+          <a:p>
             <a:endParaRPr lang="en-US" dirty="0"/>
           </a:p>
         </p:txBody>
@@ -2158,7 +2385,7 @@
             <a:fld id="{1B06CD8F-B7ED-4A05-9FB1-A01CC0EF02CC}" type="slidenum">
               <a:rPr lang="fr-FR" smtClean="0"/>
               <a:pPr/>
-              <a:t>9</a:t>
+              <a:t>8</a:t>
             </a:fld>
             <a:endParaRPr lang="fr-FR" dirty="0"/>
           </a:p>
@@ -2167,7 +2394,7 @@
     </p:spTree>
     <p:extLst>
       <p:ext uri="{BB962C8B-B14F-4D97-AF65-F5344CB8AC3E}">
-        <p14:creationId xmlns:p14="http://schemas.microsoft.com/office/powerpoint/2010/main" val="3316341565"/>
+        <p14:creationId xmlns:p14="http://schemas.microsoft.com/office/powerpoint/2010/main" val="4291574160"/>
       </p:ext>
     </p:extLst>
   </p:cSld>
@@ -2223,15 +2450,17 @@
           <a:p>
             <a:r>
               <a:rPr lang="en-US" dirty="0" smtClean="0"/>
-              <a:t>Here</a:t>
+              <a:t>Here is shown the phone screen and the car dash screen,</a:t>
             </a:r>
             <a:r>
               <a:rPr lang="en-US" baseline="0" dirty="0" smtClean="0"/>
-              <a:t> is shown some examples of the home menu, where we see the relevant information, in the case of the phone we see the current destination, the actual music and a received message, in the car dash is shown a received message, a coming appointment and the current </a:t>
-            </a:r>
-            <a:r>
-              <a:rPr lang="en-US" baseline="0" dirty="0" err="1" smtClean="0"/>
-              <a:t>wheather</a:t>
+              <a:t> and the blue markers show the panel with 5 or 4 buttons</a:t>
+            </a:r>
+          </a:p>
+          <a:p>
+            <a:r>
+              <a:rPr lang="en-US" baseline="0" dirty="0" smtClean="0"/>
+              <a:t>For car diagnosis the app called Torque is the one that is used</a:t>
             </a:r>
             <a:endParaRPr lang="en-US" dirty="0"/>
           </a:p>
@@ -2255,7 +2484,7 @@
             <a:fld id="{1B06CD8F-B7ED-4A05-9FB1-A01CC0EF02CC}" type="slidenum">
               <a:rPr lang="fr-FR" smtClean="0"/>
               <a:pPr/>
-              <a:t>10</a:t>
+              <a:t>9</a:t>
             </a:fld>
             <a:endParaRPr lang="fr-FR" dirty="0"/>
           </a:p>
@@ -2264,7 +2493,7 @@
     </p:spTree>
     <p:extLst>
       <p:ext uri="{BB962C8B-B14F-4D97-AF65-F5344CB8AC3E}">
-        <p14:creationId xmlns:p14="http://schemas.microsoft.com/office/powerpoint/2010/main" val="1596670375"/>
+        <p14:creationId xmlns:p14="http://schemas.microsoft.com/office/powerpoint/2010/main" val="3316341565"/>
       </p:ext>
     </p:extLst>
   </p:cSld>
@@ -2318,7 +2547,19 @@
           <a:bodyPr/>
           <a:lstStyle/>
           <a:p>
-            <a:endParaRPr lang="en-US"/>
+            <a:r>
+              <a:rPr lang="en-US" dirty="0" smtClean="0"/>
+              <a:t>Here</a:t>
+            </a:r>
+            <a:r>
+              <a:rPr lang="en-US" baseline="0" dirty="0" smtClean="0"/>
+              <a:t> is shown some examples of the home menu, where we see the relevant information, in the case of the phone we see the current destination, the actual music and a received message, in the car dash is shown a received message, a coming appointment and the current </a:t>
+            </a:r>
+            <a:r>
+              <a:rPr lang="en-US" baseline="0" dirty="0" err="1" smtClean="0"/>
+              <a:t>wheather</a:t>
+            </a:r>
+            <a:endParaRPr lang="en-US" dirty="0"/>
           </a:p>
         </p:txBody>
       </p:sp>
@@ -2340,7 +2581,7 @@
             <a:fld id="{1B06CD8F-B7ED-4A05-9FB1-A01CC0EF02CC}" type="slidenum">
               <a:rPr lang="fr-FR" smtClean="0"/>
               <a:pPr/>
-              <a:t>11</a:t>
+              <a:t>10</a:t>
             </a:fld>
             <a:endParaRPr lang="fr-FR" dirty="0"/>
           </a:p>
@@ -2349,7 +2590,7 @@
     </p:spTree>
     <p:extLst>
       <p:ext uri="{BB962C8B-B14F-4D97-AF65-F5344CB8AC3E}">
-        <p14:creationId xmlns:p14="http://schemas.microsoft.com/office/powerpoint/2010/main" val="4260471285"/>
+        <p14:creationId xmlns:p14="http://schemas.microsoft.com/office/powerpoint/2010/main" val="1596670375"/>
       </p:ext>
     </p:extLst>
   </p:cSld>
@@ -2403,13 +2644,7 @@
           <a:bodyPr/>
           <a:lstStyle/>
           <a:p>
-            <a:r>
-              <a:rPr lang="en-GB" dirty="0" smtClean="0"/>
-              <a:t>https://developer.android.com/training/auto/start/index.html#dev-project</a:t>
-            </a:r>
-          </a:p>
-          <a:p>
-            <a:endParaRPr lang="en-GB" dirty="0"/>
+            <a:endParaRPr lang="en-US"/>
           </a:p>
         </p:txBody>
       </p:sp>
@@ -2428,18 +2663,19 @@
           <a:bodyPr/>
           <a:lstStyle/>
           <a:p>
-            <a:fld id="{A5FE6474-0819-4CAC-A677-1ACC1221F957}" type="slidenum">
-              <a:rPr lang="en-GB" smtClean="0"/>
-              <a:t>13</a:t>
+            <a:fld id="{1B06CD8F-B7ED-4A05-9FB1-A01CC0EF02CC}" type="slidenum">
+              <a:rPr lang="fr-FR" smtClean="0"/>
+              <a:pPr/>
+              <a:t>11</a:t>
             </a:fld>
-            <a:endParaRPr lang="en-GB"/>
+            <a:endParaRPr lang="fr-FR" dirty="0"/>
           </a:p>
         </p:txBody>
       </p:sp>
     </p:spTree>
     <p:extLst>
       <p:ext uri="{BB962C8B-B14F-4D97-AF65-F5344CB8AC3E}">
-        <p14:creationId xmlns:p14="http://schemas.microsoft.com/office/powerpoint/2010/main" val="4288258623"/>
+        <p14:creationId xmlns:p14="http://schemas.microsoft.com/office/powerpoint/2010/main" val="4260471285"/>
       </p:ext>
     </p:extLst>
   </p:cSld>
@@ -17626,7 +17862,6 @@
               <a:rPr lang="fr-FR" dirty="0"/>
               <a:t>Embedded Android for Automotive</a:t>
             </a:r>
-            <a:endParaRPr lang="fr-FR" dirty="0"/>
           </a:p>
         </p:txBody>
       </p:sp>
@@ -18103,7 +18338,6 @@
               <a:rPr lang="fr-FR" dirty="0"/>
               <a:t>Embedded Android for Automotive</a:t>
             </a:r>
-            <a:endParaRPr lang="fr-FR" dirty="0"/>
           </a:p>
         </p:txBody>
       </p:sp>
@@ -18167,7 +18401,6 @@
               <a:rPr lang="en-US" dirty="0"/>
               <a:t>Embedded Android for Automotive</a:t>
             </a:r>
-            <a:endParaRPr lang="en-US" dirty="0"/>
           </a:p>
         </p:txBody>
       </p:sp>
@@ -21427,18 +21660,18 @@
 </file>
 
 <file path=customXml/item2.xml><?xml version="1.0" encoding="utf-8"?>
+<p:properties xmlns:p="http://schemas.microsoft.com/office/2006/metadata/properties" xmlns:xsi="http://www.w3.org/2001/XMLSchema-instance" xmlns:pc="http://schemas.microsoft.com/office/infopath/2007/PartnerControls">
+  <documentManagement/>
+</p:properties>
+</file>
+
+<file path=customXml/item3.xml><?xml version="1.0" encoding="utf-8"?>
 <?mso-contentType ?>
 <FormTemplates xmlns="http://schemas.microsoft.com/sharepoint/v3/contenttype/forms">
   <Display>DocumentLibraryForm</Display>
   <Edit>DocumentLibraryForm</Edit>
   <New>DocumentLibraryForm</New>
 </FormTemplates>
-</file>
-
-<file path=customXml/item3.xml><?xml version="1.0" encoding="utf-8"?>
-<p:properties xmlns:p="http://schemas.microsoft.com/office/2006/metadata/properties" xmlns:xsi="http://www.w3.org/2001/XMLSchema-instance" xmlns:pc="http://schemas.microsoft.com/office/infopath/2007/PartnerControls">
-  <documentManagement/>
-</p:properties>
 </file>
 
 <file path=customXml/itemProps1.xml><?xml version="1.0" encoding="utf-8"?>
@@ -21458,14 +21691,6 @@
 </file>
 
 <file path=customXml/itemProps2.xml><?xml version="1.0" encoding="utf-8"?>
-<ds:datastoreItem xmlns:ds="http://schemas.openxmlformats.org/officeDocument/2006/customXml" ds:itemID="{74695D99-3EAE-4F55-A2B4-F38051B8FE0A}">
-  <ds:schemaRefs>
-    <ds:schemaRef ds:uri="http://schemas.microsoft.com/sharepoint/v3/contenttype/forms"/>
-  </ds:schemaRefs>
-</ds:datastoreItem>
-</file>
-
-<file path=customXml/itemProps3.xml><?xml version="1.0" encoding="utf-8"?>
 <ds:datastoreItem xmlns:ds="http://schemas.openxmlformats.org/officeDocument/2006/customXml" ds:itemID="{65F64EBE-3065-4A3D-B86E-F21B0406FD66}">
   <ds:schemaRefs>
     <ds:schemaRef ds:uri="http://purl.org/dc/dcmitype/"/>
@@ -21478,4 +21703,12 @@
     <ds:schemaRef ds:uri="http://schemas.microsoft.com/office/2006/metadata/properties"/>
   </ds:schemaRefs>
 </ds:datastoreItem>
+</file>
+
+<file path=customXml/itemProps3.xml><?xml version="1.0" encoding="utf-8"?>
+<ds:datastoreItem xmlns:ds="http://schemas.openxmlformats.org/officeDocument/2006/customXml" ds:itemID="{74695D99-3EAE-4F55-A2B4-F38051B8FE0A}">
+  <ds:schemaRefs>
+    <ds:schemaRef ds:uri="http://schemas.microsoft.com/sharepoint/v3/contenttype/forms"/>
+  </ds:schemaRefs>
+</ds:datastoreItem>
 </file>
</xml_diff>

<commit_message>
Resolved PP, added brands implemented in future
</commit_message>
<xml_diff>
--- a/PowerPoint Final/Presentation_Joao_Mauro.pptx
+++ b/PowerPoint Final/Presentation_Joao_Mauro.pptx
@@ -1628,29 +1628,17 @@
           <a:p>
             <a:r>
               <a:rPr lang="en-US" dirty="0" smtClean="0"/>
-              <a:t>They implemented the Android source code by reconfiguring it into a car OS, without involving Google</a:t>
-            </a:r>
-          </a:p>
-          <a:p>
-            <a:endParaRPr lang="en-US" dirty="0" smtClean="0"/>
-          </a:p>
-          <a:p>
-            <a:r>
-              <a:rPr lang="en-US" dirty="0" smtClean="0"/>
-              <a:t>This attempt, unfortunately, has failed because by the time the product reached the market (after a long development process), the version of Android launched was older and it cannot be updated</a:t>
-            </a:r>
-          </a:p>
-          <a:p>
-            <a:endParaRPr lang="en-US" dirty="0" smtClean="0"/>
-          </a:p>
-          <a:p>
-            <a:r>
-              <a:rPr lang="en-US" dirty="0" smtClean="0"/>
-              <a:t>Though the anticipation that Google will produce a Play Store for the car OS is still not been confirmed. But the latest OS promises the control for Heating, ventilation and air conditioning (HVAC) unit and radio as well.</a:t>
-            </a:r>
-          </a:p>
-          <a:p>
-            <a:endParaRPr lang="en-GB" dirty="0"/>
+              <a:t>Examples of countries</a:t>
+            </a:r>
+            <a:r>
+              <a:rPr lang="en-US" smtClean="0"/>
+              <a:t>: Germany</a:t>
+            </a:r>
+            <a:r>
+              <a:rPr lang="en-US" baseline="0" smtClean="0"/>
+              <a:t> France USA</a:t>
+            </a:r>
+            <a:endParaRPr lang="en-US" dirty="0"/>
           </a:p>
         </p:txBody>
       </p:sp>
@@ -1672,7 +1660,7 @@
             <a:fld id="{1B06CD8F-B7ED-4A05-9FB1-A01CC0EF02CC}" type="slidenum">
               <a:rPr lang="fr-FR" smtClean="0"/>
               <a:pPr/>
-              <a:t>21</a:t>
+              <a:t>20</a:t>
             </a:fld>
             <a:endParaRPr lang="fr-FR" dirty="0"/>
           </a:p>
@@ -1681,7 +1669,7 @@
     </p:spTree>
     <p:extLst>
       <p:ext uri="{BB962C8B-B14F-4D97-AF65-F5344CB8AC3E}">
-        <p14:creationId xmlns:p14="http://schemas.microsoft.com/office/powerpoint/2010/main" val="1471383405"/>
+        <p14:creationId xmlns:p14="http://schemas.microsoft.com/office/powerpoint/2010/main" val="2160029460"/>
       </p:ext>
     </p:extLst>
   </p:cSld>
@@ -1735,6 +1723,115 @@
           <a:bodyPr/>
           <a:lstStyle/>
           <a:p>
+            <a:r>
+              <a:rPr lang="en-US" dirty="0" smtClean="0"/>
+              <a:t>They implemented the Android source code by reconfiguring it into a car OS, without involving Google</a:t>
+            </a:r>
+          </a:p>
+          <a:p>
+            <a:endParaRPr lang="en-US" dirty="0" smtClean="0"/>
+          </a:p>
+          <a:p>
+            <a:r>
+              <a:rPr lang="en-US" dirty="0" smtClean="0"/>
+              <a:t>This attempt, unfortunately, has failed because by the time the product reached the market (after a long development process), the version of Android launched was older and it cannot be updated</a:t>
+            </a:r>
+          </a:p>
+          <a:p>
+            <a:endParaRPr lang="en-US" dirty="0" smtClean="0"/>
+          </a:p>
+          <a:p>
+            <a:r>
+              <a:rPr lang="en-US" dirty="0" smtClean="0"/>
+              <a:t>Though the anticipation that Google will produce a Play Store for the car OS is still not been confirmed. But the latest OS promises the control for Heating, ventilation and air conditioning (HVAC) unit and radio as well.</a:t>
+            </a:r>
+          </a:p>
+          <a:p>
+            <a:endParaRPr lang="en-GB" dirty="0"/>
+          </a:p>
+        </p:txBody>
+      </p:sp>
+      <p:sp>
+        <p:nvSpPr>
+          <p:cNvPr id="4" name="Slide Number Placeholder 3"/>
+          <p:cNvSpPr>
+            <a:spLocks noGrp="1"/>
+          </p:cNvSpPr>
+          <p:nvPr>
+            <p:ph type="sldNum" sz="quarter" idx="10"/>
+          </p:nvPr>
+        </p:nvSpPr>
+        <p:spPr/>
+        <p:txBody>
+          <a:bodyPr/>
+          <a:lstStyle/>
+          <a:p>
+            <a:fld id="{1B06CD8F-B7ED-4A05-9FB1-A01CC0EF02CC}" type="slidenum">
+              <a:rPr lang="fr-FR" smtClean="0"/>
+              <a:pPr/>
+              <a:t>21</a:t>
+            </a:fld>
+            <a:endParaRPr lang="fr-FR" dirty="0"/>
+          </a:p>
+        </p:txBody>
+      </p:sp>
+    </p:spTree>
+    <p:extLst>
+      <p:ext uri="{BB962C8B-B14F-4D97-AF65-F5344CB8AC3E}">
+        <p14:creationId xmlns:p14="http://schemas.microsoft.com/office/powerpoint/2010/main" val="1471383405"/>
+      </p:ext>
+    </p:extLst>
+  </p:cSld>
+  <p:clrMapOvr>
+    <a:masterClrMapping/>
+  </p:clrMapOvr>
+</p:notes>
+</file>
+
+<file path=ppt/notesSlides/notesSlide18.xml><?xml version="1.0" encoding="utf-8"?>
+<p:notes xmlns:a="http://schemas.openxmlformats.org/drawingml/2006/main" xmlns:r="http://schemas.openxmlformats.org/officeDocument/2006/relationships" xmlns:p="http://schemas.openxmlformats.org/presentationml/2006/main">
+  <p:cSld>
+    <p:spTree>
+      <p:nvGrpSpPr>
+        <p:cNvPr id="1" name=""/>
+        <p:cNvGrpSpPr/>
+        <p:nvPr/>
+      </p:nvGrpSpPr>
+      <p:grpSpPr>
+        <a:xfrm>
+          <a:off x="0" y="0"/>
+          <a:ext cx="0" cy="0"/>
+          <a:chOff x="0" y="0"/>
+          <a:chExt cx="0" cy="0"/>
+        </a:xfrm>
+      </p:grpSpPr>
+      <p:sp>
+        <p:nvSpPr>
+          <p:cNvPr id="2" name="Slide Image Placeholder 1"/>
+          <p:cNvSpPr>
+            <a:spLocks noGrp="1" noRot="1" noChangeAspect="1"/>
+          </p:cNvSpPr>
+          <p:nvPr>
+            <p:ph type="sldImg"/>
+          </p:nvPr>
+        </p:nvSpPr>
+        <p:spPr/>
+      </p:sp>
+      <p:sp>
+        <p:nvSpPr>
+          <p:cNvPr id="3" name="Notes Placeholder 2"/>
+          <p:cNvSpPr>
+            <a:spLocks noGrp="1"/>
+          </p:cNvSpPr>
+          <p:nvPr>
+            <p:ph type="body" idx="1"/>
+          </p:nvPr>
+        </p:nvSpPr>
+        <p:spPr/>
+        <p:txBody>
+          <a:bodyPr/>
+          <a:lstStyle/>
+          <a:p>
             <a:pPr marL="0" marR="0" lvl="0" indent="0" algn="l" defTabSz="914400" rtl="0" eaLnBrk="1" fontAlgn="auto" latinLnBrk="0" hangingPunct="1">
               <a:lnSpc>
                 <a:spcPct val="100000"/>
@@ -1943,113 +2040,6 @@
 </p:notes>
 </file>
 
-<file path=ppt/notesSlides/notesSlide18.xml><?xml version="1.0" encoding="utf-8"?>
-<p:notes xmlns:a="http://schemas.openxmlformats.org/drawingml/2006/main" xmlns:r="http://schemas.openxmlformats.org/officeDocument/2006/relationships" xmlns:p="http://schemas.openxmlformats.org/presentationml/2006/main">
-  <p:cSld>
-    <p:spTree>
-      <p:nvGrpSpPr>
-        <p:cNvPr id="1" name=""/>
-        <p:cNvGrpSpPr/>
-        <p:nvPr/>
-      </p:nvGrpSpPr>
-      <p:grpSpPr>
-        <a:xfrm>
-          <a:off x="0" y="0"/>
-          <a:ext cx="0" cy="0"/>
-          <a:chOff x="0" y="0"/>
-          <a:chExt cx="0" cy="0"/>
-        </a:xfrm>
-      </p:grpSpPr>
-      <p:sp>
-        <p:nvSpPr>
-          <p:cNvPr id="2" name="Slide Image Placeholder 1"/>
-          <p:cNvSpPr>
-            <a:spLocks noGrp="1" noRot="1" noChangeAspect="1"/>
-          </p:cNvSpPr>
-          <p:nvPr>
-            <p:ph type="sldImg"/>
-          </p:nvPr>
-        </p:nvSpPr>
-        <p:spPr/>
-      </p:sp>
-      <p:sp>
-        <p:nvSpPr>
-          <p:cNvPr id="3" name="Notes Placeholder 2"/>
-          <p:cNvSpPr>
-            <a:spLocks noGrp="1"/>
-          </p:cNvSpPr>
-          <p:nvPr>
-            <p:ph type="body" idx="1"/>
-          </p:nvPr>
-        </p:nvSpPr>
-        <p:spPr/>
-        <p:txBody>
-          <a:bodyPr/>
-          <a:lstStyle/>
-          <a:p>
-            <a:r>
-              <a:rPr lang="en-GB" dirty="0" smtClean="0"/>
-              <a:t>Google produces</a:t>
-            </a:r>
-            <a:r>
-              <a:rPr lang="en-GB" baseline="0" dirty="0" smtClean="0"/>
-              <a:t> the core software , OEMs rebrand the interface with their own UI</a:t>
-            </a:r>
-          </a:p>
-          <a:p>
-            <a:r>
-              <a:rPr lang="en-GB" baseline="0" dirty="0" smtClean="0"/>
-              <a:t>Google also provides apps like Google Maps and Google Music, and OEMs are free to add their own apps </a:t>
-            </a:r>
-          </a:p>
-          <a:p>
-            <a:r>
-              <a:rPr lang="en-GB" baseline="0" dirty="0" smtClean="0"/>
-              <a:t>For example Audi has its own navigation system in addition to Google Maps. </a:t>
-            </a:r>
-          </a:p>
-          <a:p>
-            <a:endParaRPr lang="en-GB" dirty="0"/>
-          </a:p>
-        </p:txBody>
-      </p:sp>
-      <p:sp>
-        <p:nvSpPr>
-          <p:cNvPr id="4" name="Slide Number Placeholder 3"/>
-          <p:cNvSpPr>
-            <a:spLocks noGrp="1"/>
-          </p:cNvSpPr>
-          <p:nvPr>
-            <p:ph type="sldNum" sz="quarter" idx="10"/>
-          </p:nvPr>
-        </p:nvSpPr>
-        <p:spPr/>
-        <p:txBody>
-          <a:bodyPr/>
-          <a:lstStyle/>
-          <a:p>
-            <a:fld id="{1B06CD8F-B7ED-4A05-9FB1-A01CC0EF02CC}" type="slidenum">
-              <a:rPr lang="fr-FR" smtClean="0"/>
-              <a:pPr/>
-              <a:t>23</a:t>
-            </a:fld>
-            <a:endParaRPr lang="fr-FR" dirty="0"/>
-          </a:p>
-        </p:txBody>
-      </p:sp>
-    </p:spTree>
-    <p:extLst>
-      <p:ext uri="{BB962C8B-B14F-4D97-AF65-F5344CB8AC3E}">
-        <p14:creationId xmlns:p14="http://schemas.microsoft.com/office/powerpoint/2010/main" val="695118903"/>
-      </p:ext>
-    </p:extLst>
-  </p:cSld>
-  <p:clrMapOvr>
-    <a:masterClrMapping/>
-  </p:clrMapOvr>
-</p:notes>
-</file>
-
 <file path=ppt/notesSlides/notesSlide19.xml><?xml version="1.0" encoding="utf-8"?>
 <p:notes xmlns:a="http://schemas.openxmlformats.org/drawingml/2006/main" xmlns:r="http://schemas.openxmlformats.org/officeDocument/2006/relationships" xmlns:p="http://schemas.openxmlformats.org/presentationml/2006/main">
   <p:cSld>
@@ -2096,21 +2086,27 @@
           <a:p>
             <a:r>
               <a:rPr lang="en-GB" dirty="0" smtClean="0"/>
-              <a:t>As</a:t>
+              <a:t>Google produces</a:t>
             </a:r>
             <a:r>
               <a:rPr lang="en-GB" baseline="0" dirty="0" smtClean="0"/>
-              <a:t> you can see the user interface is very different from the Android Auto UI. </a:t>
-            </a:r>
-          </a:p>
-          <a:p>
-            <a:endParaRPr lang="en-GB" baseline="0" dirty="0"/>
+              <a:t> the core software , OEMs rebrand the interface with their own UI</a:t>
+            </a:r>
           </a:p>
           <a:p>
             <a:r>
               <a:rPr lang="en-GB" baseline="0" dirty="0" smtClean="0"/>
-              <a:t>Audi and Volvo can keep a design and layout that are familiar with their costumers </a:t>
-            </a:r>
+              <a:t>Google also provides apps like Google Maps and Google Music, and OEMs are free to add their own apps </a:t>
+            </a:r>
+          </a:p>
+          <a:p>
+            <a:r>
+              <a:rPr lang="en-GB" baseline="0" dirty="0" smtClean="0"/>
+              <a:t>For example Audi has its own navigation system in addition to Google Maps. </a:t>
+            </a:r>
+          </a:p>
+          <a:p>
+            <a:endParaRPr lang="en-GB" dirty="0"/>
           </a:p>
         </p:txBody>
       </p:sp>
@@ -2132,7 +2128,7 @@
             <a:fld id="{1B06CD8F-B7ED-4A05-9FB1-A01CC0EF02CC}" type="slidenum">
               <a:rPr lang="fr-FR" smtClean="0"/>
               <a:pPr/>
-              <a:t>24</a:t>
+              <a:t>23</a:t>
             </a:fld>
             <a:endParaRPr lang="fr-FR" dirty="0"/>
           </a:p>
@@ -2141,7 +2137,7 @@
     </p:spTree>
     <p:extLst>
       <p:ext uri="{BB962C8B-B14F-4D97-AF65-F5344CB8AC3E}">
-        <p14:creationId xmlns:p14="http://schemas.microsoft.com/office/powerpoint/2010/main" val="3990286277"/>
+        <p14:creationId xmlns:p14="http://schemas.microsoft.com/office/powerpoint/2010/main" val="695118903"/>
       </p:ext>
     </p:extLst>
   </p:cSld>
@@ -2243,6 +2239,107 @@
     <p:extLst>
       <p:ext uri="{BB962C8B-B14F-4D97-AF65-F5344CB8AC3E}">
         <p14:creationId xmlns:p14="http://schemas.microsoft.com/office/powerpoint/2010/main" val="3043622959"/>
+      </p:ext>
+    </p:extLst>
+  </p:cSld>
+  <p:clrMapOvr>
+    <a:masterClrMapping/>
+  </p:clrMapOvr>
+</p:notes>
+</file>
+
+<file path=ppt/notesSlides/notesSlide20.xml><?xml version="1.0" encoding="utf-8"?>
+<p:notes xmlns:a="http://schemas.openxmlformats.org/drawingml/2006/main" xmlns:r="http://schemas.openxmlformats.org/officeDocument/2006/relationships" xmlns:p="http://schemas.openxmlformats.org/presentationml/2006/main">
+  <p:cSld>
+    <p:spTree>
+      <p:nvGrpSpPr>
+        <p:cNvPr id="1" name=""/>
+        <p:cNvGrpSpPr/>
+        <p:nvPr/>
+      </p:nvGrpSpPr>
+      <p:grpSpPr>
+        <a:xfrm>
+          <a:off x="0" y="0"/>
+          <a:ext cx="0" cy="0"/>
+          <a:chOff x="0" y="0"/>
+          <a:chExt cx="0" cy="0"/>
+        </a:xfrm>
+      </p:grpSpPr>
+      <p:sp>
+        <p:nvSpPr>
+          <p:cNvPr id="2" name="Slide Image Placeholder 1"/>
+          <p:cNvSpPr>
+            <a:spLocks noGrp="1" noRot="1" noChangeAspect="1"/>
+          </p:cNvSpPr>
+          <p:nvPr>
+            <p:ph type="sldImg"/>
+          </p:nvPr>
+        </p:nvSpPr>
+        <p:spPr/>
+      </p:sp>
+      <p:sp>
+        <p:nvSpPr>
+          <p:cNvPr id="3" name="Notes Placeholder 2"/>
+          <p:cNvSpPr>
+            <a:spLocks noGrp="1"/>
+          </p:cNvSpPr>
+          <p:nvPr>
+            <p:ph type="body" idx="1"/>
+          </p:nvPr>
+        </p:nvSpPr>
+        <p:spPr/>
+        <p:txBody>
+          <a:bodyPr/>
+          <a:lstStyle/>
+          <a:p>
+            <a:r>
+              <a:rPr lang="en-GB" dirty="0" smtClean="0"/>
+              <a:t>As</a:t>
+            </a:r>
+            <a:r>
+              <a:rPr lang="en-GB" baseline="0" dirty="0" smtClean="0"/>
+              <a:t> you can see the user interface is very different from the Android Auto UI. </a:t>
+            </a:r>
+          </a:p>
+          <a:p>
+            <a:endParaRPr lang="en-GB" baseline="0" dirty="0"/>
+          </a:p>
+          <a:p>
+            <a:r>
+              <a:rPr lang="en-GB" baseline="0" dirty="0" smtClean="0"/>
+              <a:t>Audi and Volvo can keep a design and layout that are familiar with their costumers </a:t>
+            </a:r>
+          </a:p>
+        </p:txBody>
+      </p:sp>
+      <p:sp>
+        <p:nvSpPr>
+          <p:cNvPr id="4" name="Slide Number Placeholder 3"/>
+          <p:cNvSpPr>
+            <a:spLocks noGrp="1"/>
+          </p:cNvSpPr>
+          <p:nvPr>
+            <p:ph type="sldNum" sz="quarter" idx="10"/>
+          </p:nvPr>
+        </p:nvSpPr>
+        <p:spPr/>
+        <p:txBody>
+          <a:bodyPr/>
+          <a:lstStyle/>
+          <a:p>
+            <a:fld id="{1B06CD8F-B7ED-4A05-9FB1-A01CC0EF02CC}" type="slidenum">
+              <a:rPr lang="fr-FR" smtClean="0"/>
+              <a:pPr/>
+              <a:t>24</a:t>
+            </a:fld>
+            <a:endParaRPr lang="fr-FR" dirty="0"/>
+          </a:p>
+        </p:txBody>
+      </p:sp>
+    </p:spTree>
+    <p:extLst>
+      <p:ext uri="{BB962C8B-B14F-4D97-AF65-F5344CB8AC3E}">
+        <p14:creationId xmlns:p14="http://schemas.microsoft.com/office/powerpoint/2010/main" val="3990286277"/>
       </p:ext>
     </p:extLst>
   </p:cSld>
@@ -18512,7 +18609,15 @@
             </a:pPr>
             <a:r>
               <a:rPr lang="en-US" dirty="0" smtClean="0"/>
-              <a:t>There are 37 brands of cars that have already implemented Android auto in some models, such as: Audi, Chevrolet, Lamborghini and Volvo</a:t>
+              <a:t>There are </a:t>
+            </a:r>
+            <a:r>
+              <a:rPr lang="en-US" dirty="0" smtClean="0"/>
+              <a:t>38 </a:t>
+            </a:r>
+            <a:r>
+              <a:rPr lang="en-US" dirty="0" smtClean="0"/>
+              <a:t>brands of cars that have already implemented Android auto in some models, such as: Audi, Chevrolet, Lamborghini and Volvo</a:t>
             </a:r>
           </a:p>
           <a:p>
@@ -18536,7 +18641,15 @@
             </a:pPr>
             <a:r>
               <a:rPr lang="en-US" dirty="0" smtClean="0"/>
-              <a:t>In the near future the Android Auto will be implemented in 16 more brands</a:t>
+              <a:t>In the near future the Android Auto will be implemented in </a:t>
+            </a:r>
+            <a:r>
+              <a:rPr lang="en-US" dirty="0" smtClean="0"/>
+              <a:t>14 </a:t>
+            </a:r>
+            <a:r>
+              <a:rPr lang="en-US" dirty="0" smtClean="0"/>
+              <a:t>more brands</a:t>
             </a:r>
             <a:endParaRPr lang="en-US" dirty="0"/>
           </a:p>
@@ -22042,6 +22155,15 @@
 </file>
 
 <file path=customXml/item1.xml><?xml version="1.0" encoding="utf-8"?>
+<?mso-contentType ?>
+<FormTemplates xmlns="http://schemas.microsoft.com/sharepoint/v3/contenttype/forms">
+  <Display>DocumentLibraryForm</Display>
+  <Edit>DocumentLibraryForm</Edit>
+  <New>DocumentLibraryForm</New>
+</FormTemplates>
+</file>
+
+<file path=customXml/item2.xml><?xml version="1.0" encoding="utf-8"?>
 <ct:contentTypeSchema xmlns:ct="http://schemas.microsoft.com/office/2006/metadata/contentType" xmlns:ma="http://schemas.microsoft.com/office/2006/metadata/properties/metaAttributes" ct:_="" ma:_="" ma:contentTypeName="Document" ma:contentTypeID="0x0101001F419E1A6EA81A4789CC2A27D54FE063" ma:contentTypeVersion="2" ma:contentTypeDescription="Create a new document." ma:contentTypeScope="" ma:versionID="6e5cb36ff88c0f99687fc20d43474a84">
   <xsd:schema xmlns:xsd="http://www.w3.org/2001/XMLSchema" xmlns:xs="http://www.w3.org/2001/XMLSchema" xmlns:p="http://schemas.microsoft.com/office/2006/metadata/properties" targetNamespace="http://schemas.microsoft.com/office/2006/metadata/properties" ma:root="true" ma:fieldsID="0d665e38e66d01d06a7f476fcfe73af8">
     <xsd:element name="properties">
@@ -22155,15 +22277,6 @@
 </ct:contentTypeSchema>
 </file>
 
-<file path=customXml/item2.xml><?xml version="1.0" encoding="utf-8"?>
-<?mso-contentType ?>
-<FormTemplates xmlns="http://schemas.microsoft.com/sharepoint/v3/contenttype/forms">
-  <Display>DocumentLibraryForm</Display>
-  <Edit>DocumentLibraryForm</Edit>
-  <New>DocumentLibraryForm</New>
-</FormTemplates>
-</file>
-
 <file path=customXml/item3.xml><?xml version="1.0" encoding="utf-8"?>
 <p:properties xmlns:p="http://schemas.microsoft.com/office/2006/metadata/properties" xmlns:xsi="http://www.w3.org/2001/XMLSchema-instance" xmlns:pc="http://schemas.microsoft.com/office/infopath/2007/PartnerControls">
   <documentManagement/>
@@ -22171,6 +22284,14 @@
 </file>
 
 <file path=customXml/itemProps1.xml><?xml version="1.0" encoding="utf-8"?>
+<ds:datastoreItem xmlns:ds="http://schemas.openxmlformats.org/officeDocument/2006/customXml" ds:itemID="{74695D99-3EAE-4F55-A2B4-F38051B8FE0A}">
+  <ds:schemaRefs>
+    <ds:schemaRef ds:uri="http://schemas.microsoft.com/sharepoint/v3/contenttype/forms"/>
+  </ds:schemaRefs>
+</ds:datastoreItem>
+</file>
+
+<file path=customXml/itemProps2.xml><?xml version="1.0" encoding="utf-8"?>
 <ds:datastoreItem xmlns:ds="http://schemas.openxmlformats.org/officeDocument/2006/customXml" ds:itemID="{71BEF1E5-09DF-46B0-9968-4DC05085673B}">
   <ds:schemaRefs>
     <ds:schemaRef ds:uri="http://schemas.microsoft.com/office/2006/metadata/contentType"/>
@@ -22182,14 +22303,6 @@
     <ds:schemaRef ds:uri="http://purl.org/dc/terms/"/>
     <ds:schemaRef ds:uri="http://schemas.microsoft.com/internal/obd"/>
     <ds:schemaRef ds:uri="http://schemas.microsoft.com/office/infopath/2007/PartnerControls"/>
-  </ds:schemaRefs>
-</ds:datastoreItem>
-</file>
-
-<file path=customXml/itemProps2.xml><?xml version="1.0" encoding="utf-8"?>
-<ds:datastoreItem xmlns:ds="http://schemas.openxmlformats.org/officeDocument/2006/customXml" ds:itemID="{74695D99-3EAE-4F55-A2B4-F38051B8FE0A}">
-  <ds:schemaRefs>
-    <ds:schemaRef ds:uri="http://schemas.microsoft.com/sharepoint/v3/contenttype/forms"/>
   </ds:schemaRefs>
 </ds:datastoreItem>
 </file>

</xml_diff>